<commit_message>
add new 4 slides
</commit_message>
<xml_diff>
--- a/PowerPoint/REACT-NATIVE.pptx
+++ b/PowerPoint/REACT-NATIVE.pptx
@@ -19,6 +19,8 @@
     <p:sldId id="267" r:id="rId13"/>
     <p:sldId id="268" r:id="rId14"/>
     <p:sldId id="269" r:id="rId15"/>
+    <p:sldId id="270" r:id="rId16"/>
+    <p:sldId id="271" r:id="rId17"/>
   </p:sldIdLst>
   <p:sldSz cx="9144000" cy="6858000" type="screen4x3"/>
   <p:notesSz cx="6858000" cy="9144000"/>
@@ -1643,6 +1645,753 @@
 </file>
 
 <file path=ppt/diagrams/colors3.xml><?xml version="1.0" encoding="utf-8"?>
+<dgm:colorsDef xmlns:dgm="http://schemas.openxmlformats.org/drawingml/2006/diagram" xmlns:a="http://schemas.openxmlformats.org/drawingml/2006/main" uniqueId="urn:microsoft.com/office/officeart/2005/8/colors/accent1_2">
+  <dgm:title val=""/>
+  <dgm:desc val=""/>
+  <dgm:catLst>
+    <dgm:cat type="accent1" pri="11200"/>
+  </dgm:catLst>
+  <dgm:styleLbl name="node0">
+    <dgm:fillClrLst meth="repeat">
+      <a:schemeClr val="accent1"/>
+    </dgm:fillClrLst>
+    <dgm:linClrLst meth="repeat">
+      <a:schemeClr val="lt1"/>
+    </dgm:linClrLst>
+    <dgm:effectClrLst/>
+    <dgm:txLinClrLst/>
+    <dgm:txFillClrLst/>
+    <dgm:txEffectClrLst/>
+  </dgm:styleLbl>
+  <dgm:styleLbl name="alignNode1">
+    <dgm:fillClrLst meth="repeat">
+      <a:schemeClr val="accent1"/>
+    </dgm:fillClrLst>
+    <dgm:linClrLst meth="repeat">
+      <a:schemeClr val="accent1"/>
+    </dgm:linClrLst>
+    <dgm:effectClrLst/>
+    <dgm:txLinClrLst/>
+    <dgm:txFillClrLst/>
+    <dgm:txEffectClrLst/>
+  </dgm:styleLbl>
+  <dgm:styleLbl name="node1">
+    <dgm:fillClrLst meth="repeat">
+      <a:schemeClr val="accent1"/>
+    </dgm:fillClrLst>
+    <dgm:linClrLst meth="repeat">
+      <a:schemeClr val="lt1"/>
+    </dgm:linClrLst>
+    <dgm:effectClrLst/>
+    <dgm:txLinClrLst/>
+    <dgm:txFillClrLst/>
+    <dgm:txEffectClrLst/>
+  </dgm:styleLbl>
+  <dgm:styleLbl name="lnNode1">
+    <dgm:fillClrLst meth="repeat">
+      <a:schemeClr val="accent1"/>
+    </dgm:fillClrLst>
+    <dgm:linClrLst meth="repeat">
+      <a:schemeClr val="lt1"/>
+    </dgm:linClrLst>
+    <dgm:effectClrLst/>
+    <dgm:txLinClrLst/>
+    <dgm:txFillClrLst/>
+    <dgm:txEffectClrLst/>
+  </dgm:styleLbl>
+  <dgm:styleLbl name="vennNode1">
+    <dgm:fillClrLst meth="repeat">
+      <a:schemeClr val="accent1">
+        <a:alpha val="50000"/>
+      </a:schemeClr>
+    </dgm:fillClrLst>
+    <dgm:linClrLst meth="repeat">
+      <a:schemeClr val="lt1"/>
+    </dgm:linClrLst>
+    <dgm:effectClrLst/>
+    <dgm:txLinClrLst/>
+    <dgm:txFillClrLst/>
+    <dgm:txEffectClrLst/>
+  </dgm:styleLbl>
+  <dgm:styleLbl name="node2">
+    <dgm:fillClrLst meth="repeat">
+      <a:schemeClr val="accent1"/>
+    </dgm:fillClrLst>
+    <dgm:linClrLst meth="repeat">
+      <a:schemeClr val="lt1"/>
+    </dgm:linClrLst>
+    <dgm:effectClrLst/>
+    <dgm:txLinClrLst/>
+    <dgm:txFillClrLst/>
+    <dgm:txEffectClrLst/>
+  </dgm:styleLbl>
+  <dgm:styleLbl name="node3">
+    <dgm:fillClrLst meth="repeat">
+      <a:schemeClr val="accent1"/>
+    </dgm:fillClrLst>
+    <dgm:linClrLst meth="repeat">
+      <a:schemeClr val="lt1"/>
+    </dgm:linClrLst>
+    <dgm:effectClrLst/>
+    <dgm:txLinClrLst/>
+    <dgm:txFillClrLst/>
+    <dgm:txEffectClrLst/>
+  </dgm:styleLbl>
+  <dgm:styleLbl name="node4">
+    <dgm:fillClrLst meth="repeat">
+      <a:schemeClr val="accent1"/>
+    </dgm:fillClrLst>
+    <dgm:linClrLst meth="repeat">
+      <a:schemeClr val="lt1"/>
+    </dgm:linClrLst>
+    <dgm:effectClrLst/>
+    <dgm:txLinClrLst/>
+    <dgm:txFillClrLst/>
+    <dgm:txEffectClrLst/>
+  </dgm:styleLbl>
+  <dgm:styleLbl name="fgImgPlace1">
+    <dgm:fillClrLst meth="repeat">
+      <a:schemeClr val="accent1">
+        <a:tint val="50000"/>
+      </a:schemeClr>
+    </dgm:fillClrLst>
+    <dgm:linClrLst meth="repeat">
+      <a:schemeClr val="lt1"/>
+    </dgm:linClrLst>
+    <dgm:effectClrLst/>
+    <dgm:txLinClrLst/>
+    <dgm:txFillClrLst meth="repeat">
+      <a:schemeClr val="lt1"/>
+    </dgm:txFillClrLst>
+    <dgm:txEffectClrLst/>
+  </dgm:styleLbl>
+  <dgm:styleLbl name="alignImgPlace1">
+    <dgm:fillClrLst meth="repeat">
+      <a:schemeClr val="accent1">
+        <a:tint val="50000"/>
+      </a:schemeClr>
+    </dgm:fillClrLst>
+    <dgm:linClrLst meth="repeat">
+      <a:schemeClr val="lt1"/>
+    </dgm:linClrLst>
+    <dgm:effectClrLst/>
+    <dgm:txLinClrLst/>
+    <dgm:txFillClrLst meth="repeat">
+      <a:schemeClr val="lt1"/>
+    </dgm:txFillClrLst>
+    <dgm:txEffectClrLst/>
+  </dgm:styleLbl>
+  <dgm:styleLbl name="bgImgPlace1">
+    <dgm:fillClrLst meth="repeat">
+      <a:schemeClr val="accent1">
+        <a:tint val="50000"/>
+      </a:schemeClr>
+    </dgm:fillClrLst>
+    <dgm:linClrLst meth="repeat">
+      <a:schemeClr val="lt1"/>
+    </dgm:linClrLst>
+    <dgm:effectClrLst/>
+    <dgm:txLinClrLst/>
+    <dgm:txFillClrLst meth="repeat">
+      <a:schemeClr val="lt1"/>
+    </dgm:txFillClrLst>
+    <dgm:txEffectClrLst/>
+  </dgm:styleLbl>
+  <dgm:styleLbl name="sibTrans2D1">
+    <dgm:fillClrLst meth="repeat">
+      <a:schemeClr val="accent1">
+        <a:tint val="60000"/>
+      </a:schemeClr>
+    </dgm:fillClrLst>
+    <dgm:linClrLst meth="repeat">
+      <a:schemeClr val="accent1">
+        <a:tint val="60000"/>
+      </a:schemeClr>
+    </dgm:linClrLst>
+    <dgm:effectClrLst/>
+    <dgm:txLinClrLst/>
+    <dgm:txFillClrLst/>
+    <dgm:txEffectClrLst/>
+  </dgm:styleLbl>
+  <dgm:styleLbl name="fgSibTrans2D1">
+    <dgm:fillClrLst meth="repeat">
+      <a:schemeClr val="accent1">
+        <a:tint val="60000"/>
+      </a:schemeClr>
+    </dgm:fillClrLst>
+    <dgm:linClrLst meth="repeat">
+      <a:schemeClr val="accent1">
+        <a:tint val="60000"/>
+      </a:schemeClr>
+    </dgm:linClrLst>
+    <dgm:effectClrLst/>
+    <dgm:txLinClrLst/>
+    <dgm:txFillClrLst/>
+    <dgm:txEffectClrLst/>
+  </dgm:styleLbl>
+  <dgm:styleLbl name="bgSibTrans2D1">
+    <dgm:fillClrLst meth="repeat">
+      <a:schemeClr val="accent1">
+        <a:tint val="60000"/>
+      </a:schemeClr>
+    </dgm:fillClrLst>
+    <dgm:linClrLst meth="repeat">
+      <a:schemeClr val="accent1">
+        <a:tint val="60000"/>
+      </a:schemeClr>
+    </dgm:linClrLst>
+    <dgm:effectClrLst/>
+    <dgm:txLinClrLst/>
+    <dgm:txFillClrLst/>
+    <dgm:txEffectClrLst/>
+  </dgm:styleLbl>
+  <dgm:styleLbl name="sibTrans1D1">
+    <dgm:fillClrLst meth="repeat">
+      <a:schemeClr val="accent1"/>
+    </dgm:fillClrLst>
+    <dgm:linClrLst meth="repeat">
+      <a:schemeClr val="accent1"/>
+    </dgm:linClrLst>
+    <dgm:effectClrLst/>
+    <dgm:txLinClrLst/>
+    <dgm:txFillClrLst meth="repeat">
+      <a:schemeClr val="tx1"/>
+    </dgm:txFillClrLst>
+    <dgm:txEffectClrLst/>
+  </dgm:styleLbl>
+  <dgm:styleLbl name="callout">
+    <dgm:fillClrLst meth="repeat">
+      <a:schemeClr val="accent1"/>
+    </dgm:fillClrLst>
+    <dgm:linClrLst meth="repeat">
+      <a:schemeClr val="accent1">
+        <a:tint val="50000"/>
+      </a:schemeClr>
+    </dgm:linClrLst>
+    <dgm:effectClrLst/>
+    <dgm:txLinClrLst/>
+    <dgm:txFillClrLst meth="repeat">
+      <a:schemeClr val="tx1"/>
+    </dgm:txFillClrLst>
+    <dgm:txEffectClrLst/>
+  </dgm:styleLbl>
+  <dgm:styleLbl name="asst0">
+    <dgm:fillClrLst meth="repeat">
+      <a:schemeClr val="accent1"/>
+    </dgm:fillClrLst>
+    <dgm:linClrLst meth="repeat">
+      <a:schemeClr val="lt1"/>
+    </dgm:linClrLst>
+    <dgm:effectClrLst/>
+    <dgm:txLinClrLst/>
+    <dgm:txFillClrLst/>
+    <dgm:txEffectClrLst/>
+  </dgm:styleLbl>
+  <dgm:styleLbl name="asst1">
+    <dgm:fillClrLst meth="repeat">
+      <a:schemeClr val="accent1"/>
+    </dgm:fillClrLst>
+    <dgm:linClrLst meth="repeat">
+      <a:schemeClr val="lt1"/>
+    </dgm:linClrLst>
+    <dgm:effectClrLst/>
+    <dgm:txLinClrLst/>
+    <dgm:txFillClrLst/>
+    <dgm:txEffectClrLst/>
+  </dgm:styleLbl>
+  <dgm:styleLbl name="asst2">
+    <dgm:fillClrLst meth="repeat">
+      <a:schemeClr val="accent1"/>
+    </dgm:fillClrLst>
+    <dgm:linClrLst meth="repeat">
+      <a:schemeClr val="lt1"/>
+    </dgm:linClrLst>
+    <dgm:effectClrLst/>
+    <dgm:txLinClrLst/>
+    <dgm:txFillClrLst/>
+    <dgm:txEffectClrLst/>
+  </dgm:styleLbl>
+  <dgm:styleLbl name="asst3">
+    <dgm:fillClrLst meth="repeat">
+      <a:schemeClr val="accent1"/>
+    </dgm:fillClrLst>
+    <dgm:linClrLst meth="repeat">
+      <a:schemeClr val="lt1"/>
+    </dgm:linClrLst>
+    <dgm:effectClrLst/>
+    <dgm:txLinClrLst/>
+    <dgm:txFillClrLst/>
+    <dgm:txEffectClrLst/>
+  </dgm:styleLbl>
+  <dgm:styleLbl name="asst4">
+    <dgm:fillClrLst meth="repeat">
+      <a:schemeClr val="accent1"/>
+    </dgm:fillClrLst>
+    <dgm:linClrLst meth="repeat">
+      <a:schemeClr val="lt1"/>
+    </dgm:linClrLst>
+    <dgm:effectClrLst/>
+    <dgm:txLinClrLst/>
+    <dgm:txFillClrLst/>
+    <dgm:txEffectClrLst/>
+  </dgm:styleLbl>
+  <dgm:styleLbl name="parChTrans2D1">
+    <dgm:fillClrLst meth="repeat">
+      <a:schemeClr val="accent1">
+        <a:tint val="60000"/>
+      </a:schemeClr>
+    </dgm:fillClrLst>
+    <dgm:linClrLst meth="repeat">
+      <a:schemeClr val="accent1">
+        <a:tint val="60000"/>
+      </a:schemeClr>
+    </dgm:linClrLst>
+    <dgm:effectClrLst/>
+    <dgm:txLinClrLst/>
+    <dgm:txFillClrLst meth="repeat">
+      <a:schemeClr val="lt1"/>
+    </dgm:txFillClrLst>
+    <dgm:txEffectClrLst/>
+  </dgm:styleLbl>
+  <dgm:styleLbl name="parChTrans2D2">
+    <dgm:fillClrLst meth="repeat">
+      <a:schemeClr val="accent1"/>
+    </dgm:fillClrLst>
+    <dgm:linClrLst meth="repeat">
+      <a:schemeClr val="accent1"/>
+    </dgm:linClrLst>
+    <dgm:effectClrLst/>
+    <dgm:txLinClrLst/>
+    <dgm:txFillClrLst meth="repeat">
+      <a:schemeClr val="lt1"/>
+    </dgm:txFillClrLst>
+    <dgm:txEffectClrLst/>
+  </dgm:styleLbl>
+  <dgm:styleLbl name="parChTrans2D3">
+    <dgm:fillClrLst meth="repeat">
+      <a:schemeClr val="accent1"/>
+    </dgm:fillClrLst>
+    <dgm:linClrLst meth="repeat">
+      <a:schemeClr val="accent1"/>
+    </dgm:linClrLst>
+    <dgm:effectClrLst/>
+    <dgm:txLinClrLst/>
+    <dgm:txFillClrLst meth="repeat">
+      <a:schemeClr val="lt1"/>
+    </dgm:txFillClrLst>
+    <dgm:txEffectClrLst/>
+  </dgm:styleLbl>
+  <dgm:styleLbl name="parChTrans2D4">
+    <dgm:fillClrLst meth="repeat">
+      <a:schemeClr val="accent1"/>
+    </dgm:fillClrLst>
+    <dgm:linClrLst meth="repeat">
+      <a:schemeClr val="accent1"/>
+    </dgm:linClrLst>
+    <dgm:effectClrLst/>
+    <dgm:txLinClrLst/>
+    <dgm:txFillClrLst meth="repeat">
+      <a:schemeClr val="lt1"/>
+    </dgm:txFillClrLst>
+    <dgm:txEffectClrLst/>
+  </dgm:styleLbl>
+  <dgm:styleLbl name="parChTrans1D1">
+    <dgm:fillClrLst meth="repeat">
+      <a:schemeClr val="accent1"/>
+    </dgm:fillClrLst>
+    <dgm:linClrLst meth="repeat">
+      <a:schemeClr val="accent1">
+        <a:shade val="60000"/>
+      </a:schemeClr>
+    </dgm:linClrLst>
+    <dgm:effectClrLst/>
+    <dgm:txLinClrLst/>
+    <dgm:txFillClrLst meth="repeat">
+      <a:schemeClr val="tx1"/>
+    </dgm:txFillClrLst>
+    <dgm:txEffectClrLst/>
+  </dgm:styleLbl>
+  <dgm:styleLbl name="parChTrans1D2">
+    <dgm:fillClrLst meth="repeat">
+      <a:schemeClr val="accent1"/>
+    </dgm:fillClrLst>
+    <dgm:linClrLst meth="repeat">
+      <a:schemeClr val="accent1">
+        <a:shade val="60000"/>
+      </a:schemeClr>
+    </dgm:linClrLst>
+    <dgm:effectClrLst/>
+    <dgm:txLinClrLst/>
+    <dgm:txFillClrLst meth="repeat">
+      <a:schemeClr val="tx1"/>
+    </dgm:txFillClrLst>
+    <dgm:txEffectClrLst/>
+  </dgm:styleLbl>
+  <dgm:styleLbl name="parChTrans1D3">
+    <dgm:fillClrLst meth="repeat">
+      <a:schemeClr val="accent1"/>
+    </dgm:fillClrLst>
+    <dgm:linClrLst meth="repeat">
+      <a:schemeClr val="accent1">
+        <a:shade val="80000"/>
+      </a:schemeClr>
+    </dgm:linClrLst>
+    <dgm:effectClrLst/>
+    <dgm:txLinClrLst/>
+    <dgm:txFillClrLst meth="repeat">
+      <a:schemeClr val="tx1"/>
+    </dgm:txFillClrLst>
+    <dgm:txEffectClrLst/>
+  </dgm:styleLbl>
+  <dgm:styleLbl name="parChTrans1D4">
+    <dgm:fillClrLst meth="repeat">
+      <a:schemeClr val="accent1"/>
+    </dgm:fillClrLst>
+    <dgm:linClrLst meth="repeat">
+      <a:schemeClr val="accent1">
+        <a:shade val="80000"/>
+      </a:schemeClr>
+    </dgm:linClrLst>
+    <dgm:effectClrLst/>
+    <dgm:txLinClrLst/>
+    <dgm:txFillClrLst meth="repeat">
+      <a:schemeClr val="tx1"/>
+    </dgm:txFillClrLst>
+    <dgm:txEffectClrLst/>
+  </dgm:styleLbl>
+  <dgm:styleLbl name="fgAcc1">
+    <dgm:fillClrLst meth="repeat">
+      <a:schemeClr val="lt1">
+        <a:alpha val="90000"/>
+      </a:schemeClr>
+    </dgm:fillClrLst>
+    <dgm:linClrLst meth="repeat">
+      <a:schemeClr val="accent1"/>
+    </dgm:linClrLst>
+    <dgm:effectClrLst/>
+    <dgm:txLinClrLst/>
+    <dgm:txFillClrLst meth="repeat">
+      <a:schemeClr val="dk1"/>
+    </dgm:txFillClrLst>
+    <dgm:txEffectClrLst/>
+  </dgm:styleLbl>
+  <dgm:styleLbl name="conFgAcc1">
+    <dgm:fillClrLst meth="repeat">
+      <a:schemeClr val="lt1">
+        <a:alpha val="90000"/>
+      </a:schemeClr>
+    </dgm:fillClrLst>
+    <dgm:linClrLst meth="repeat">
+      <a:schemeClr val="accent1"/>
+    </dgm:linClrLst>
+    <dgm:effectClrLst/>
+    <dgm:txLinClrLst/>
+    <dgm:txFillClrLst meth="repeat">
+      <a:schemeClr val="dk1"/>
+    </dgm:txFillClrLst>
+    <dgm:txEffectClrLst/>
+  </dgm:styleLbl>
+  <dgm:styleLbl name="alignAcc1">
+    <dgm:fillClrLst meth="repeat">
+      <a:schemeClr val="lt1">
+        <a:alpha val="90000"/>
+      </a:schemeClr>
+    </dgm:fillClrLst>
+    <dgm:linClrLst meth="repeat">
+      <a:schemeClr val="accent1"/>
+    </dgm:linClrLst>
+    <dgm:effectClrLst/>
+    <dgm:txLinClrLst/>
+    <dgm:txFillClrLst meth="repeat">
+      <a:schemeClr val="dk1"/>
+    </dgm:txFillClrLst>
+    <dgm:txEffectClrLst/>
+  </dgm:styleLbl>
+  <dgm:styleLbl name="trAlignAcc1">
+    <dgm:fillClrLst meth="repeat">
+      <a:schemeClr val="lt1">
+        <a:alpha val="40000"/>
+      </a:schemeClr>
+    </dgm:fillClrLst>
+    <dgm:linClrLst meth="repeat">
+      <a:schemeClr val="accent1"/>
+    </dgm:linClrLst>
+    <dgm:effectClrLst/>
+    <dgm:txLinClrLst/>
+    <dgm:txFillClrLst meth="repeat">
+      <a:schemeClr val="dk1"/>
+    </dgm:txFillClrLst>
+    <dgm:txEffectClrLst/>
+  </dgm:styleLbl>
+  <dgm:styleLbl name="bgAcc1">
+    <dgm:fillClrLst meth="repeat">
+      <a:schemeClr val="lt1">
+        <a:alpha val="90000"/>
+      </a:schemeClr>
+    </dgm:fillClrLst>
+    <dgm:linClrLst meth="repeat">
+      <a:schemeClr val="accent1"/>
+    </dgm:linClrLst>
+    <dgm:effectClrLst/>
+    <dgm:txLinClrLst/>
+    <dgm:txFillClrLst meth="repeat">
+      <a:schemeClr val="dk1"/>
+    </dgm:txFillClrLst>
+    <dgm:txEffectClrLst/>
+  </dgm:styleLbl>
+  <dgm:styleLbl name="solidFgAcc1">
+    <dgm:fillClrLst meth="repeat">
+      <a:schemeClr val="lt1"/>
+    </dgm:fillClrLst>
+    <dgm:linClrLst meth="repeat">
+      <a:schemeClr val="accent1"/>
+    </dgm:linClrLst>
+    <dgm:effectClrLst/>
+    <dgm:txLinClrLst/>
+    <dgm:txFillClrLst meth="repeat">
+      <a:schemeClr val="dk1"/>
+    </dgm:txFillClrLst>
+    <dgm:txEffectClrLst/>
+  </dgm:styleLbl>
+  <dgm:styleLbl name="solidAlignAcc1">
+    <dgm:fillClrLst meth="repeat">
+      <a:schemeClr val="lt1"/>
+    </dgm:fillClrLst>
+    <dgm:linClrLst meth="repeat">
+      <a:schemeClr val="accent1"/>
+    </dgm:linClrLst>
+    <dgm:effectClrLst/>
+    <dgm:txLinClrLst/>
+    <dgm:txFillClrLst meth="repeat">
+      <a:schemeClr val="dk1"/>
+    </dgm:txFillClrLst>
+    <dgm:txEffectClrLst/>
+  </dgm:styleLbl>
+  <dgm:styleLbl name="solidBgAcc1">
+    <dgm:fillClrLst meth="repeat">
+      <a:schemeClr val="lt1"/>
+    </dgm:fillClrLst>
+    <dgm:linClrLst meth="repeat">
+      <a:schemeClr val="accent1"/>
+    </dgm:linClrLst>
+    <dgm:effectClrLst/>
+    <dgm:txLinClrLst/>
+    <dgm:txFillClrLst meth="repeat">
+      <a:schemeClr val="dk1"/>
+    </dgm:txFillClrLst>
+    <dgm:txEffectClrLst/>
+  </dgm:styleLbl>
+  <dgm:styleLbl name="fgAccFollowNode1">
+    <dgm:fillClrLst meth="repeat">
+      <a:schemeClr val="accent1">
+        <a:alpha val="90000"/>
+        <a:tint val="40000"/>
+      </a:schemeClr>
+    </dgm:fillClrLst>
+    <dgm:linClrLst meth="repeat">
+      <a:schemeClr val="accent1">
+        <a:alpha val="90000"/>
+        <a:tint val="40000"/>
+      </a:schemeClr>
+    </dgm:linClrLst>
+    <dgm:effectClrLst/>
+    <dgm:txLinClrLst/>
+    <dgm:txFillClrLst meth="repeat">
+      <a:schemeClr val="dk1"/>
+    </dgm:txFillClrLst>
+    <dgm:txEffectClrLst/>
+  </dgm:styleLbl>
+  <dgm:styleLbl name="alignAccFollowNode1">
+    <dgm:fillClrLst meth="repeat">
+      <a:schemeClr val="accent1">
+        <a:alpha val="90000"/>
+        <a:tint val="40000"/>
+      </a:schemeClr>
+    </dgm:fillClrLst>
+    <dgm:linClrLst meth="repeat">
+      <a:schemeClr val="accent1">
+        <a:alpha val="90000"/>
+        <a:tint val="40000"/>
+      </a:schemeClr>
+    </dgm:linClrLst>
+    <dgm:effectClrLst/>
+    <dgm:txLinClrLst/>
+    <dgm:txFillClrLst meth="repeat">
+      <a:schemeClr val="dk1"/>
+    </dgm:txFillClrLst>
+    <dgm:txEffectClrLst/>
+  </dgm:styleLbl>
+  <dgm:styleLbl name="bgAccFollowNode1">
+    <dgm:fillClrLst meth="repeat">
+      <a:schemeClr val="accent1">
+        <a:alpha val="90000"/>
+        <a:tint val="40000"/>
+      </a:schemeClr>
+    </dgm:fillClrLst>
+    <dgm:linClrLst meth="repeat">
+      <a:schemeClr val="accent1">
+        <a:alpha val="90000"/>
+        <a:tint val="40000"/>
+      </a:schemeClr>
+    </dgm:linClrLst>
+    <dgm:effectClrLst/>
+    <dgm:txLinClrLst/>
+    <dgm:txFillClrLst meth="repeat">
+      <a:schemeClr val="dk1"/>
+    </dgm:txFillClrLst>
+    <dgm:txEffectClrLst/>
+  </dgm:styleLbl>
+  <dgm:styleLbl name="fgAcc0">
+    <dgm:fillClrLst meth="repeat">
+      <a:schemeClr val="lt1">
+        <a:alpha val="90000"/>
+      </a:schemeClr>
+    </dgm:fillClrLst>
+    <dgm:linClrLst meth="repeat">
+      <a:schemeClr val="accent1"/>
+    </dgm:linClrLst>
+    <dgm:effectClrLst/>
+    <dgm:txLinClrLst/>
+    <dgm:txFillClrLst meth="repeat">
+      <a:schemeClr val="dk1"/>
+    </dgm:txFillClrLst>
+    <dgm:txEffectClrLst/>
+  </dgm:styleLbl>
+  <dgm:styleLbl name="fgAcc2">
+    <dgm:fillClrLst meth="repeat">
+      <a:schemeClr val="lt1">
+        <a:alpha val="90000"/>
+      </a:schemeClr>
+    </dgm:fillClrLst>
+    <dgm:linClrLst meth="repeat">
+      <a:schemeClr val="accent1"/>
+    </dgm:linClrLst>
+    <dgm:effectClrLst/>
+    <dgm:txLinClrLst/>
+    <dgm:txFillClrLst meth="repeat">
+      <a:schemeClr val="dk1"/>
+    </dgm:txFillClrLst>
+    <dgm:txEffectClrLst/>
+  </dgm:styleLbl>
+  <dgm:styleLbl name="fgAcc3">
+    <dgm:fillClrLst meth="repeat">
+      <a:schemeClr val="lt1">
+        <a:alpha val="90000"/>
+      </a:schemeClr>
+    </dgm:fillClrLst>
+    <dgm:linClrLst meth="repeat">
+      <a:schemeClr val="accent1"/>
+    </dgm:linClrLst>
+    <dgm:effectClrLst/>
+    <dgm:txLinClrLst/>
+    <dgm:txFillClrLst meth="repeat">
+      <a:schemeClr val="dk1"/>
+    </dgm:txFillClrLst>
+    <dgm:txEffectClrLst/>
+  </dgm:styleLbl>
+  <dgm:styleLbl name="fgAcc4">
+    <dgm:fillClrLst meth="repeat">
+      <a:schemeClr val="lt1">
+        <a:alpha val="90000"/>
+      </a:schemeClr>
+    </dgm:fillClrLst>
+    <dgm:linClrLst meth="repeat">
+      <a:schemeClr val="accent1"/>
+    </dgm:linClrLst>
+    <dgm:effectClrLst/>
+    <dgm:txLinClrLst/>
+    <dgm:txFillClrLst meth="repeat">
+      <a:schemeClr val="dk1"/>
+    </dgm:txFillClrLst>
+    <dgm:txEffectClrLst/>
+  </dgm:styleLbl>
+  <dgm:styleLbl name="bgShp">
+    <dgm:fillClrLst meth="repeat">
+      <a:schemeClr val="accent1">
+        <a:tint val="40000"/>
+      </a:schemeClr>
+    </dgm:fillClrLst>
+    <dgm:linClrLst meth="repeat">
+      <a:schemeClr val="accent1"/>
+    </dgm:linClrLst>
+    <dgm:effectClrLst/>
+    <dgm:txLinClrLst/>
+    <dgm:txFillClrLst meth="repeat">
+      <a:schemeClr val="dk1"/>
+    </dgm:txFillClrLst>
+    <dgm:txEffectClrLst/>
+  </dgm:styleLbl>
+  <dgm:styleLbl name="dkBgShp">
+    <dgm:fillClrLst meth="repeat">
+      <a:schemeClr val="accent1">
+        <a:shade val="80000"/>
+      </a:schemeClr>
+    </dgm:fillClrLst>
+    <dgm:linClrLst meth="repeat">
+      <a:schemeClr val="accent1"/>
+    </dgm:linClrLst>
+    <dgm:effectClrLst/>
+    <dgm:txLinClrLst/>
+    <dgm:txFillClrLst meth="repeat">
+      <a:schemeClr val="lt1"/>
+    </dgm:txFillClrLst>
+    <dgm:txEffectClrLst/>
+  </dgm:styleLbl>
+  <dgm:styleLbl name="trBgShp">
+    <dgm:fillClrLst meth="repeat">
+      <a:schemeClr val="accent1">
+        <a:tint val="50000"/>
+        <a:alpha val="40000"/>
+      </a:schemeClr>
+    </dgm:fillClrLst>
+    <dgm:linClrLst meth="repeat">
+      <a:schemeClr val="accent1"/>
+    </dgm:linClrLst>
+    <dgm:effectClrLst/>
+    <dgm:txLinClrLst/>
+    <dgm:txFillClrLst meth="repeat">
+      <a:schemeClr val="lt1"/>
+    </dgm:txFillClrLst>
+    <dgm:txEffectClrLst/>
+  </dgm:styleLbl>
+  <dgm:styleLbl name="fgShp">
+    <dgm:fillClrLst meth="repeat">
+      <a:schemeClr val="accent1">
+        <a:tint val="60000"/>
+      </a:schemeClr>
+    </dgm:fillClrLst>
+    <dgm:linClrLst meth="repeat">
+      <a:schemeClr val="lt1"/>
+    </dgm:linClrLst>
+    <dgm:effectClrLst/>
+    <dgm:txLinClrLst/>
+    <dgm:txFillClrLst meth="repeat">
+      <a:schemeClr val="dk1"/>
+    </dgm:txFillClrLst>
+    <dgm:txEffectClrLst/>
+  </dgm:styleLbl>
+  <dgm:styleLbl name="revTx">
+    <dgm:fillClrLst meth="repeat">
+      <a:schemeClr val="lt1">
+        <a:alpha val="0"/>
+      </a:schemeClr>
+    </dgm:fillClrLst>
+    <dgm:linClrLst meth="repeat">
+      <a:schemeClr val="dk1">
+        <a:alpha val="0"/>
+      </a:schemeClr>
+    </dgm:linClrLst>
+    <dgm:effectClrLst/>
+    <dgm:txLinClrLst/>
+    <dgm:txFillClrLst meth="repeat">
+      <a:schemeClr val="tx1"/>
+    </dgm:txFillClrLst>
+    <dgm:txEffectClrLst/>
+  </dgm:styleLbl>
+</dgm:colorsDef>
+</file>
+
+<file path=ppt/diagrams/colors4.xml><?xml version="1.0" encoding="utf-8"?>
 <dgm:colorsDef xmlns:dgm="http://schemas.openxmlformats.org/drawingml/2006/diagram" xmlns:a="http://schemas.openxmlformats.org/drawingml/2006/main" uniqueId="urn:microsoft.com/office/officeart/2005/8/colors/accent1_2">
   <dgm:title val=""/>
   <dgm:desc val=""/>
@@ -2725,14 +3474,16 @@
         <a:lstStyle/>
         <a:p>
           <a:r>
-            <a:rPr lang="en-US" dirty="0" smtClean="0"/>
-            <a:t>Parent </a:t>
+            <a:rPr lang="en-US" dirty="0" smtClean="0">
+              <a:latin typeface="Arial" panose="020B0604020202020204" pitchFamily="34" charset="0"/>
+              <a:cs typeface="Arial" panose="020B0604020202020204" pitchFamily="34" charset="0"/>
+            </a:rPr>
+            <a:t>Parent Component</a:t>
           </a:r>
-          <a:r>
-            <a:rPr lang="en-US" dirty="0" smtClean="0"/>
-            <a:t>Component</a:t>
-          </a:r>
-          <a:endParaRPr lang="en-US" dirty="0"/>
+          <a:endParaRPr lang="en-US" dirty="0">
+            <a:latin typeface="Arial" panose="020B0604020202020204" pitchFamily="34" charset="0"/>
+            <a:cs typeface="Arial" panose="020B0604020202020204" pitchFamily="34" charset="0"/>
+          </a:endParaRPr>
         </a:p>
       </dgm:t>
     </dgm:pt>
@@ -2829,10 +3580,16 @@
         <a:lstStyle/>
         <a:p>
           <a:r>
-            <a:rPr lang="en-US" dirty="0" smtClean="0"/>
+            <a:rPr lang="en-US" dirty="0" smtClean="0">
+              <a:latin typeface="Arial" panose="020B0604020202020204" pitchFamily="34" charset="0"/>
+              <a:cs typeface="Arial" panose="020B0604020202020204" pitchFamily="34" charset="0"/>
+            </a:rPr>
             <a:t>Child Component</a:t>
           </a:r>
-          <a:endParaRPr lang="en-US" dirty="0"/>
+          <a:endParaRPr lang="en-US" dirty="0">
+            <a:latin typeface="Arial" panose="020B0604020202020204" pitchFamily="34" charset="0"/>
+            <a:cs typeface="Arial" panose="020B0604020202020204" pitchFamily="34" charset="0"/>
+          </a:endParaRPr>
         </a:p>
       </dgm:t>
     </dgm:pt>
@@ -3521,6 +4278,13 @@
         </dgm:presLayoutVars>
       </dgm:prSet>
       <dgm:spPr/>
+      <dgm:t>
+        <a:bodyPr/>
+        <a:lstStyle/>
+        <a:p>
+          <a:endParaRPr lang="en-US"/>
+        </a:p>
+      </dgm:t>
     </dgm:pt>
     <dgm:pt modelId="{D77DD30F-2DEB-400A-8DC9-BE3189261164}" type="pres">
       <dgm:prSet presAssocID="{EA36CA61-CDC5-4D05-968E-B1ADA5D7A1A2}" presName="root" presStyleCnt="0"/>
@@ -3544,6 +4308,13 @@
     <dgm:pt modelId="{5A3EBD35-4366-4CA4-8B43-F9C0D597F659}" type="pres">
       <dgm:prSet presAssocID="{EA36CA61-CDC5-4D05-968E-B1ADA5D7A1A2}" presName="rootConnector" presStyleLbl="node1" presStyleIdx="0" presStyleCnt="2"/>
       <dgm:spPr/>
+      <dgm:t>
+        <a:bodyPr/>
+        <a:lstStyle/>
+        <a:p>
+          <a:endParaRPr lang="en-US"/>
+        </a:p>
+      </dgm:t>
     </dgm:pt>
     <dgm:pt modelId="{1E318464-7E26-4ADA-9841-3011B7EEDC80}" type="pres">
       <dgm:prSet presAssocID="{EA36CA61-CDC5-4D05-968E-B1ADA5D7A1A2}" presName="childShape" presStyleCnt="0"/>
@@ -3552,6 +4323,13 @@
     <dgm:pt modelId="{479DDB34-2941-4C36-95A1-D4BF9A0567B7}" type="pres">
       <dgm:prSet presAssocID="{1EF6BC92-C75B-44C2-A8B3-68804A942C62}" presName="Name13" presStyleLbl="parChTrans1D2" presStyleIdx="0" presStyleCnt="2"/>
       <dgm:spPr/>
+      <dgm:t>
+        <a:bodyPr/>
+        <a:lstStyle/>
+        <a:p>
+          <a:endParaRPr lang="en-US"/>
+        </a:p>
+      </dgm:t>
     </dgm:pt>
     <dgm:pt modelId="{8989EA6E-529A-4656-BCAF-E6BACCC73738}" type="pres">
       <dgm:prSet presAssocID="{33E9EF72-D72A-44EF-9C33-EA386861F20E}" presName="childText" presStyleLbl="bgAcc1" presStyleIdx="0" presStyleCnt="2" custScaleX="96199" custScaleY="57781">
@@ -3590,6 +4368,13 @@
     <dgm:pt modelId="{18A8BD65-2EF6-495F-BFF6-DD92D75395C0}" type="pres">
       <dgm:prSet presAssocID="{9F6BB777-E81E-4ACC-BE5E-BFA75C1211BD}" presName="rootConnector" presStyleLbl="node1" presStyleIdx="1" presStyleCnt="2"/>
       <dgm:spPr/>
+      <dgm:t>
+        <a:bodyPr/>
+        <a:lstStyle/>
+        <a:p>
+          <a:endParaRPr lang="en-US"/>
+        </a:p>
+      </dgm:t>
     </dgm:pt>
     <dgm:pt modelId="{37735DF5-C97B-4B8B-A3AF-7D128BBB628F}" type="pres">
       <dgm:prSet presAssocID="{9F6BB777-E81E-4ACC-BE5E-BFA75C1211BD}" presName="childShape" presStyleCnt="0"/>
@@ -3598,6 +4383,13 @@
     <dgm:pt modelId="{409F2B00-78E3-4896-9E24-21CD021CE403}" type="pres">
       <dgm:prSet presAssocID="{AE54EE3E-23D7-4920-A6F0-22A0C8504803}" presName="Name13" presStyleLbl="parChTrans1D2" presStyleIdx="1" presStyleCnt="2"/>
       <dgm:spPr/>
+      <dgm:t>
+        <a:bodyPr/>
+        <a:lstStyle/>
+        <a:p>
+          <a:endParaRPr lang="en-US"/>
+        </a:p>
+      </dgm:t>
     </dgm:pt>
     <dgm:pt modelId="{B5C3A1FE-3272-4138-87DA-E815315C7BA6}" type="pres">
       <dgm:prSet presAssocID="{E1D59B1C-A3E5-48D3-98DD-706DD9378A07}" presName="childText" presStyleLbl="bgAcc1" presStyleIdx="1" presStyleCnt="2" custScaleX="95972" custScaleY="57781">
@@ -3622,8 +4414,8 @@
     <dgm:cxn modelId="{3FF09597-B436-4FC8-A8A8-3377FE16AAF8}" type="presOf" srcId="{E1D59B1C-A3E5-48D3-98DD-706DD9378A07}" destId="{B5C3A1FE-3272-4138-87DA-E815315C7BA6}" srcOrd="0" destOrd="0" presId="urn:microsoft.com/office/officeart/2005/8/layout/hierarchy3"/>
     <dgm:cxn modelId="{2BD68847-3C75-4739-B8EB-3C3A04A29CF0}" srcId="{EA36CA61-CDC5-4D05-968E-B1ADA5D7A1A2}" destId="{33E9EF72-D72A-44EF-9C33-EA386861F20E}" srcOrd="0" destOrd="0" parTransId="{1EF6BC92-C75B-44C2-A8B3-68804A942C62}" sibTransId="{A85AE2DC-3DC2-4385-AAC3-367259254CB1}"/>
     <dgm:cxn modelId="{FB182395-6316-406F-B720-5FF0CDFFB60E}" type="presOf" srcId="{DEA027DB-DACA-489C-9D36-557FCCF43A77}" destId="{97DDE6CC-C3A4-499A-97D0-9A330FF6AB88}" srcOrd="0" destOrd="0" presId="urn:microsoft.com/office/officeart/2005/8/layout/hierarchy3"/>
+    <dgm:cxn modelId="{2387A7DC-0FFC-4A5D-BF71-61DDE11B8422}" type="presOf" srcId="{AE54EE3E-23D7-4920-A6F0-22A0C8504803}" destId="{409F2B00-78E3-4896-9E24-21CD021CE403}" srcOrd="0" destOrd="0" presId="urn:microsoft.com/office/officeart/2005/8/layout/hierarchy3"/>
     <dgm:cxn modelId="{7EC97442-C69C-40A6-9AF9-36939A65D97E}" srcId="{DEA027DB-DACA-489C-9D36-557FCCF43A77}" destId="{9F6BB777-E81E-4ACC-BE5E-BFA75C1211BD}" srcOrd="1" destOrd="0" parTransId="{07B39AFF-FC38-4CFE-A134-0CD7B39A5E9F}" sibTransId="{DC74B31B-76AC-4473-AD20-F8BAD0E512DA}"/>
-    <dgm:cxn modelId="{2387A7DC-0FFC-4A5D-BF71-61DDE11B8422}" type="presOf" srcId="{AE54EE3E-23D7-4920-A6F0-22A0C8504803}" destId="{409F2B00-78E3-4896-9E24-21CD021CE403}" srcOrd="0" destOrd="0" presId="urn:microsoft.com/office/officeart/2005/8/layout/hierarchy3"/>
     <dgm:cxn modelId="{49944365-1AEB-4820-A018-DACF336DD624}" type="presOf" srcId="{EA36CA61-CDC5-4D05-968E-B1ADA5D7A1A2}" destId="{F8D57ACA-2F5D-49D1-AE7B-8F5FE9F94EF0}" srcOrd="0" destOrd="0" presId="urn:microsoft.com/office/officeart/2005/8/layout/hierarchy3"/>
     <dgm:cxn modelId="{3375DEBE-D05E-4C0B-B504-DF8E029BB1CE}" srcId="{DEA027DB-DACA-489C-9D36-557FCCF43A77}" destId="{EA36CA61-CDC5-4D05-968E-B1ADA5D7A1A2}" srcOrd="0" destOrd="0" parTransId="{0E6F26FD-249A-4BC4-81A4-B31AC8B08A19}" sibTransId="{A4D77DF2-98A1-4DF0-8E31-F66B4D99AB79}"/>
     <dgm:cxn modelId="{815837D2-8CFB-48E1-80AD-D85437689406}" type="presOf" srcId="{33E9EF72-D72A-44EF-9C33-EA386861F20E}" destId="{8989EA6E-529A-4656-BCAF-E6BACCC73738}" srcOrd="0" destOrd="0" presId="urn:microsoft.com/office/officeart/2005/8/layout/hierarchy3"/>
@@ -3654,6 +4446,545 @@
 </dgm:dataModel>
 </file>
 
+<file path=ppt/diagrams/data4.xml><?xml version="1.0" encoding="utf-8"?>
+<dgm:dataModel xmlns:dgm="http://schemas.openxmlformats.org/drawingml/2006/diagram" xmlns:a="http://schemas.openxmlformats.org/drawingml/2006/main">
+  <dgm:ptLst>
+    <dgm:pt modelId="{21746B13-6959-4778-BF22-66A345683AC4}" type="doc">
+      <dgm:prSet loTypeId="urn:microsoft.com/office/officeart/2005/8/layout/vList5" loCatId="list" qsTypeId="urn:microsoft.com/office/officeart/2005/8/quickstyle/simple1" qsCatId="simple" csTypeId="urn:microsoft.com/office/officeart/2005/8/colors/accent1_2" csCatId="accent1" phldr="1"/>
+      <dgm:spPr/>
+      <dgm:t>
+        <a:bodyPr/>
+        <a:lstStyle/>
+        <a:p>
+          <a:endParaRPr lang="en-US"/>
+        </a:p>
+      </dgm:t>
+    </dgm:pt>
+    <dgm:pt modelId="{F288CB3F-1FEA-4884-A577-CF276A21159D}">
+      <dgm:prSet phldrT="[Text]"/>
+      <dgm:spPr>
+        <a:solidFill>
+          <a:schemeClr val="tx1">
+            <a:lumMod val="75000"/>
+            <a:lumOff val="25000"/>
+          </a:schemeClr>
+        </a:solidFill>
+      </dgm:spPr>
+      <dgm:t>
+        <a:bodyPr/>
+        <a:lstStyle/>
+        <a:p>
+          <a:r>
+            <a:rPr lang="en-US" b="0" i="0" dirty="0" err="1" smtClean="0">
+              <a:latin typeface="Arial" panose="020B0604020202020204" pitchFamily="34" charset="0"/>
+              <a:cs typeface="Arial" panose="020B0604020202020204" pitchFamily="34" charset="0"/>
+            </a:rPr>
+            <a:t>StackNavigator</a:t>
+          </a:r>
+          <a:endParaRPr lang="en-US" dirty="0">
+            <a:latin typeface="Arial" panose="020B0604020202020204" pitchFamily="34" charset="0"/>
+            <a:cs typeface="Arial" panose="020B0604020202020204" pitchFamily="34" charset="0"/>
+          </a:endParaRPr>
+        </a:p>
+      </dgm:t>
+    </dgm:pt>
+    <dgm:pt modelId="{D4A552A3-7A77-4CE7-9216-1C62E2EC8CE1}" type="parTrans" cxnId="{4462535D-74E0-4744-B448-DEDA6008520F}">
+      <dgm:prSet/>
+      <dgm:spPr/>
+      <dgm:t>
+        <a:bodyPr/>
+        <a:lstStyle/>
+        <a:p>
+          <a:endParaRPr lang="en-US">
+            <a:latin typeface="Arial" panose="020B0604020202020204" pitchFamily="34" charset="0"/>
+            <a:cs typeface="Arial" panose="020B0604020202020204" pitchFamily="34" charset="0"/>
+          </a:endParaRPr>
+        </a:p>
+      </dgm:t>
+    </dgm:pt>
+    <dgm:pt modelId="{684C2722-A040-4340-8331-B7A91C5FB5C0}" type="sibTrans" cxnId="{4462535D-74E0-4744-B448-DEDA6008520F}">
+      <dgm:prSet/>
+      <dgm:spPr/>
+      <dgm:t>
+        <a:bodyPr/>
+        <a:lstStyle/>
+        <a:p>
+          <a:endParaRPr lang="en-US">
+            <a:latin typeface="Arial" panose="020B0604020202020204" pitchFamily="34" charset="0"/>
+            <a:cs typeface="Arial" panose="020B0604020202020204" pitchFamily="34" charset="0"/>
+          </a:endParaRPr>
+        </a:p>
+      </dgm:t>
+    </dgm:pt>
+    <dgm:pt modelId="{E260DAC3-CC09-46A2-A713-F2BE3FFE5C18}">
+      <dgm:prSet phldrT="[Text]"/>
+      <dgm:spPr/>
+      <dgm:t>
+        <a:bodyPr/>
+        <a:lstStyle/>
+        <a:p>
+          <a:r>
+            <a:rPr lang="en-US" b="0" i="0" dirty="0" smtClean="0">
+              <a:latin typeface="Arial" panose="020B0604020202020204" pitchFamily="34" charset="0"/>
+              <a:cs typeface="Arial" panose="020B0604020202020204" pitchFamily="34" charset="0"/>
+            </a:rPr>
+            <a:t>Provides a way for your app to transition between screens where each </a:t>
+          </a:r>
+          <a:r>
+            <a:rPr lang="en-US" b="0" i="0" dirty="0" smtClean="0">
+              <a:solidFill>
+                <a:srgbClr val="C00000"/>
+              </a:solidFill>
+              <a:latin typeface="Arial" panose="020B0604020202020204" pitchFamily="34" charset="0"/>
+              <a:cs typeface="Arial" panose="020B0604020202020204" pitchFamily="34" charset="0"/>
+            </a:rPr>
+            <a:t>new screen is placed on top of a stack</a:t>
+          </a:r>
+          <a:endParaRPr lang="en-US" dirty="0">
+            <a:solidFill>
+              <a:srgbClr val="C00000"/>
+            </a:solidFill>
+            <a:latin typeface="Arial" panose="020B0604020202020204" pitchFamily="34" charset="0"/>
+            <a:cs typeface="Arial" panose="020B0604020202020204" pitchFamily="34" charset="0"/>
+          </a:endParaRPr>
+        </a:p>
+      </dgm:t>
+    </dgm:pt>
+    <dgm:pt modelId="{08215AA9-34F1-48A7-8296-7E124BB3669D}" type="parTrans" cxnId="{1033C992-32E1-47A8-BFCF-B39C945A12DF}">
+      <dgm:prSet/>
+      <dgm:spPr/>
+      <dgm:t>
+        <a:bodyPr/>
+        <a:lstStyle/>
+        <a:p>
+          <a:endParaRPr lang="en-US">
+            <a:latin typeface="Arial" panose="020B0604020202020204" pitchFamily="34" charset="0"/>
+            <a:cs typeface="Arial" panose="020B0604020202020204" pitchFamily="34" charset="0"/>
+          </a:endParaRPr>
+        </a:p>
+      </dgm:t>
+    </dgm:pt>
+    <dgm:pt modelId="{E8B5C0FF-3AE7-4EA6-81C1-F521B79FBAC2}" type="sibTrans" cxnId="{1033C992-32E1-47A8-BFCF-B39C945A12DF}">
+      <dgm:prSet/>
+      <dgm:spPr/>
+      <dgm:t>
+        <a:bodyPr/>
+        <a:lstStyle/>
+        <a:p>
+          <a:endParaRPr lang="en-US">
+            <a:latin typeface="Arial" panose="020B0604020202020204" pitchFamily="34" charset="0"/>
+            <a:cs typeface="Arial" panose="020B0604020202020204" pitchFamily="34" charset="0"/>
+          </a:endParaRPr>
+        </a:p>
+      </dgm:t>
+    </dgm:pt>
+    <dgm:pt modelId="{9899873B-F995-4826-B02A-D67AF0CDAD71}">
+      <dgm:prSet phldrT="[Text]"/>
+      <dgm:spPr>
+        <a:solidFill>
+          <a:schemeClr val="tx1">
+            <a:lumMod val="75000"/>
+            <a:lumOff val="25000"/>
+          </a:schemeClr>
+        </a:solidFill>
+      </dgm:spPr>
+      <dgm:t>
+        <a:bodyPr/>
+        <a:lstStyle/>
+        <a:p>
+          <a:r>
+            <a:rPr lang="en-US" b="0" i="0" dirty="0" err="1" smtClean="0">
+              <a:latin typeface="Arial" panose="020B0604020202020204" pitchFamily="34" charset="0"/>
+              <a:cs typeface="Arial" panose="020B0604020202020204" pitchFamily="34" charset="0"/>
+            </a:rPr>
+            <a:t>DrawerNavigator</a:t>
+          </a:r>
+          <a:endParaRPr lang="en-US" dirty="0">
+            <a:latin typeface="Arial" panose="020B0604020202020204" pitchFamily="34" charset="0"/>
+            <a:cs typeface="Arial" panose="020B0604020202020204" pitchFamily="34" charset="0"/>
+          </a:endParaRPr>
+        </a:p>
+      </dgm:t>
+    </dgm:pt>
+    <dgm:pt modelId="{DF2DC0A1-E611-4303-8A86-F06673DAAC6C}" type="parTrans" cxnId="{15C989BC-3F87-472B-A2DD-42C82FDE12D8}">
+      <dgm:prSet/>
+      <dgm:spPr/>
+      <dgm:t>
+        <a:bodyPr/>
+        <a:lstStyle/>
+        <a:p>
+          <a:endParaRPr lang="en-US">
+            <a:latin typeface="Arial" panose="020B0604020202020204" pitchFamily="34" charset="0"/>
+            <a:cs typeface="Arial" panose="020B0604020202020204" pitchFamily="34" charset="0"/>
+          </a:endParaRPr>
+        </a:p>
+      </dgm:t>
+    </dgm:pt>
+    <dgm:pt modelId="{734024E9-6B90-4DEE-9549-5BBB340F8E47}" type="sibTrans" cxnId="{15C989BC-3F87-472B-A2DD-42C82FDE12D8}">
+      <dgm:prSet/>
+      <dgm:spPr/>
+      <dgm:t>
+        <a:bodyPr/>
+        <a:lstStyle/>
+        <a:p>
+          <a:endParaRPr lang="en-US">
+            <a:latin typeface="Arial" panose="020B0604020202020204" pitchFamily="34" charset="0"/>
+            <a:cs typeface="Arial" panose="020B0604020202020204" pitchFamily="34" charset="0"/>
+          </a:endParaRPr>
+        </a:p>
+      </dgm:t>
+    </dgm:pt>
+    <dgm:pt modelId="{E844294B-F09C-4340-A8D8-6B1B6F15297C}">
+      <dgm:prSet phldrT="[Text]"/>
+      <dgm:spPr/>
+      <dgm:t>
+        <a:bodyPr/>
+        <a:lstStyle/>
+        <a:p>
+          <a:r>
+            <a:rPr lang="en-US" b="0" i="0" dirty="0" smtClean="0">
+              <a:latin typeface="Arial" panose="020B0604020202020204" pitchFamily="34" charset="0"/>
+              <a:cs typeface="Arial" panose="020B0604020202020204" pitchFamily="34" charset="0"/>
+            </a:rPr>
+            <a:t>Used to set up a screen with </a:t>
+          </a:r>
+          <a:r>
+            <a:rPr lang="en-US" b="0" i="0" dirty="0" smtClean="0">
+              <a:solidFill>
+                <a:srgbClr val="C00000"/>
+              </a:solidFill>
+              <a:latin typeface="Arial" panose="020B0604020202020204" pitchFamily="34" charset="0"/>
+              <a:cs typeface="Arial" panose="020B0604020202020204" pitchFamily="34" charset="0"/>
+            </a:rPr>
+            <a:t>drawer</a:t>
+          </a:r>
+          <a:r>
+            <a:rPr lang="en-US" b="0" i="0" dirty="0" smtClean="0">
+              <a:latin typeface="Arial" panose="020B0604020202020204" pitchFamily="34" charset="0"/>
+              <a:cs typeface="Arial" panose="020B0604020202020204" pitchFamily="34" charset="0"/>
+            </a:rPr>
+            <a:t> navigation</a:t>
+          </a:r>
+          <a:endParaRPr lang="en-US" dirty="0">
+            <a:latin typeface="Arial" panose="020B0604020202020204" pitchFamily="34" charset="0"/>
+            <a:cs typeface="Arial" panose="020B0604020202020204" pitchFamily="34" charset="0"/>
+          </a:endParaRPr>
+        </a:p>
+      </dgm:t>
+    </dgm:pt>
+    <dgm:pt modelId="{AC732AFF-FC0C-4F83-A767-097A5F18EC56}" type="parTrans" cxnId="{CB4C01EB-A471-488F-86C3-8D82513BB6BB}">
+      <dgm:prSet/>
+      <dgm:spPr/>
+      <dgm:t>
+        <a:bodyPr/>
+        <a:lstStyle/>
+        <a:p>
+          <a:endParaRPr lang="en-US">
+            <a:latin typeface="Arial" panose="020B0604020202020204" pitchFamily="34" charset="0"/>
+            <a:cs typeface="Arial" panose="020B0604020202020204" pitchFamily="34" charset="0"/>
+          </a:endParaRPr>
+        </a:p>
+      </dgm:t>
+    </dgm:pt>
+    <dgm:pt modelId="{F5BAC34D-23D9-4164-9C95-E6F8163458F2}" type="sibTrans" cxnId="{CB4C01EB-A471-488F-86C3-8D82513BB6BB}">
+      <dgm:prSet/>
+      <dgm:spPr/>
+      <dgm:t>
+        <a:bodyPr/>
+        <a:lstStyle/>
+        <a:p>
+          <a:endParaRPr lang="en-US">
+            <a:latin typeface="Arial" panose="020B0604020202020204" pitchFamily="34" charset="0"/>
+            <a:cs typeface="Arial" panose="020B0604020202020204" pitchFamily="34" charset="0"/>
+          </a:endParaRPr>
+        </a:p>
+      </dgm:t>
+    </dgm:pt>
+    <dgm:pt modelId="{FFC2A4B6-F4F8-41E3-83A2-9F7C0017DD82}">
+      <dgm:prSet phldrT="[Text]"/>
+      <dgm:spPr>
+        <a:solidFill>
+          <a:schemeClr val="tx1">
+            <a:lumMod val="75000"/>
+            <a:lumOff val="25000"/>
+          </a:schemeClr>
+        </a:solidFill>
+      </dgm:spPr>
+      <dgm:t>
+        <a:bodyPr/>
+        <a:lstStyle/>
+        <a:p>
+          <a:r>
+            <a:rPr lang="en-US" b="0" i="0" dirty="0" err="1" smtClean="0">
+              <a:latin typeface="Arial" panose="020B0604020202020204" pitchFamily="34" charset="0"/>
+              <a:cs typeface="Arial" panose="020B0604020202020204" pitchFamily="34" charset="0"/>
+            </a:rPr>
+            <a:t>TabNavigator</a:t>
+          </a:r>
+          <a:endParaRPr lang="en-US" dirty="0">
+            <a:latin typeface="Arial" panose="020B0604020202020204" pitchFamily="34" charset="0"/>
+            <a:cs typeface="Arial" panose="020B0604020202020204" pitchFamily="34" charset="0"/>
+          </a:endParaRPr>
+        </a:p>
+      </dgm:t>
+    </dgm:pt>
+    <dgm:pt modelId="{B2B67F98-2A52-47FE-A4C4-10B450FBE76D}" type="parTrans" cxnId="{32568593-857A-4949-9C15-3303A0365716}">
+      <dgm:prSet/>
+      <dgm:spPr/>
+      <dgm:t>
+        <a:bodyPr/>
+        <a:lstStyle/>
+        <a:p>
+          <a:endParaRPr lang="en-US">
+            <a:latin typeface="Arial" panose="020B0604020202020204" pitchFamily="34" charset="0"/>
+            <a:cs typeface="Arial" panose="020B0604020202020204" pitchFamily="34" charset="0"/>
+          </a:endParaRPr>
+        </a:p>
+      </dgm:t>
+    </dgm:pt>
+    <dgm:pt modelId="{066FFCDA-30B2-441A-A3AB-9609AD08E296}" type="sibTrans" cxnId="{32568593-857A-4949-9C15-3303A0365716}">
+      <dgm:prSet/>
+      <dgm:spPr/>
+      <dgm:t>
+        <a:bodyPr/>
+        <a:lstStyle/>
+        <a:p>
+          <a:endParaRPr lang="en-US">
+            <a:latin typeface="Arial" panose="020B0604020202020204" pitchFamily="34" charset="0"/>
+            <a:cs typeface="Arial" panose="020B0604020202020204" pitchFamily="34" charset="0"/>
+          </a:endParaRPr>
+        </a:p>
+      </dgm:t>
+    </dgm:pt>
+    <dgm:pt modelId="{55858AC7-6883-4888-8D38-B314D602BE2A}">
+      <dgm:prSet phldrT="[Text]"/>
+      <dgm:spPr/>
+      <dgm:t>
+        <a:bodyPr/>
+        <a:lstStyle/>
+        <a:p>
+          <a:r>
+            <a:rPr lang="en-US" b="0" i="0" dirty="0" smtClean="0">
+              <a:latin typeface="Arial" panose="020B0604020202020204" pitchFamily="34" charset="0"/>
+              <a:cs typeface="Arial" panose="020B0604020202020204" pitchFamily="34" charset="0"/>
+            </a:rPr>
+            <a:t>Used to set up a screen with several </a:t>
+          </a:r>
+          <a:r>
+            <a:rPr lang="en-US" b="0" i="0" dirty="0" smtClean="0">
+              <a:solidFill>
+                <a:srgbClr val="C00000"/>
+              </a:solidFill>
+              <a:latin typeface="Arial" panose="020B0604020202020204" pitchFamily="34" charset="0"/>
+              <a:cs typeface="Arial" panose="020B0604020202020204" pitchFamily="34" charset="0"/>
+            </a:rPr>
+            <a:t>tabs</a:t>
+          </a:r>
+          <a:endParaRPr lang="en-US" dirty="0">
+            <a:solidFill>
+              <a:srgbClr val="C00000"/>
+            </a:solidFill>
+            <a:latin typeface="Arial" panose="020B0604020202020204" pitchFamily="34" charset="0"/>
+            <a:cs typeface="Arial" panose="020B0604020202020204" pitchFamily="34" charset="0"/>
+          </a:endParaRPr>
+        </a:p>
+      </dgm:t>
+    </dgm:pt>
+    <dgm:pt modelId="{7FE6616A-3C89-46AC-A68E-FEED35F2A507}" type="parTrans" cxnId="{F830A446-0AB1-4490-9941-1C6FAFDACF3C}">
+      <dgm:prSet/>
+      <dgm:spPr/>
+      <dgm:t>
+        <a:bodyPr/>
+        <a:lstStyle/>
+        <a:p>
+          <a:endParaRPr lang="en-US">
+            <a:latin typeface="Arial" panose="020B0604020202020204" pitchFamily="34" charset="0"/>
+            <a:cs typeface="Arial" panose="020B0604020202020204" pitchFamily="34" charset="0"/>
+          </a:endParaRPr>
+        </a:p>
+      </dgm:t>
+    </dgm:pt>
+    <dgm:pt modelId="{B7EAA758-20F9-403D-8CE2-8E6764DF57A0}" type="sibTrans" cxnId="{F830A446-0AB1-4490-9941-1C6FAFDACF3C}">
+      <dgm:prSet/>
+      <dgm:spPr/>
+      <dgm:t>
+        <a:bodyPr/>
+        <a:lstStyle/>
+        <a:p>
+          <a:endParaRPr lang="en-US">
+            <a:latin typeface="Arial" panose="020B0604020202020204" pitchFamily="34" charset="0"/>
+            <a:cs typeface="Arial" panose="020B0604020202020204" pitchFamily="34" charset="0"/>
+          </a:endParaRPr>
+        </a:p>
+      </dgm:t>
+    </dgm:pt>
+    <dgm:pt modelId="{DB88F925-D51A-47E7-B288-F6F8A0CF3A61}" type="pres">
+      <dgm:prSet presAssocID="{21746B13-6959-4778-BF22-66A345683AC4}" presName="Name0" presStyleCnt="0">
+        <dgm:presLayoutVars>
+          <dgm:dir/>
+          <dgm:animLvl val="lvl"/>
+          <dgm:resizeHandles val="exact"/>
+        </dgm:presLayoutVars>
+      </dgm:prSet>
+      <dgm:spPr/>
+      <dgm:t>
+        <a:bodyPr/>
+        <a:lstStyle/>
+        <a:p>
+          <a:endParaRPr lang="en-US"/>
+        </a:p>
+      </dgm:t>
+    </dgm:pt>
+    <dgm:pt modelId="{E9FE1863-59FB-43EA-8EEF-C3175CA72F0A}" type="pres">
+      <dgm:prSet presAssocID="{F288CB3F-1FEA-4884-A577-CF276A21159D}" presName="linNode" presStyleCnt="0"/>
+      <dgm:spPr/>
+    </dgm:pt>
+    <dgm:pt modelId="{38520285-16C5-48E2-A871-1F7F6B36A14B}" type="pres">
+      <dgm:prSet presAssocID="{F288CB3F-1FEA-4884-A577-CF276A21159D}" presName="parentText" presStyleLbl="node1" presStyleIdx="0" presStyleCnt="3">
+        <dgm:presLayoutVars>
+          <dgm:chMax val="1"/>
+          <dgm:bulletEnabled val="1"/>
+        </dgm:presLayoutVars>
+      </dgm:prSet>
+      <dgm:spPr/>
+      <dgm:t>
+        <a:bodyPr/>
+        <a:lstStyle/>
+        <a:p>
+          <a:endParaRPr lang="en-US"/>
+        </a:p>
+      </dgm:t>
+    </dgm:pt>
+    <dgm:pt modelId="{0A3FF821-A403-4E18-9DC5-E0954A663B4C}" type="pres">
+      <dgm:prSet presAssocID="{F288CB3F-1FEA-4884-A577-CF276A21159D}" presName="descendantText" presStyleLbl="alignAccFollowNode1" presStyleIdx="0" presStyleCnt="3">
+        <dgm:presLayoutVars>
+          <dgm:bulletEnabled val="1"/>
+        </dgm:presLayoutVars>
+      </dgm:prSet>
+      <dgm:spPr/>
+      <dgm:t>
+        <a:bodyPr/>
+        <a:lstStyle/>
+        <a:p>
+          <a:endParaRPr lang="en-US"/>
+        </a:p>
+      </dgm:t>
+    </dgm:pt>
+    <dgm:pt modelId="{DA5848E4-F8DD-469B-97F2-E07BFB642F3F}" type="pres">
+      <dgm:prSet presAssocID="{684C2722-A040-4340-8331-B7A91C5FB5C0}" presName="sp" presStyleCnt="0"/>
+      <dgm:spPr/>
+    </dgm:pt>
+    <dgm:pt modelId="{8537BA57-CF48-447D-A706-33D01C4F765E}" type="pres">
+      <dgm:prSet presAssocID="{9899873B-F995-4826-B02A-D67AF0CDAD71}" presName="linNode" presStyleCnt="0"/>
+      <dgm:spPr/>
+    </dgm:pt>
+    <dgm:pt modelId="{BF3F5242-8084-402C-8D1D-14DB10A5BC46}" type="pres">
+      <dgm:prSet presAssocID="{9899873B-F995-4826-B02A-D67AF0CDAD71}" presName="parentText" presStyleLbl="node1" presStyleIdx="1" presStyleCnt="3">
+        <dgm:presLayoutVars>
+          <dgm:chMax val="1"/>
+          <dgm:bulletEnabled val="1"/>
+        </dgm:presLayoutVars>
+      </dgm:prSet>
+      <dgm:spPr/>
+      <dgm:t>
+        <a:bodyPr/>
+        <a:lstStyle/>
+        <a:p>
+          <a:endParaRPr lang="en-US"/>
+        </a:p>
+      </dgm:t>
+    </dgm:pt>
+    <dgm:pt modelId="{68DB4A6B-6262-42CC-9DB1-8D373F75C197}" type="pres">
+      <dgm:prSet presAssocID="{9899873B-F995-4826-B02A-D67AF0CDAD71}" presName="descendantText" presStyleLbl="alignAccFollowNode1" presStyleIdx="1" presStyleCnt="3">
+        <dgm:presLayoutVars>
+          <dgm:bulletEnabled val="1"/>
+        </dgm:presLayoutVars>
+      </dgm:prSet>
+      <dgm:spPr/>
+      <dgm:t>
+        <a:bodyPr/>
+        <a:lstStyle/>
+        <a:p>
+          <a:endParaRPr lang="en-US"/>
+        </a:p>
+      </dgm:t>
+    </dgm:pt>
+    <dgm:pt modelId="{8A4E225D-3448-405E-9E4C-E87F05985794}" type="pres">
+      <dgm:prSet presAssocID="{734024E9-6B90-4DEE-9549-5BBB340F8E47}" presName="sp" presStyleCnt="0"/>
+      <dgm:spPr/>
+    </dgm:pt>
+    <dgm:pt modelId="{72F427B5-32C4-40C3-9BB2-C8B98AB82DB5}" type="pres">
+      <dgm:prSet presAssocID="{FFC2A4B6-F4F8-41E3-83A2-9F7C0017DD82}" presName="linNode" presStyleCnt="0"/>
+      <dgm:spPr/>
+    </dgm:pt>
+    <dgm:pt modelId="{9027ACF4-E62A-4DD7-8AEB-F9583CF30DEC}" type="pres">
+      <dgm:prSet presAssocID="{FFC2A4B6-F4F8-41E3-83A2-9F7C0017DD82}" presName="parentText" presStyleLbl="node1" presStyleIdx="2" presStyleCnt="3">
+        <dgm:presLayoutVars>
+          <dgm:chMax val="1"/>
+          <dgm:bulletEnabled val="1"/>
+        </dgm:presLayoutVars>
+      </dgm:prSet>
+      <dgm:spPr/>
+      <dgm:t>
+        <a:bodyPr/>
+        <a:lstStyle/>
+        <a:p>
+          <a:endParaRPr lang="en-US"/>
+        </a:p>
+      </dgm:t>
+    </dgm:pt>
+    <dgm:pt modelId="{1BA234BE-F4E0-4319-B982-3F8537A80498}" type="pres">
+      <dgm:prSet presAssocID="{FFC2A4B6-F4F8-41E3-83A2-9F7C0017DD82}" presName="descendantText" presStyleLbl="alignAccFollowNode1" presStyleIdx="2" presStyleCnt="3">
+        <dgm:presLayoutVars>
+          <dgm:bulletEnabled val="1"/>
+        </dgm:presLayoutVars>
+      </dgm:prSet>
+      <dgm:spPr/>
+      <dgm:t>
+        <a:bodyPr/>
+        <a:lstStyle/>
+        <a:p>
+          <a:endParaRPr lang="en-US"/>
+        </a:p>
+      </dgm:t>
+    </dgm:pt>
+  </dgm:ptLst>
+  <dgm:cxnLst>
+    <dgm:cxn modelId="{A617A8CB-83B7-4F42-857D-3EFFADB80372}" type="presOf" srcId="{9899873B-F995-4826-B02A-D67AF0CDAD71}" destId="{BF3F5242-8084-402C-8D1D-14DB10A5BC46}" srcOrd="0" destOrd="0" presId="urn:microsoft.com/office/officeart/2005/8/layout/vList5"/>
+    <dgm:cxn modelId="{A23EBFBE-7CBF-4902-A99E-BB64866EE463}" type="presOf" srcId="{FFC2A4B6-F4F8-41E3-83A2-9F7C0017DD82}" destId="{9027ACF4-E62A-4DD7-8AEB-F9583CF30DEC}" srcOrd="0" destOrd="0" presId="urn:microsoft.com/office/officeart/2005/8/layout/vList5"/>
+    <dgm:cxn modelId="{F830A446-0AB1-4490-9941-1C6FAFDACF3C}" srcId="{FFC2A4B6-F4F8-41E3-83A2-9F7C0017DD82}" destId="{55858AC7-6883-4888-8D38-B314D602BE2A}" srcOrd="0" destOrd="0" parTransId="{7FE6616A-3C89-46AC-A68E-FEED35F2A507}" sibTransId="{B7EAA758-20F9-403D-8CE2-8E6764DF57A0}"/>
+    <dgm:cxn modelId="{36388771-8DBB-48E0-87AF-2F762C3D966B}" type="presOf" srcId="{21746B13-6959-4778-BF22-66A345683AC4}" destId="{DB88F925-D51A-47E7-B288-F6F8A0CF3A61}" srcOrd="0" destOrd="0" presId="urn:microsoft.com/office/officeart/2005/8/layout/vList5"/>
+    <dgm:cxn modelId="{24D622D6-7FD3-44A2-8546-90D41EC8F031}" type="presOf" srcId="{E260DAC3-CC09-46A2-A713-F2BE3FFE5C18}" destId="{0A3FF821-A403-4E18-9DC5-E0954A663B4C}" srcOrd="0" destOrd="0" presId="urn:microsoft.com/office/officeart/2005/8/layout/vList5"/>
+    <dgm:cxn modelId="{CB4C01EB-A471-488F-86C3-8D82513BB6BB}" srcId="{9899873B-F995-4826-B02A-D67AF0CDAD71}" destId="{E844294B-F09C-4340-A8D8-6B1B6F15297C}" srcOrd="0" destOrd="0" parTransId="{AC732AFF-FC0C-4F83-A767-097A5F18EC56}" sibTransId="{F5BAC34D-23D9-4164-9C95-E6F8163458F2}"/>
+    <dgm:cxn modelId="{394B8747-C5E9-4DA9-826D-F882D0A1A14D}" type="presOf" srcId="{55858AC7-6883-4888-8D38-B314D602BE2A}" destId="{1BA234BE-F4E0-4319-B982-3F8537A80498}" srcOrd="0" destOrd="0" presId="urn:microsoft.com/office/officeart/2005/8/layout/vList5"/>
+    <dgm:cxn modelId="{4462535D-74E0-4744-B448-DEDA6008520F}" srcId="{21746B13-6959-4778-BF22-66A345683AC4}" destId="{F288CB3F-1FEA-4884-A577-CF276A21159D}" srcOrd="0" destOrd="0" parTransId="{D4A552A3-7A77-4CE7-9216-1C62E2EC8CE1}" sibTransId="{684C2722-A040-4340-8331-B7A91C5FB5C0}"/>
+    <dgm:cxn modelId="{AD73D68A-695D-4C01-9AB7-689072A4F3B8}" type="presOf" srcId="{E844294B-F09C-4340-A8D8-6B1B6F15297C}" destId="{68DB4A6B-6262-42CC-9DB1-8D373F75C197}" srcOrd="0" destOrd="0" presId="urn:microsoft.com/office/officeart/2005/8/layout/vList5"/>
+    <dgm:cxn modelId="{15C989BC-3F87-472B-A2DD-42C82FDE12D8}" srcId="{21746B13-6959-4778-BF22-66A345683AC4}" destId="{9899873B-F995-4826-B02A-D67AF0CDAD71}" srcOrd="1" destOrd="0" parTransId="{DF2DC0A1-E611-4303-8A86-F06673DAAC6C}" sibTransId="{734024E9-6B90-4DEE-9549-5BBB340F8E47}"/>
+    <dgm:cxn modelId="{1033C992-32E1-47A8-BFCF-B39C945A12DF}" srcId="{F288CB3F-1FEA-4884-A577-CF276A21159D}" destId="{E260DAC3-CC09-46A2-A713-F2BE3FFE5C18}" srcOrd="0" destOrd="0" parTransId="{08215AA9-34F1-48A7-8296-7E124BB3669D}" sibTransId="{E8B5C0FF-3AE7-4EA6-81C1-F521B79FBAC2}"/>
+    <dgm:cxn modelId="{32568593-857A-4949-9C15-3303A0365716}" srcId="{21746B13-6959-4778-BF22-66A345683AC4}" destId="{FFC2A4B6-F4F8-41E3-83A2-9F7C0017DD82}" srcOrd="2" destOrd="0" parTransId="{B2B67F98-2A52-47FE-A4C4-10B450FBE76D}" sibTransId="{066FFCDA-30B2-441A-A3AB-9609AD08E296}"/>
+    <dgm:cxn modelId="{2D0C601E-A9BA-48B9-A3E8-C92A14210C11}" type="presOf" srcId="{F288CB3F-1FEA-4884-A577-CF276A21159D}" destId="{38520285-16C5-48E2-A871-1F7F6B36A14B}" srcOrd="0" destOrd="0" presId="urn:microsoft.com/office/officeart/2005/8/layout/vList5"/>
+    <dgm:cxn modelId="{75C7608C-6A4A-42D0-AB3C-5FBB0324D027}" type="presParOf" srcId="{DB88F925-D51A-47E7-B288-F6F8A0CF3A61}" destId="{E9FE1863-59FB-43EA-8EEF-C3175CA72F0A}" srcOrd="0" destOrd="0" presId="urn:microsoft.com/office/officeart/2005/8/layout/vList5"/>
+    <dgm:cxn modelId="{F7B5AECD-A0EB-482B-B6BD-687404D0645B}" type="presParOf" srcId="{E9FE1863-59FB-43EA-8EEF-C3175CA72F0A}" destId="{38520285-16C5-48E2-A871-1F7F6B36A14B}" srcOrd="0" destOrd="0" presId="urn:microsoft.com/office/officeart/2005/8/layout/vList5"/>
+    <dgm:cxn modelId="{72F68F2C-AF91-4BDD-A71D-0241F26A83CE}" type="presParOf" srcId="{E9FE1863-59FB-43EA-8EEF-C3175CA72F0A}" destId="{0A3FF821-A403-4E18-9DC5-E0954A663B4C}" srcOrd="1" destOrd="0" presId="urn:microsoft.com/office/officeart/2005/8/layout/vList5"/>
+    <dgm:cxn modelId="{1E0DB21A-327A-4504-AE0D-C46EA2616632}" type="presParOf" srcId="{DB88F925-D51A-47E7-B288-F6F8A0CF3A61}" destId="{DA5848E4-F8DD-469B-97F2-E07BFB642F3F}" srcOrd="1" destOrd="0" presId="urn:microsoft.com/office/officeart/2005/8/layout/vList5"/>
+    <dgm:cxn modelId="{0D6D7319-1AAD-4DF6-B0DC-748E161A0A5E}" type="presParOf" srcId="{DB88F925-D51A-47E7-B288-F6F8A0CF3A61}" destId="{8537BA57-CF48-447D-A706-33D01C4F765E}" srcOrd="2" destOrd="0" presId="urn:microsoft.com/office/officeart/2005/8/layout/vList5"/>
+    <dgm:cxn modelId="{30553142-13E5-4FB3-9FA1-53DE59C9E90A}" type="presParOf" srcId="{8537BA57-CF48-447D-A706-33D01C4F765E}" destId="{BF3F5242-8084-402C-8D1D-14DB10A5BC46}" srcOrd="0" destOrd="0" presId="urn:microsoft.com/office/officeart/2005/8/layout/vList5"/>
+    <dgm:cxn modelId="{6EC5C1FA-A32D-473D-85D7-45F63253D8E3}" type="presParOf" srcId="{8537BA57-CF48-447D-A706-33D01C4F765E}" destId="{68DB4A6B-6262-42CC-9DB1-8D373F75C197}" srcOrd="1" destOrd="0" presId="urn:microsoft.com/office/officeart/2005/8/layout/vList5"/>
+    <dgm:cxn modelId="{C72D0579-FC5A-4C63-8482-99A7F7B475BD}" type="presParOf" srcId="{DB88F925-D51A-47E7-B288-F6F8A0CF3A61}" destId="{8A4E225D-3448-405E-9E4C-E87F05985794}" srcOrd="3" destOrd="0" presId="urn:microsoft.com/office/officeart/2005/8/layout/vList5"/>
+    <dgm:cxn modelId="{64FF758C-3146-477E-A876-694665C69D12}" type="presParOf" srcId="{DB88F925-D51A-47E7-B288-F6F8A0CF3A61}" destId="{72F427B5-32C4-40C3-9BB2-C8B98AB82DB5}" srcOrd="4" destOrd="0" presId="urn:microsoft.com/office/officeart/2005/8/layout/vList5"/>
+    <dgm:cxn modelId="{910F9874-C70D-42CD-A16D-23225E444FF5}" type="presParOf" srcId="{72F427B5-32C4-40C3-9BB2-C8B98AB82DB5}" destId="{9027ACF4-E62A-4DD7-8AEB-F9583CF30DEC}" srcOrd="0" destOrd="0" presId="urn:microsoft.com/office/officeart/2005/8/layout/vList5"/>
+    <dgm:cxn modelId="{3BFF2AFA-AC81-4759-A684-503119DC5A33}" type="presParOf" srcId="{72F427B5-32C4-40C3-9BB2-C8B98AB82DB5}" destId="{1BA234BE-F4E0-4319-B982-3F8537A80498}" srcOrd="1" destOrd="0" presId="urn:microsoft.com/office/officeart/2005/8/layout/vList5"/>
+  </dgm:cxnLst>
+  <dgm:bg/>
+  <dgm:whole/>
+  <dgm:extLst>
+    <a:ext uri="http://schemas.microsoft.com/office/drawing/2008/diagram">
+      <dsp:dataModelExt xmlns:dsp="http://schemas.microsoft.com/office/drawing/2008/diagram" relId="rId6" minVer="http://schemas.openxmlformats.org/drawingml/2006/diagram"/>
+    </a:ext>
+  </dgm:extLst>
+</dgm:dataModel>
+</file>
+
 <file path=ppt/diagrams/drawing1.xml><?xml version="1.0" encoding="utf-8"?>
 <dsp:drawing xmlns:dgm="http://schemas.openxmlformats.org/drawingml/2006/diagram" xmlns:dsp="http://schemas.microsoft.com/office/drawing/2008/diagram" xmlns:a="http://schemas.openxmlformats.org/drawingml/2006/main">
   <dsp:spTree>
@@ -3662,372 +4993,6 @@
       <dsp:cNvGrpSpPr/>
     </dsp:nvGrpSpPr>
     <dsp:grpSpPr/>
-    <dsp:sp modelId="{CB4B68AE-99B9-4F73-A103-F7D238719E7C}">
-      <dsp:nvSpPr>
-        <dsp:cNvPr id="0" name=""/>
-        <dsp:cNvSpPr/>
-      </dsp:nvSpPr>
-      <dsp:spPr>
-        <a:xfrm>
-          <a:off x="3631707" y="-8237"/>
-          <a:ext cx="2117268" cy="2117590"/>
-        </a:xfrm>
-        <a:prstGeom prst="circularArrow">
-          <a:avLst>
-            <a:gd name="adj1" fmla="val 10980"/>
-            <a:gd name="adj2" fmla="val 1142322"/>
-            <a:gd name="adj3" fmla="val 4500000"/>
-            <a:gd name="adj4" fmla="val 10800000"/>
-            <a:gd name="adj5" fmla="val 12500"/>
-          </a:avLst>
-        </a:prstGeom>
-        <a:solidFill>
-          <a:srgbClr val="C00000"/>
-        </a:solidFill>
-        <a:ln w="25400" cap="flat" cmpd="sng" algn="ctr">
-          <a:solidFill>
-            <a:schemeClr val="lt1">
-              <a:hueOff val="0"/>
-              <a:satOff val="0"/>
-              <a:lumOff val="0"/>
-              <a:alphaOff val="0"/>
-            </a:schemeClr>
-          </a:solidFill>
-          <a:prstDash val="solid"/>
-        </a:ln>
-        <a:effectLst/>
-      </dsp:spPr>
-      <dsp:style>
-        <a:lnRef idx="2">
-          <a:scrgbClr r="0" g="0" b="0"/>
-        </a:lnRef>
-        <a:fillRef idx="1">
-          <a:scrgbClr r="0" g="0" b="0"/>
-        </a:fillRef>
-        <a:effectRef idx="0">
-          <a:scrgbClr r="0" g="0" b="0"/>
-        </a:effectRef>
-        <a:fontRef idx="minor">
-          <a:schemeClr val="lt1"/>
-        </a:fontRef>
-      </dsp:style>
-    </dsp:sp>
-    <dsp:sp modelId="{A8D0BBA9-F5D3-4DAE-9D8C-DE8D01C01ACA}">
-      <dsp:nvSpPr>
-        <dsp:cNvPr id="0" name=""/>
-        <dsp:cNvSpPr/>
-      </dsp:nvSpPr>
-      <dsp:spPr>
-        <a:xfrm>
-          <a:off x="3988468" y="665016"/>
-          <a:ext cx="1362334" cy="588121"/>
-        </a:xfrm>
-        <a:prstGeom prst="rect">
-          <a:avLst/>
-        </a:prstGeom>
-        <a:noFill/>
-        <a:ln>
-          <a:noFill/>
-        </a:ln>
-        <a:effectLst/>
-      </dsp:spPr>
-      <dsp:style>
-        <a:lnRef idx="0">
-          <a:scrgbClr r="0" g="0" b="0"/>
-        </a:lnRef>
-        <a:fillRef idx="0">
-          <a:scrgbClr r="0" g="0" b="0"/>
-        </a:fillRef>
-        <a:effectRef idx="0">
-          <a:scrgbClr r="0" g="0" b="0"/>
-        </a:effectRef>
-        <a:fontRef idx="minor"/>
-      </dsp:style>
-      <dsp:txBody>
-        <a:bodyPr spcFirstLastPara="0" vert="horz" wrap="square" lIns="12700" tIns="12700" rIns="12700" bIns="12700" numCol="1" spcCol="1270" anchor="ctr" anchorCtr="0">
-          <a:noAutofit/>
-        </a:bodyPr>
-        <a:lstStyle/>
-        <a:p>
-          <a:pPr lvl="0" algn="ctr" defTabSz="889000">
-            <a:lnSpc>
-              <a:spcPct val="90000"/>
-            </a:lnSpc>
-            <a:spcBef>
-              <a:spcPct val="0"/>
-            </a:spcBef>
-            <a:spcAft>
-              <a:spcPct val="35000"/>
-            </a:spcAft>
-          </a:pPr>
-          <a:r>
-            <a:rPr lang="en-US" sz="2000" kern="1200" dirty="0" smtClean="0">
-              <a:latin typeface="Arial" panose="020B0604020202020204" pitchFamily="34" charset="0"/>
-              <a:cs typeface="Arial" panose="020B0604020202020204" pitchFamily="34" charset="0"/>
-            </a:rPr>
-            <a:t>Authorized</a:t>
-          </a:r>
-          <a:endParaRPr lang="en-US" sz="2000" kern="1200" dirty="0">
-            <a:latin typeface="Arial" panose="020B0604020202020204" pitchFamily="34" charset="0"/>
-            <a:cs typeface="Arial" panose="020B0604020202020204" pitchFamily="34" charset="0"/>
-          </a:endParaRPr>
-        </a:p>
-      </dsp:txBody>
-      <dsp:txXfrm>
-        <a:off x="3988468" y="665016"/>
-        <a:ext cx="1362334" cy="588121"/>
-      </dsp:txXfrm>
-    </dsp:sp>
-    <dsp:sp modelId="{A2754696-EDBD-4E03-ABE8-91AF6B475C64}">
-      <dsp:nvSpPr>
-        <dsp:cNvPr id="0" name=""/>
-        <dsp:cNvSpPr/>
-      </dsp:nvSpPr>
-      <dsp:spPr>
-        <a:xfrm>
-          <a:off x="3061026" y="1187130"/>
-          <a:ext cx="2117268" cy="2117590"/>
-        </a:xfrm>
-        <a:prstGeom prst="leftCircularArrow">
-          <a:avLst>
-            <a:gd name="adj1" fmla="val 10980"/>
-            <a:gd name="adj2" fmla="val 1142322"/>
-            <a:gd name="adj3" fmla="val 6300000"/>
-            <a:gd name="adj4" fmla="val 18900000"/>
-            <a:gd name="adj5" fmla="val 12500"/>
-          </a:avLst>
-        </a:prstGeom>
-        <a:solidFill>
-          <a:srgbClr val="C00000"/>
-        </a:solidFill>
-        <a:ln w="25400" cap="flat" cmpd="sng" algn="ctr">
-          <a:solidFill>
-            <a:schemeClr val="lt1">
-              <a:hueOff val="0"/>
-              <a:satOff val="0"/>
-              <a:lumOff val="0"/>
-              <a:alphaOff val="0"/>
-            </a:schemeClr>
-          </a:solidFill>
-          <a:prstDash val="solid"/>
-        </a:ln>
-        <a:effectLst/>
-      </dsp:spPr>
-      <dsp:style>
-        <a:lnRef idx="2">
-          <a:scrgbClr r="0" g="0" b="0"/>
-        </a:lnRef>
-        <a:fillRef idx="1">
-          <a:scrgbClr r="0" g="0" b="0"/>
-        </a:fillRef>
-        <a:effectRef idx="0">
-          <a:scrgbClr r="0" g="0" b="0"/>
-        </a:effectRef>
-        <a:fontRef idx="minor">
-          <a:schemeClr val="lt1"/>
-        </a:fontRef>
-      </dsp:style>
-    </dsp:sp>
-    <dsp:sp modelId="{D7CA765D-6677-4507-8D75-DCCE736983D3}">
-      <dsp:nvSpPr>
-        <dsp:cNvPr id="0" name=""/>
-        <dsp:cNvSpPr/>
-      </dsp:nvSpPr>
-      <dsp:spPr>
-        <a:xfrm>
-          <a:off x="3531272" y="1927783"/>
-          <a:ext cx="1340768" cy="588121"/>
-        </a:xfrm>
-        <a:prstGeom prst="rect">
-          <a:avLst/>
-        </a:prstGeom>
-        <a:noFill/>
-        <a:ln>
-          <a:noFill/>
-        </a:ln>
-        <a:effectLst/>
-      </dsp:spPr>
-      <dsp:style>
-        <a:lnRef idx="0">
-          <a:scrgbClr r="0" g="0" b="0"/>
-        </a:lnRef>
-        <a:fillRef idx="0">
-          <a:scrgbClr r="0" g="0" b="0"/>
-        </a:fillRef>
-        <a:effectRef idx="0">
-          <a:scrgbClr r="0" g="0" b="0"/>
-        </a:effectRef>
-        <a:fontRef idx="minor"/>
-      </dsp:style>
-      <dsp:txBody>
-        <a:bodyPr spcFirstLastPara="0" vert="horz" wrap="square" lIns="12700" tIns="12700" rIns="12700" bIns="12700" numCol="1" spcCol="1270" anchor="ctr" anchorCtr="0">
-          <a:noAutofit/>
-        </a:bodyPr>
-        <a:lstStyle/>
-        <a:p>
-          <a:pPr lvl="0" algn="ctr" defTabSz="889000">
-            <a:lnSpc>
-              <a:spcPct val="90000"/>
-            </a:lnSpc>
-            <a:spcBef>
-              <a:spcPct val="0"/>
-            </a:spcBef>
-            <a:spcAft>
-              <a:spcPct val="35000"/>
-            </a:spcAft>
-          </a:pPr>
-          <a:r>
-            <a:rPr lang="en-US" sz="2000" b="0" i="0" kern="1200" dirty="0" smtClean="0">
-              <a:latin typeface="Arial" panose="020B0604020202020204" pitchFamily="34" charset="0"/>
-              <a:cs typeface="Arial" panose="020B0604020202020204" pitchFamily="34" charset="0"/>
-            </a:rPr>
-            <a:t>Responder</a:t>
-          </a:r>
-          <a:endParaRPr lang="en-US" sz="2000" kern="1200" dirty="0">
-            <a:latin typeface="Arial" panose="020B0604020202020204" pitchFamily="34" charset="0"/>
-            <a:cs typeface="Arial" panose="020B0604020202020204" pitchFamily="34" charset="0"/>
-          </a:endParaRPr>
-        </a:p>
-      </dsp:txBody>
-      <dsp:txXfrm>
-        <a:off x="3531272" y="1927783"/>
-        <a:ext cx="1340768" cy="588121"/>
-      </dsp:txXfrm>
-    </dsp:sp>
-    <dsp:sp modelId="{9BE3160D-F3B8-42D5-A32E-AB018494B2C5}">
-      <dsp:nvSpPr>
-        <dsp:cNvPr id="0" name=""/>
-        <dsp:cNvSpPr/>
-      </dsp:nvSpPr>
-      <dsp:spPr>
-        <a:xfrm>
-          <a:off x="3809293" y="2566324"/>
-          <a:ext cx="1819061" cy="1819791"/>
-        </a:xfrm>
-        <a:prstGeom prst="blockArc">
-          <a:avLst>
-            <a:gd name="adj1" fmla="val 13500000"/>
-            <a:gd name="adj2" fmla="val 10800000"/>
-            <a:gd name="adj3" fmla="val 12740"/>
-          </a:avLst>
-        </a:prstGeom>
-        <a:solidFill>
-          <a:srgbClr val="C00000"/>
-        </a:solidFill>
-        <a:ln w="25400" cap="flat" cmpd="sng" algn="ctr">
-          <a:solidFill>
-            <a:schemeClr val="lt1">
-              <a:hueOff val="0"/>
-              <a:satOff val="0"/>
-              <a:lumOff val="0"/>
-              <a:alphaOff val="0"/>
-            </a:schemeClr>
-          </a:solidFill>
-          <a:prstDash val="solid"/>
-        </a:ln>
-        <a:effectLst/>
-      </dsp:spPr>
-      <dsp:style>
-        <a:lnRef idx="2">
-          <a:scrgbClr r="0" g="0" b="0"/>
-        </a:lnRef>
-        <a:fillRef idx="1">
-          <a:scrgbClr r="0" g="0" b="0"/>
-        </a:fillRef>
-        <a:effectRef idx="0">
-          <a:scrgbClr r="0" g="0" b="0"/>
-        </a:effectRef>
-        <a:fontRef idx="minor">
-          <a:schemeClr val="lt1"/>
-        </a:fontRef>
-      </dsp:style>
-    </dsp:sp>
-    <dsp:sp modelId="{E2917357-A89F-4B66-BC6B-1AA85F9E97AD}">
-      <dsp:nvSpPr>
-        <dsp:cNvPr id="0" name=""/>
-        <dsp:cNvSpPr/>
-      </dsp:nvSpPr>
-      <dsp:spPr>
-        <a:xfrm>
-          <a:off x="4149406" y="3178530"/>
-          <a:ext cx="1176525" cy="588121"/>
-        </a:xfrm>
-        <a:prstGeom prst="rect">
-          <a:avLst/>
-        </a:prstGeom>
-        <a:noFill/>
-        <a:ln>
-          <a:noFill/>
-        </a:ln>
-        <a:effectLst/>
-      </dsp:spPr>
-      <dsp:style>
-        <a:lnRef idx="0">
-          <a:scrgbClr r="0" g="0" b="0"/>
-        </a:lnRef>
-        <a:fillRef idx="0">
-          <a:scrgbClr r="0" g="0" b="0"/>
-        </a:fillRef>
-        <a:effectRef idx="0">
-          <a:scrgbClr r="0" g="0" b="0"/>
-        </a:effectRef>
-        <a:fontRef idx="minor"/>
-      </dsp:style>
-      <dsp:txBody>
-        <a:bodyPr spcFirstLastPara="0" vert="horz" wrap="square" lIns="12700" tIns="12700" rIns="12700" bIns="12700" numCol="1" spcCol="1270" anchor="ctr" anchorCtr="0">
-          <a:noAutofit/>
-        </a:bodyPr>
-        <a:lstStyle/>
-        <a:p>
-          <a:pPr lvl="0" algn="ctr" defTabSz="889000">
-            <a:lnSpc>
-              <a:spcPct val="90000"/>
-            </a:lnSpc>
-            <a:spcBef>
-              <a:spcPct val="0"/>
-            </a:spcBef>
-            <a:spcAft>
-              <a:spcPct val="35000"/>
-            </a:spcAft>
-          </a:pPr>
-          <a:r>
-            <a:rPr lang="en-US" sz="2000" b="0" i="0" kern="1200" dirty="0" smtClean="0">
-              <a:latin typeface="Arial" panose="020B0604020202020204" pitchFamily="34" charset="0"/>
-              <a:cs typeface="Arial" panose="020B0604020202020204" pitchFamily="34" charset="0"/>
-            </a:rPr>
-            <a:t>Handle</a:t>
-          </a:r>
-        </a:p>
-        <a:p>
-          <a:pPr lvl="0" algn="ctr" defTabSz="889000">
-            <a:lnSpc>
-              <a:spcPct val="90000"/>
-            </a:lnSpc>
-            <a:spcBef>
-              <a:spcPct val="0"/>
-            </a:spcBef>
-            <a:spcAft>
-              <a:spcPct val="35000"/>
-            </a:spcAft>
-          </a:pPr>
-          <a:r>
-            <a:rPr lang="en-US" sz="2000" b="0" i="0" kern="1200" dirty="0" smtClean="0">
-              <a:latin typeface="Arial" panose="020B0604020202020204" pitchFamily="34" charset="0"/>
-              <a:cs typeface="Arial" panose="020B0604020202020204" pitchFamily="34" charset="0"/>
-            </a:rPr>
-            <a:t>Actions </a:t>
-          </a:r>
-          <a:endParaRPr lang="en-US" sz="2000" kern="1200" dirty="0">
-            <a:latin typeface="Arial" panose="020B0604020202020204" pitchFamily="34" charset="0"/>
-            <a:cs typeface="Arial" panose="020B0604020202020204" pitchFamily="34" charset="0"/>
-          </a:endParaRPr>
-        </a:p>
-      </dsp:txBody>
-      <dsp:txXfrm>
-        <a:off x="4149406" y="3178530"/>
-        <a:ext cx="1176525" cy="588121"/>
-      </dsp:txXfrm>
-    </dsp:sp>
   </dsp:spTree>
 </dsp:drawing>
 </file>
@@ -4040,446 +5005,6 @@
       <dsp:cNvGrpSpPr/>
     </dsp:nvGrpSpPr>
     <dsp:grpSpPr/>
-    <dsp:sp modelId="{43E1E82C-0E11-430E-A2A5-4ABCC38B1434}">
-      <dsp:nvSpPr>
-        <dsp:cNvPr id="0" name=""/>
-        <dsp:cNvSpPr/>
-      </dsp:nvSpPr>
-      <dsp:spPr>
-        <a:xfrm>
-          <a:off x="3091" y="728004"/>
-          <a:ext cx="2654170" cy="1579186"/>
-        </a:xfrm>
-        <a:prstGeom prst="roundRect">
-          <a:avLst>
-            <a:gd name="adj" fmla="val 10000"/>
-          </a:avLst>
-        </a:prstGeom>
-        <a:solidFill>
-          <a:schemeClr val="tx1">
-            <a:lumMod val="75000"/>
-            <a:lumOff val="25000"/>
-          </a:schemeClr>
-        </a:solidFill>
-        <a:ln w="25400" cap="flat" cmpd="sng" algn="ctr">
-          <a:solidFill>
-            <a:schemeClr val="lt1">
-              <a:hueOff val="0"/>
-              <a:satOff val="0"/>
-              <a:lumOff val="0"/>
-              <a:alphaOff val="0"/>
-            </a:schemeClr>
-          </a:solidFill>
-          <a:prstDash val="solid"/>
-        </a:ln>
-        <a:effectLst/>
-      </dsp:spPr>
-      <dsp:style>
-        <a:lnRef idx="2">
-          <a:scrgbClr r="0" g="0" b="0"/>
-        </a:lnRef>
-        <a:fillRef idx="1">
-          <a:scrgbClr r="0" g="0" b="0"/>
-        </a:fillRef>
-        <a:effectRef idx="0">
-          <a:scrgbClr r="0" g="0" b="0"/>
-        </a:effectRef>
-        <a:fontRef idx="minor">
-          <a:schemeClr val="lt1"/>
-        </a:fontRef>
-      </dsp:style>
-      <dsp:txBody>
-        <a:bodyPr spcFirstLastPara="0" vert="horz" wrap="square" lIns="192024" tIns="192024" rIns="192024" bIns="102870" numCol="1" spcCol="1270" anchor="t" anchorCtr="0">
-          <a:noAutofit/>
-        </a:bodyPr>
-        <a:lstStyle/>
-        <a:p>
-          <a:pPr lvl="0" algn="l" defTabSz="1200150">
-            <a:lnSpc>
-              <a:spcPct val="90000"/>
-            </a:lnSpc>
-            <a:spcBef>
-              <a:spcPct val="0"/>
-            </a:spcBef>
-            <a:spcAft>
-              <a:spcPct val="35000"/>
-            </a:spcAft>
-          </a:pPr>
-          <a:r>
-            <a:rPr lang="en-US" sz="2700" kern="1200" dirty="0" smtClean="0"/>
-            <a:t>Parent </a:t>
-          </a:r>
-          <a:r>
-            <a:rPr lang="en-US" sz="2700" kern="1200" dirty="0" smtClean="0"/>
-            <a:t>Component</a:t>
-          </a:r>
-          <a:endParaRPr lang="en-US" sz="2700" kern="1200" dirty="0"/>
-        </a:p>
-      </dsp:txBody>
-      <dsp:txXfrm>
-        <a:off x="3091" y="728004"/>
-        <a:ext cx="2654170" cy="1052790"/>
-      </dsp:txXfrm>
-    </dsp:sp>
-    <dsp:sp modelId="{F4CEEAEC-B895-4CEB-B47B-5309E514593F}">
-      <dsp:nvSpPr>
-        <dsp:cNvPr id="0" name=""/>
-        <dsp:cNvSpPr/>
-      </dsp:nvSpPr>
-      <dsp:spPr>
-        <a:xfrm>
-          <a:off x="546717" y="1780795"/>
-          <a:ext cx="2654170" cy="1555200"/>
-        </a:xfrm>
-        <a:prstGeom prst="roundRect">
-          <a:avLst>
-            <a:gd name="adj" fmla="val 10000"/>
-          </a:avLst>
-        </a:prstGeom>
-        <a:solidFill>
-          <a:schemeClr val="lt1">
-            <a:alpha val="90000"/>
-            <a:hueOff val="0"/>
-            <a:satOff val="0"/>
-            <a:lumOff val="0"/>
-            <a:alphaOff val="0"/>
-          </a:schemeClr>
-        </a:solidFill>
-        <a:ln w="25400" cap="flat" cmpd="sng" algn="ctr">
-          <a:solidFill>
-            <a:schemeClr val="tx1">
-              <a:lumMod val="75000"/>
-              <a:lumOff val="25000"/>
-            </a:schemeClr>
-          </a:solidFill>
-          <a:prstDash val="solid"/>
-        </a:ln>
-        <a:effectLst/>
-      </dsp:spPr>
-      <dsp:style>
-        <a:lnRef idx="2">
-          <a:scrgbClr r="0" g="0" b="0"/>
-        </a:lnRef>
-        <a:fillRef idx="1">
-          <a:scrgbClr r="0" g="0" b="0"/>
-        </a:fillRef>
-        <a:effectRef idx="0">
-          <a:scrgbClr r="0" g="0" b="0"/>
-        </a:effectRef>
-        <a:fontRef idx="minor"/>
-      </dsp:style>
-      <dsp:txBody>
-        <a:bodyPr spcFirstLastPara="0" vert="horz" wrap="square" lIns="142240" tIns="142240" rIns="142240" bIns="142240" numCol="1" spcCol="1270" anchor="ctr" anchorCtr="0">
-          <a:noAutofit/>
-        </a:bodyPr>
-        <a:lstStyle/>
-        <a:p>
-          <a:pPr marL="228600" lvl="1" indent="-228600" algn="l" defTabSz="889000">
-            <a:lnSpc>
-              <a:spcPct val="90000"/>
-            </a:lnSpc>
-            <a:spcBef>
-              <a:spcPct val="0"/>
-            </a:spcBef>
-            <a:spcAft>
-              <a:spcPct val="15000"/>
-            </a:spcAft>
-            <a:buChar char="••"/>
-          </a:pPr>
-          <a:r>
-            <a:rPr lang="en-US" sz="2000" kern="1200" dirty="0" smtClean="0">
-              <a:latin typeface="Arial" panose="020B0604020202020204" pitchFamily="34" charset="0"/>
-              <a:cs typeface="Arial" panose="020B0604020202020204" pitchFamily="34" charset="0"/>
-            </a:rPr>
-            <a:t>Assign value</a:t>
-          </a:r>
-          <a:endParaRPr lang="en-US" sz="2000" kern="1200" dirty="0">
-            <a:latin typeface="Arial" panose="020B0604020202020204" pitchFamily="34" charset="0"/>
-            <a:cs typeface="Arial" panose="020B0604020202020204" pitchFamily="34" charset="0"/>
-          </a:endParaRPr>
-        </a:p>
-      </dsp:txBody>
-      <dsp:txXfrm>
-        <a:off x="592267" y="1826345"/>
-        <a:ext cx="2563070" cy="1464100"/>
-      </dsp:txXfrm>
-    </dsp:sp>
-    <dsp:sp modelId="{5668F55E-AEDC-497E-8978-813AC6239A89}">
-      <dsp:nvSpPr>
-        <dsp:cNvPr id="0" name=""/>
-        <dsp:cNvSpPr/>
-      </dsp:nvSpPr>
-      <dsp:spPr>
-        <a:xfrm>
-          <a:off x="3059624" y="923994"/>
-          <a:ext cx="853008" cy="660811"/>
-        </a:xfrm>
-        <a:prstGeom prst="rightArrow">
-          <a:avLst>
-            <a:gd name="adj1" fmla="val 60000"/>
-            <a:gd name="adj2" fmla="val 50000"/>
-          </a:avLst>
-        </a:prstGeom>
-        <a:solidFill>
-          <a:srgbClr val="C00000"/>
-        </a:solidFill>
-        <a:ln>
-          <a:noFill/>
-        </a:ln>
-        <a:effectLst/>
-      </dsp:spPr>
-      <dsp:style>
-        <a:lnRef idx="0">
-          <a:scrgbClr r="0" g="0" b="0"/>
-        </a:lnRef>
-        <a:fillRef idx="1">
-          <a:scrgbClr r="0" g="0" b="0"/>
-        </a:fillRef>
-        <a:effectRef idx="0">
-          <a:scrgbClr r="0" g="0" b="0"/>
-        </a:effectRef>
-        <a:fontRef idx="minor">
-          <a:schemeClr val="lt1"/>
-        </a:fontRef>
-      </dsp:style>
-      <dsp:txBody>
-        <a:bodyPr spcFirstLastPara="0" vert="horz" wrap="square" lIns="0" tIns="0" rIns="0" bIns="0" numCol="1" spcCol="1270" anchor="ctr" anchorCtr="0">
-          <a:noAutofit/>
-        </a:bodyPr>
-        <a:lstStyle/>
-        <a:p>
-          <a:pPr lvl="0" algn="ctr" defTabSz="977900">
-            <a:lnSpc>
-              <a:spcPct val="90000"/>
-            </a:lnSpc>
-            <a:spcBef>
-              <a:spcPct val="0"/>
-            </a:spcBef>
-            <a:spcAft>
-              <a:spcPct val="35000"/>
-            </a:spcAft>
-          </a:pPr>
-          <a:endParaRPr lang="en-US" sz="2200" kern="1200"/>
-        </a:p>
-      </dsp:txBody>
-      <dsp:txXfrm>
-        <a:off x="3059624" y="1056156"/>
-        <a:ext cx="654765" cy="396487"/>
-      </dsp:txXfrm>
-    </dsp:sp>
-    <dsp:sp modelId="{16E1D311-34ED-467B-8B7A-5EC6C7B2DAE7}">
-      <dsp:nvSpPr>
-        <dsp:cNvPr id="0" name=""/>
-        <dsp:cNvSpPr/>
-      </dsp:nvSpPr>
-      <dsp:spPr>
-        <a:xfrm>
-          <a:off x="4266712" y="728004"/>
-          <a:ext cx="2654170" cy="1579186"/>
-        </a:xfrm>
-        <a:prstGeom prst="roundRect">
-          <a:avLst>
-            <a:gd name="adj" fmla="val 10000"/>
-          </a:avLst>
-        </a:prstGeom>
-        <a:solidFill>
-          <a:schemeClr val="tx1">
-            <a:lumMod val="75000"/>
-            <a:lumOff val="25000"/>
-          </a:schemeClr>
-        </a:solidFill>
-        <a:ln w="25400" cap="flat" cmpd="sng" algn="ctr">
-          <a:solidFill>
-            <a:schemeClr val="lt1">
-              <a:hueOff val="0"/>
-              <a:satOff val="0"/>
-              <a:lumOff val="0"/>
-              <a:alphaOff val="0"/>
-            </a:schemeClr>
-          </a:solidFill>
-          <a:prstDash val="solid"/>
-        </a:ln>
-        <a:effectLst/>
-      </dsp:spPr>
-      <dsp:style>
-        <a:lnRef idx="2">
-          <a:scrgbClr r="0" g="0" b="0"/>
-        </a:lnRef>
-        <a:fillRef idx="1">
-          <a:scrgbClr r="0" g="0" b="0"/>
-        </a:fillRef>
-        <a:effectRef idx="0">
-          <a:scrgbClr r="0" g="0" b="0"/>
-        </a:effectRef>
-        <a:fontRef idx="minor">
-          <a:schemeClr val="lt1"/>
-        </a:fontRef>
-      </dsp:style>
-      <dsp:txBody>
-        <a:bodyPr spcFirstLastPara="0" vert="horz" wrap="square" lIns="192024" tIns="192024" rIns="192024" bIns="102870" numCol="1" spcCol="1270" anchor="t" anchorCtr="0">
-          <a:noAutofit/>
-        </a:bodyPr>
-        <a:lstStyle/>
-        <a:p>
-          <a:pPr lvl="0" algn="l" defTabSz="1200150">
-            <a:lnSpc>
-              <a:spcPct val="90000"/>
-            </a:lnSpc>
-            <a:spcBef>
-              <a:spcPct val="0"/>
-            </a:spcBef>
-            <a:spcAft>
-              <a:spcPct val="35000"/>
-            </a:spcAft>
-          </a:pPr>
-          <a:r>
-            <a:rPr lang="en-US" sz="2700" kern="1200" dirty="0" smtClean="0"/>
-            <a:t>Child Component</a:t>
-          </a:r>
-          <a:endParaRPr lang="en-US" sz="2700" kern="1200" dirty="0"/>
-        </a:p>
-      </dsp:txBody>
-      <dsp:txXfrm>
-        <a:off x="4266712" y="728004"/>
-        <a:ext cx="2654170" cy="1052790"/>
-      </dsp:txXfrm>
-    </dsp:sp>
-    <dsp:sp modelId="{2F03AD03-2306-4572-BA39-22F458EFF5E2}">
-      <dsp:nvSpPr>
-        <dsp:cNvPr id="0" name=""/>
-        <dsp:cNvSpPr/>
-      </dsp:nvSpPr>
-      <dsp:spPr>
-        <a:xfrm>
-          <a:off x="4810337" y="1780795"/>
-          <a:ext cx="2654170" cy="1555200"/>
-        </a:xfrm>
-        <a:prstGeom prst="roundRect">
-          <a:avLst>
-            <a:gd name="adj" fmla="val 10000"/>
-          </a:avLst>
-        </a:prstGeom>
-        <a:solidFill>
-          <a:schemeClr val="lt1">
-            <a:alpha val="90000"/>
-            <a:hueOff val="0"/>
-            <a:satOff val="0"/>
-            <a:lumOff val="0"/>
-            <a:alphaOff val="0"/>
-          </a:schemeClr>
-        </a:solidFill>
-        <a:ln w="25400" cap="flat" cmpd="sng" algn="ctr">
-          <a:solidFill>
-            <a:schemeClr val="tx1">
-              <a:lumMod val="75000"/>
-              <a:lumOff val="25000"/>
-            </a:schemeClr>
-          </a:solidFill>
-          <a:prstDash val="solid"/>
-        </a:ln>
-        <a:effectLst/>
-      </dsp:spPr>
-      <dsp:style>
-        <a:lnRef idx="2">
-          <a:scrgbClr r="0" g="0" b="0"/>
-        </a:lnRef>
-        <a:fillRef idx="1">
-          <a:scrgbClr r="0" g="0" b="0"/>
-        </a:fillRef>
-        <a:effectRef idx="0">
-          <a:scrgbClr r="0" g="0" b="0"/>
-        </a:effectRef>
-        <a:fontRef idx="minor"/>
-      </dsp:style>
-      <dsp:txBody>
-        <a:bodyPr spcFirstLastPara="0" vert="horz" wrap="square" lIns="142240" tIns="142240" rIns="142240" bIns="142240" numCol="1" spcCol="1270" anchor="ctr" anchorCtr="0">
-          <a:noAutofit/>
-        </a:bodyPr>
-        <a:lstStyle/>
-        <a:p>
-          <a:pPr marL="228600" lvl="1" indent="-228600" algn="l" defTabSz="889000">
-            <a:lnSpc>
-              <a:spcPct val="90000"/>
-            </a:lnSpc>
-            <a:spcBef>
-              <a:spcPct val="0"/>
-            </a:spcBef>
-            <a:spcAft>
-              <a:spcPct val="15000"/>
-            </a:spcAft>
-            <a:buChar char="••"/>
-          </a:pPr>
-          <a:r>
-            <a:rPr lang="en-US" sz="2000" kern="1200" dirty="0" smtClean="0">
-              <a:latin typeface="Arial" panose="020B0604020202020204" pitchFamily="34" charset="0"/>
-              <a:cs typeface="Arial" panose="020B0604020202020204" pitchFamily="34" charset="0"/>
-            </a:rPr>
-            <a:t>Define </a:t>
-          </a:r>
-          <a:r>
-            <a:rPr lang="en-US" sz="2000" kern="1200" dirty="0" err="1" smtClean="0">
-              <a:latin typeface="Arial" panose="020B0604020202020204" pitchFamily="34" charset="0"/>
-              <a:cs typeface="Arial" panose="020B0604020202020204" pitchFamily="34" charset="0"/>
-            </a:rPr>
-            <a:t>params</a:t>
-          </a:r>
-          <a:r>
-            <a:rPr lang="en-US" sz="2000" kern="1200" dirty="0" smtClean="0">
-              <a:latin typeface="Arial" panose="020B0604020202020204" pitchFamily="34" charset="0"/>
-              <a:cs typeface="Arial" panose="020B0604020202020204" pitchFamily="34" charset="0"/>
-            </a:rPr>
-            <a:t> (string, </a:t>
-          </a:r>
-          <a:r>
-            <a:rPr lang="en-US" sz="2000" kern="1200" dirty="0" err="1" smtClean="0">
-              <a:latin typeface="Arial" panose="020B0604020202020204" pitchFamily="34" charset="0"/>
-              <a:cs typeface="Arial" panose="020B0604020202020204" pitchFamily="34" charset="0"/>
-            </a:rPr>
-            <a:t>func</a:t>
-          </a:r>
-          <a:r>
-            <a:rPr lang="en-US" sz="2000" kern="1200" dirty="0" smtClean="0">
-              <a:latin typeface="Arial" panose="020B0604020202020204" pitchFamily="34" charset="0"/>
-              <a:cs typeface="Arial" panose="020B0604020202020204" pitchFamily="34" charset="0"/>
-            </a:rPr>
-            <a:t>, …)</a:t>
-          </a:r>
-          <a:endParaRPr lang="en-US" sz="2000" kern="1200" dirty="0">
-            <a:latin typeface="Arial" panose="020B0604020202020204" pitchFamily="34" charset="0"/>
-            <a:cs typeface="Arial" panose="020B0604020202020204" pitchFamily="34" charset="0"/>
-          </a:endParaRPr>
-        </a:p>
-        <a:p>
-          <a:pPr marL="228600" lvl="1" indent="-228600" algn="l" defTabSz="889000">
-            <a:lnSpc>
-              <a:spcPct val="90000"/>
-            </a:lnSpc>
-            <a:spcBef>
-              <a:spcPct val="0"/>
-            </a:spcBef>
-            <a:spcAft>
-              <a:spcPct val="15000"/>
-            </a:spcAft>
-            <a:buChar char="••"/>
-          </a:pPr>
-          <a:r>
-            <a:rPr lang="en-US" sz="2000" kern="1200" dirty="0" smtClean="0">
-              <a:latin typeface="Arial" panose="020B0604020202020204" pitchFamily="34" charset="0"/>
-              <a:cs typeface="Arial" panose="020B0604020202020204" pitchFamily="34" charset="0"/>
-            </a:rPr>
-            <a:t>Render View</a:t>
-          </a:r>
-          <a:endParaRPr lang="en-US" sz="2000" kern="1200" dirty="0">
-            <a:latin typeface="Arial" panose="020B0604020202020204" pitchFamily="34" charset="0"/>
-            <a:cs typeface="Arial" panose="020B0604020202020204" pitchFamily="34" charset="0"/>
-          </a:endParaRPr>
-        </a:p>
-      </dsp:txBody>
-      <dsp:txXfrm>
-        <a:off x="4855887" y="1826345"/>
-        <a:ext cx="2563070" cy="1464100"/>
-      </dsp:txXfrm>
-    </dsp:sp>
   </dsp:spTree>
 </dsp:drawing>
 </file>
@@ -4492,539 +5017,18 @@
       <dsp:cNvGrpSpPr/>
     </dsp:nvGrpSpPr>
     <dsp:grpSpPr/>
-    <dsp:sp modelId="{F8D57ACA-2F5D-49D1-AE7B-8F5FE9F94EF0}">
-      <dsp:nvSpPr>
-        <dsp:cNvPr id="0" name=""/>
-        <dsp:cNvSpPr/>
-      </dsp:nvSpPr>
-      <dsp:spPr>
-        <a:xfrm>
-          <a:off x="958" y="717816"/>
-          <a:ext cx="3487415" cy="1743707"/>
-        </a:xfrm>
-        <a:prstGeom prst="roundRect">
-          <a:avLst>
-            <a:gd name="adj" fmla="val 10000"/>
-          </a:avLst>
-        </a:prstGeom>
-        <a:solidFill>
-          <a:schemeClr val="tx1">
-            <a:lumMod val="75000"/>
-            <a:lumOff val="25000"/>
-          </a:schemeClr>
-        </a:solidFill>
-        <a:ln w="25400" cap="flat" cmpd="sng" algn="ctr">
-          <a:solidFill>
-            <a:schemeClr val="lt1">
-              <a:hueOff val="0"/>
-              <a:satOff val="0"/>
-              <a:lumOff val="0"/>
-              <a:alphaOff val="0"/>
-            </a:schemeClr>
-          </a:solidFill>
-          <a:prstDash val="solid"/>
-        </a:ln>
-        <a:effectLst/>
-      </dsp:spPr>
-      <dsp:style>
-        <a:lnRef idx="2">
-          <a:scrgbClr r="0" g="0" b="0"/>
-        </a:lnRef>
-        <a:fillRef idx="1">
-          <a:scrgbClr r="0" g="0" b="0"/>
-        </a:fillRef>
-        <a:effectRef idx="0">
-          <a:scrgbClr r="0" g="0" b="0"/>
-        </a:effectRef>
-        <a:fontRef idx="minor">
-          <a:schemeClr val="lt1"/>
-        </a:fontRef>
-      </dsp:style>
-      <dsp:txBody>
-        <a:bodyPr spcFirstLastPara="0" vert="horz" wrap="square" lIns="45720" tIns="30480" rIns="45720" bIns="30480" numCol="1" spcCol="1270" anchor="ctr" anchorCtr="0">
-          <a:noAutofit/>
-        </a:bodyPr>
-        <a:lstStyle/>
-        <a:p>
-          <a:pPr lvl="0" algn="ctr" defTabSz="1066800">
-            <a:lnSpc>
-              <a:spcPct val="90000"/>
-            </a:lnSpc>
-            <a:spcBef>
-              <a:spcPct val="0"/>
-            </a:spcBef>
-            <a:spcAft>
-              <a:spcPct val="35000"/>
-            </a:spcAft>
-          </a:pPr>
-          <a:r>
-            <a:rPr lang="en-US" sz="2400" kern="1200" dirty="0" smtClean="0">
-              <a:latin typeface="Arial" panose="020B0604020202020204" pitchFamily="34" charset="0"/>
-              <a:cs typeface="Arial" panose="020B0604020202020204" pitchFamily="34" charset="0"/>
-            </a:rPr>
-            <a:t>Export </a:t>
-          </a:r>
-          <a:r>
-            <a:rPr lang="en-US" sz="2400" b="1" kern="1200" dirty="0" smtClean="0">
-              <a:solidFill>
-                <a:srgbClr val="FFFF00"/>
-              </a:solidFill>
-              <a:latin typeface="Arial" panose="020B0604020202020204" pitchFamily="34" charset="0"/>
-              <a:cs typeface="Arial" panose="020B0604020202020204" pitchFamily="34" charset="0"/>
-            </a:rPr>
-            <a:t>default</a:t>
-          </a:r>
-          <a:r>
-            <a:rPr lang="en-US" sz="2400" kern="1200" dirty="0" smtClean="0">
-              <a:latin typeface="Arial" panose="020B0604020202020204" pitchFamily="34" charset="0"/>
-              <a:cs typeface="Arial" panose="020B0604020202020204" pitchFamily="34" charset="0"/>
-            </a:rPr>
-            <a:t> class </a:t>
-          </a:r>
-          <a:r>
-            <a:rPr lang="en-US" sz="2400" kern="1200" dirty="0" err="1" smtClean="0">
-              <a:latin typeface="Arial" panose="020B0604020202020204" pitchFamily="34" charset="0"/>
-              <a:cs typeface="Arial" panose="020B0604020202020204" pitchFamily="34" charset="0"/>
-            </a:rPr>
-            <a:t>ClassName</a:t>
-          </a:r>
-          <a:endParaRPr lang="en-US" sz="2400" kern="1200" dirty="0">
-            <a:latin typeface="Arial" panose="020B0604020202020204" pitchFamily="34" charset="0"/>
-            <a:cs typeface="Arial" panose="020B0604020202020204" pitchFamily="34" charset="0"/>
-          </a:endParaRPr>
-        </a:p>
-      </dsp:txBody>
-      <dsp:txXfrm>
-        <a:off x="52029" y="768887"/>
-        <a:ext cx="3385273" cy="1641565"/>
-      </dsp:txXfrm>
-    </dsp:sp>
-    <dsp:sp modelId="{479DDB34-2941-4C36-95A1-D4BF9A0567B7}">
-      <dsp:nvSpPr>
-        <dsp:cNvPr id="0" name=""/>
-        <dsp:cNvSpPr/>
-      </dsp:nvSpPr>
-      <dsp:spPr>
-        <a:xfrm>
-          <a:off x="349699" y="2461524"/>
-          <a:ext cx="348741" cy="939692"/>
-        </a:xfrm>
-        <a:custGeom>
-          <a:avLst/>
-          <a:gdLst/>
-          <a:ahLst/>
-          <a:cxnLst/>
-          <a:rect l="0" t="0" r="0" b="0"/>
-          <a:pathLst>
-            <a:path>
-              <a:moveTo>
-                <a:pt x="0" y="0"/>
-              </a:moveTo>
-              <a:lnTo>
-                <a:pt x="0" y="939692"/>
-              </a:lnTo>
-              <a:lnTo>
-                <a:pt x="348741" y="939692"/>
-              </a:lnTo>
-            </a:path>
-          </a:pathLst>
-        </a:custGeom>
-        <a:noFill/>
-        <a:ln w="25400" cap="flat" cmpd="sng" algn="ctr">
-          <a:solidFill>
-            <a:srgbClr val="C00000"/>
-          </a:solidFill>
-          <a:prstDash val="solid"/>
-        </a:ln>
-        <a:effectLst/>
-      </dsp:spPr>
-      <dsp:style>
-        <a:lnRef idx="2">
-          <a:scrgbClr r="0" g="0" b="0"/>
-        </a:lnRef>
-        <a:fillRef idx="0">
-          <a:scrgbClr r="0" g="0" b="0"/>
-        </a:fillRef>
-        <a:effectRef idx="0">
-          <a:scrgbClr r="0" g="0" b="0"/>
-        </a:effectRef>
-        <a:fontRef idx="minor"/>
-      </dsp:style>
-    </dsp:sp>
-    <dsp:sp modelId="{8989EA6E-529A-4656-BCAF-E6BACCC73738}">
-      <dsp:nvSpPr>
-        <dsp:cNvPr id="0" name=""/>
-        <dsp:cNvSpPr/>
-      </dsp:nvSpPr>
-      <dsp:spPr>
-        <a:xfrm>
-          <a:off x="698441" y="2897451"/>
-          <a:ext cx="2683886" cy="1007531"/>
-        </a:xfrm>
-        <a:prstGeom prst="roundRect">
-          <a:avLst>
-            <a:gd name="adj" fmla="val 10000"/>
-          </a:avLst>
-        </a:prstGeom>
-        <a:solidFill>
-          <a:schemeClr val="tx1">
-            <a:lumMod val="75000"/>
-            <a:lumOff val="25000"/>
-            <a:alpha val="90000"/>
-          </a:schemeClr>
-        </a:solidFill>
-        <a:ln w="25400" cap="flat" cmpd="sng" algn="ctr">
-          <a:solidFill>
-            <a:schemeClr val="tx1">
-              <a:lumMod val="75000"/>
-              <a:lumOff val="25000"/>
-            </a:schemeClr>
-          </a:solidFill>
-          <a:prstDash val="solid"/>
-        </a:ln>
-        <a:effectLst/>
-      </dsp:spPr>
-      <dsp:style>
-        <a:lnRef idx="2">
-          <a:scrgbClr r="0" g="0" b="0"/>
-        </a:lnRef>
-        <a:fillRef idx="1">
-          <a:scrgbClr r="0" g="0" b="0"/>
-        </a:fillRef>
-        <a:effectRef idx="0">
-          <a:scrgbClr r="0" g="0" b="0"/>
-        </a:effectRef>
-        <a:fontRef idx="minor"/>
-      </dsp:style>
-      <dsp:txBody>
-        <a:bodyPr spcFirstLastPara="0" vert="horz" wrap="square" lIns="34290" tIns="22860" rIns="34290" bIns="22860" numCol="1" spcCol="1270" anchor="ctr" anchorCtr="0">
-          <a:noAutofit/>
-        </a:bodyPr>
-        <a:lstStyle/>
-        <a:p>
-          <a:pPr lvl="0" algn="ctr" defTabSz="800100">
-            <a:lnSpc>
-              <a:spcPct val="90000"/>
-            </a:lnSpc>
-            <a:spcBef>
-              <a:spcPct val="0"/>
-            </a:spcBef>
-            <a:spcAft>
-              <a:spcPct val="35000"/>
-            </a:spcAft>
-          </a:pPr>
-          <a:r>
-            <a:rPr lang="en-US" sz="1800" kern="1200" dirty="0" smtClean="0">
-              <a:solidFill>
-                <a:schemeClr val="bg1"/>
-              </a:solidFill>
-              <a:latin typeface="Arial" panose="020B0604020202020204" pitchFamily="34" charset="0"/>
-              <a:cs typeface="Arial" panose="020B0604020202020204" pitchFamily="34" charset="0"/>
-            </a:rPr>
-            <a:t>Import </a:t>
-          </a:r>
-          <a:r>
-            <a:rPr lang="en-US" sz="1800" kern="1200" dirty="0" err="1" smtClean="0">
-              <a:solidFill>
-                <a:schemeClr val="bg1"/>
-              </a:solidFill>
-              <a:latin typeface="Arial" panose="020B0604020202020204" pitchFamily="34" charset="0"/>
-              <a:cs typeface="Arial" panose="020B0604020202020204" pitchFamily="34" charset="0"/>
-            </a:rPr>
-            <a:t>ClassName</a:t>
-          </a:r>
-          <a:endParaRPr lang="en-US" sz="1800" kern="1200" dirty="0">
-            <a:solidFill>
-              <a:schemeClr val="bg1"/>
-            </a:solidFill>
-            <a:latin typeface="Arial" panose="020B0604020202020204" pitchFamily="34" charset="0"/>
-            <a:cs typeface="Arial" panose="020B0604020202020204" pitchFamily="34" charset="0"/>
-          </a:endParaRPr>
-        </a:p>
-      </dsp:txBody>
-      <dsp:txXfrm>
-        <a:off x="727951" y="2926961"/>
-        <a:ext cx="2624866" cy="948511"/>
-      </dsp:txXfrm>
-    </dsp:sp>
-    <dsp:sp modelId="{5074D994-86C5-44F9-A7AB-F07C02845B1D}">
-      <dsp:nvSpPr>
-        <dsp:cNvPr id="0" name=""/>
-        <dsp:cNvSpPr/>
-      </dsp:nvSpPr>
-      <dsp:spPr>
-        <a:xfrm>
-          <a:off x="4361184" y="762002"/>
-          <a:ext cx="3487415" cy="1743707"/>
-        </a:xfrm>
-        <a:prstGeom prst="roundRect">
-          <a:avLst>
-            <a:gd name="adj" fmla="val 10000"/>
-          </a:avLst>
-        </a:prstGeom>
-        <a:solidFill>
-          <a:schemeClr val="tx1">
-            <a:lumMod val="75000"/>
-            <a:lumOff val="25000"/>
-          </a:schemeClr>
-        </a:solidFill>
-        <a:ln w="25400" cap="flat" cmpd="sng" algn="ctr">
-          <a:solidFill>
-            <a:schemeClr val="lt1">
-              <a:hueOff val="0"/>
-              <a:satOff val="0"/>
-              <a:lumOff val="0"/>
-              <a:alphaOff val="0"/>
-            </a:schemeClr>
-          </a:solidFill>
-          <a:prstDash val="solid"/>
-        </a:ln>
-        <a:effectLst/>
-      </dsp:spPr>
-      <dsp:style>
-        <a:lnRef idx="2">
-          <a:scrgbClr r="0" g="0" b="0"/>
-        </a:lnRef>
-        <a:fillRef idx="1">
-          <a:scrgbClr r="0" g="0" b="0"/>
-        </a:fillRef>
-        <a:effectRef idx="0">
-          <a:scrgbClr r="0" g="0" b="0"/>
-        </a:effectRef>
-        <a:fontRef idx="minor">
-          <a:schemeClr val="lt1"/>
-        </a:fontRef>
-      </dsp:style>
-      <dsp:txBody>
-        <a:bodyPr spcFirstLastPara="0" vert="horz" wrap="square" lIns="45720" tIns="30480" rIns="45720" bIns="30480" numCol="1" spcCol="1270" anchor="ctr" anchorCtr="0">
-          <a:noAutofit/>
-        </a:bodyPr>
-        <a:lstStyle/>
-        <a:p>
-          <a:pPr lvl="0" algn="ctr" defTabSz="1066800">
-            <a:lnSpc>
-              <a:spcPct val="90000"/>
-            </a:lnSpc>
-            <a:spcBef>
-              <a:spcPct val="0"/>
-            </a:spcBef>
-            <a:spcAft>
-              <a:spcPct val="35000"/>
-            </a:spcAft>
-          </a:pPr>
-          <a:r>
-            <a:rPr lang="en-US" sz="2400" kern="1200" dirty="0" smtClean="0">
-              <a:latin typeface="Arial" panose="020B0604020202020204" pitchFamily="34" charset="0"/>
-              <a:cs typeface="Arial" panose="020B0604020202020204" pitchFamily="34" charset="0"/>
-            </a:rPr>
-            <a:t>Export class </a:t>
-          </a:r>
-          <a:r>
-            <a:rPr lang="en-US" sz="2400" kern="1200" dirty="0" err="1" smtClean="0">
-              <a:latin typeface="Arial" panose="020B0604020202020204" pitchFamily="34" charset="0"/>
-              <a:cs typeface="Arial" panose="020B0604020202020204" pitchFamily="34" charset="0"/>
-            </a:rPr>
-            <a:t>ClassName</a:t>
-          </a:r>
-          <a:endParaRPr lang="en-US" sz="2400" kern="1200" dirty="0">
-            <a:latin typeface="Arial" panose="020B0604020202020204" pitchFamily="34" charset="0"/>
-            <a:cs typeface="Arial" panose="020B0604020202020204" pitchFamily="34" charset="0"/>
-          </a:endParaRPr>
-        </a:p>
-      </dsp:txBody>
-      <dsp:txXfrm>
-        <a:off x="4412255" y="813073"/>
-        <a:ext cx="3385273" cy="1641565"/>
-      </dsp:txXfrm>
-    </dsp:sp>
-    <dsp:sp modelId="{409F2B00-78E3-4896-9E24-21CD021CE403}">
-      <dsp:nvSpPr>
-        <dsp:cNvPr id="0" name=""/>
-        <dsp:cNvSpPr/>
-      </dsp:nvSpPr>
-      <dsp:spPr>
-        <a:xfrm>
-          <a:off x="4709926" y="2505710"/>
-          <a:ext cx="347783" cy="895507"/>
-        </a:xfrm>
-        <a:custGeom>
-          <a:avLst/>
-          <a:gdLst/>
-          <a:ahLst/>
-          <a:cxnLst/>
-          <a:rect l="0" t="0" r="0" b="0"/>
-          <a:pathLst>
-            <a:path>
-              <a:moveTo>
-                <a:pt x="0" y="0"/>
-              </a:moveTo>
-              <a:lnTo>
-                <a:pt x="0" y="895507"/>
-              </a:lnTo>
-              <a:lnTo>
-                <a:pt x="347783" y="895507"/>
-              </a:lnTo>
-            </a:path>
-          </a:pathLst>
-        </a:custGeom>
-        <a:noFill/>
-        <a:ln w="25400" cap="flat" cmpd="sng" algn="ctr">
-          <a:solidFill>
-            <a:srgbClr val="C00000"/>
-          </a:solidFill>
-          <a:prstDash val="solid"/>
-        </a:ln>
-        <a:effectLst/>
-      </dsp:spPr>
-      <dsp:style>
-        <a:lnRef idx="2">
-          <a:scrgbClr r="0" g="0" b="0"/>
-        </a:lnRef>
-        <a:fillRef idx="0">
-          <a:scrgbClr r="0" g="0" b="0"/>
-        </a:fillRef>
-        <a:effectRef idx="0">
-          <a:scrgbClr r="0" g="0" b="0"/>
-        </a:effectRef>
-        <a:fontRef idx="minor"/>
-      </dsp:style>
-    </dsp:sp>
-    <dsp:sp modelId="{B5C3A1FE-3272-4138-87DA-E815315C7BA6}">
-      <dsp:nvSpPr>
-        <dsp:cNvPr id="0" name=""/>
-        <dsp:cNvSpPr/>
-      </dsp:nvSpPr>
-      <dsp:spPr>
-        <a:xfrm>
-          <a:off x="5057709" y="2897451"/>
-          <a:ext cx="2677553" cy="1007531"/>
-        </a:xfrm>
-        <a:prstGeom prst="roundRect">
-          <a:avLst>
-            <a:gd name="adj" fmla="val 10000"/>
-          </a:avLst>
-        </a:prstGeom>
-        <a:solidFill>
-          <a:schemeClr val="tx1">
-            <a:lumMod val="75000"/>
-            <a:lumOff val="25000"/>
-            <a:alpha val="90000"/>
-          </a:schemeClr>
-        </a:solidFill>
-        <a:ln w="25400" cap="flat" cmpd="sng" algn="ctr">
-          <a:solidFill>
-            <a:schemeClr val="tx1">
-              <a:lumMod val="75000"/>
-              <a:lumOff val="25000"/>
-            </a:schemeClr>
-          </a:solidFill>
-          <a:prstDash val="solid"/>
-        </a:ln>
-        <a:effectLst/>
-      </dsp:spPr>
-      <dsp:style>
-        <a:lnRef idx="2">
-          <a:scrgbClr r="0" g="0" b="0"/>
-        </a:lnRef>
-        <a:fillRef idx="1">
-          <a:scrgbClr r="0" g="0" b="0"/>
-        </a:fillRef>
-        <a:effectRef idx="0">
-          <a:scrgbClr r="0" g="0" b="0"/>
-        </a:effectRef>
-        <a:fontRef idx="minor"/>
-      </dsp:style>
-      <dsp:txBody>
-        <a:bodyPr spcFirstLastPara="0" vert="horz" wrap="square" lIns="34290" tIns="22860" rIns="34290" bIns="22860" numCol="1" spcCol="1270" anchor="ctr" anchorCtr="0">
-          <a:noAutofit/>
-        </a:bodyPr>
-        <a:lstStyle/>
-        <a:p>
-          <a:pPr lvl="0" algn="ctr" defTabSz="800100">
-            <a:lnSpc>
-              <a:spcPct val="90000"/>
-            </a:lnSpc>
-            <a:spcBef>
-              <a:spcPct val="0"/>
-            </a:spcBef>
-            <a:spcAft>
-              <a:spcPct val="35000"/>
-            </a:spcAft>
-          </a:pPr>
-          <a:r>
-            <a:rPr lang="en-US" sz="1800" kern="1200" dirty="0" smtClean="0">
-              <a:solidFill>
-                <a:schemeClr val="bg1"/>
-              </a:solidFill>
-              <a:latin typeface="Arial" panose="020B0604020202020204" pitchFamily="34" charset="0"/>
-              <a:cs typeface="Arial" panose="020B0604020202020204" pitchFamily="34" charset="0"/>
-            </a:rPr>
-            <a:t>Import </a:t>
-          </a:r>
-          <a:r>
-            <a:rPr lang="en-US" sz="1800" b="1" kern="1200" dirty="0" smtClean="0">
-              <a:solidFill>
-                <a:srgbClr val="FFFF00"/>
-              </a:solidFill>
-              <a:latin typeface="Arial" panose="020B0604020202020204" pitchFamily="34" charset="0"/>
-              <a:cs typeface="Arial" panose="020B0604020202020204" pitchFamily="34" charset="0"/>
-            </a:rPr>
-            <a:t>{</a:t>
-          </a:r>
-          <a:r>
-            <a:rPr lang="en-US" sz="1800" kern="1200" dirty="0" smtClean="0">
-              <a:solidFill>
-                <a:schemeClr val="bg1"/>
-              </a:solidFill>
-              <a:latin typeface="Arial" panose="020B0604020202020204" pitchFamily="34" charset="0"/>
-              <a:cs typeface="Arial" panose="020B0604020202020204" pitchFamily="34" charset="0"/>
-            </a:rPr>
-            <a:t> </a:t>
-          </a:r>
-          <a:r>
-            <a:rPr lang="en-US" sz="1800" kern="1200" dirty="0" err="1" smtClean="0">
-              <a:solidFill>
-                <a:schemeClr val="bg1"/>
-              </a:solidFill>
-              <a:latin typeface="Arial" panose="020B0604020202020204" pitchFamily="34" charset="0"/>
-              <a:cs typeface="Arial" panose="020B0604020202020204" pitchFamily="34" charset="0"/>
-            </a:rPr>
-            <a:t>ClassName</a:t>
-          </a:r>
-          <a:r>
-            <a:rPr lang="en-US" sz="1800" kern="1200" dirty="0" smtClean="0">
-              <a:solidFill>
-                <a:schemeClr val="bg1"/>
-              </a:solidFill>
-              <a:latin typeface="Arial" panose="020B0604020202020204" pitchFamily="34" charset="0"/>
-              <a:cs typeface="Arial" panose="020B0604020202020204" pitchFamily="34" charset="0"/>
-            </a:rPr>
-            <a:t> </a:t>
-          </a:r>
-          <a:r>
-            <a:rPr lang="en-US" sz="1800" b="1" kern="1200" dirty="0" smtClean="0">
-              <a:solidFill>
-                <a:srgbClr val="FFFF00"/>
-              </a:solidFill>
-              <a:latin typeface="Arial" panose="020B0604020202020204" pitchFamily="34" charset="0"/>
-              <a:cs typeface="Arial" panose="020B0604020202020204" pitchFamily="34" charset="0"/>
-            </a:rPr>
-            <a:t>}</a:t>
-          </a:r>
-          <a:endParaRPr lang="en-US" sz="1800" b="1" kern="1200" dirty="0">
-            <a:solidFill>
-              <a:srgbClr val="FFFF00"/>
-            </a:solidFill>
-            <a:latin typeface="Arial" panose="020B0604020202020204" pitchFamily="34" charset="0"/>
-            <a:cs typeface="Arial" panose="020B0604020202020204" pitchFamily="34" charset="0"/>
-          </a:endParaRPr>
-        </a:p>
-      </dsp:txBody>
-      <dsp:txXfrm>
-        <a:off x="5087219" y="2926961"/>
-        <a:ext cx="2618533" cy="948511"/>
-      </dsp:txXfrm>
-    </dsp:sp>
+  </dsp:spTree>
+</dsp:drawing>
+</file>
+
+<file path=ppt/diagrams/drawing4.xml><?xml version="1.0" encoding="utf-8"?>
+<dsp:drawing xmlns:dgm="http://schemas.openxmlformats.org/drawingml/2006/diagram" xmlns:dsp="http://schemas.microsoft.com/office/drawing/2008/diagram" xmlns:a="http://schemas.openxmlformats.org/drawingml/2006/main">
+  <dsp:spTree>
+    <dsp:nvGrpSpPr>
+      <dsp:cNvPr id="0" name=""/>
+      <dsp:cNvGrpSpPr/>
+    </dsp:nvGrpSpPr>
+    <dsp:grpSpPr/>
   </dsp:spTree>
 </dsp:drawing>
 </file>
@@ -7698,6 +7702,239 @@
 </dgm:layoutDef>
 </file>
 
+<file path=ppt/diagrams/layout4.xml><?xml version="1.0" encoding="utf-8"?>
+<dgm:layoutDef xmlns:dgm="http://schemas.openxmlformats.org/drawingml/2006/diagram" xmlns:a="http://schemas.openxmlformats.org/drawingml/2006/main" uniqueId="urn:microsoft.com/office/officeart/2005/8/layout/vList5">
+  <dgm:title val=""/>
+  <dgm:desc val=""/>
+  <dgm:catLst>
+    <dgm:cat type="list" pri="15000"/>
+    <dgm:cat type="convert" pri="2000"/>
+  </dgm:catLst>
+  <dgm:sampData>
+    <dgm:dataModel>
+      <dgm:ptLst>
+        <dgm:pt modelId="0" type="doc"/>
+        <dgm:pt modelId="1">
+          <dgm:prSet phldr="1"/>
+        </dgm:pt>
+        <dgm:pt modelId="11">
+          <dgm:prSet phldr="1"/>
+        </dgm:pt>
+        <dgm:pt modelId="12">
+          <dgm:prSet phldr="1"/>
+        </dgm:pt>
+        <dgm:pt modelId="2">
+          <dgm:prSet phldr="1"/>
+        </dgm:pt>
+        <dgm:pt modelId="21">
+          <dgm:prSet phldr="1"/>
+        </dgm:pt>
+        <dgm:pt modelId="22">
+          <dgm:prSet phldr="1"/>
+        </dgm:pt>
+        <dgm:pt modelId="3">
+          <dgm:prSet phldr="1"/>
+        </dgm:pt>
+        <dgm:pt modelId="31">
+          <dgm:prSet phldr="1"/>
+        </dgm:pt>
+        <dgm:pt modelId="32">
+          <dgm:prSet phldr="1"/>
+        </dgm:pt>
+      </dgm:ptLst>
+      <dgm:cxnLst>
+        <dgm:cxn modelId="4" srcId="0" destId="1" srcOrd="0" destOrd="0"/>
+        <dgm:cxn modelId="5" srcId="0" destId="2" srcOrd="1" destOrd="0"/>
+        <dgm:cxn modelId="6" srcId="0" destId="3" srcOrd="2" destOrd="0"/>
+        <dgm:cxn modelId="13" srcId="1" destId="11" srcOrd="0" destOrd="0"/>
+        <dgm:cxn modelId="14" srcId="1" destId="12" srcOrd="1" destOrd="0"/>
+        <dgm:cxn modelId="23" srcId="2" destId="21" srcOrd="0" destOrd="0"/>
+        <dgm:cxn modelId="24" srcId="2" destId="22" srcOrd="1" destOrd="0"/>
+        <dgm:cxn modelId="33" srcId="3" destId="31" srcOrd="0" destOrd="0"/>
+        <dgm:cxn modelId="34" srcId="3" destId="32" srcOrd="1" destOrd="0"/>
+      </dgm:cxnLst>
+      <dgm:bg/>
+      <dgm:whole/>
+    </dgm:dataModel>
+  </dgm:sampData>
+  <dgm:styleData>
+    <dgm:dataModel>
+      <dgm:ptLst>
+        <dgm:pt modelId="0" type="doc"/>
+        <dgm:pt modelId="1"/>
+        <dgm:pt modelId="11"/>
+        <dgm:pt modelId="2"/>
+        <dgm:pt modelId="21"/>
+      </dgm:ptLst>
+      <dgm:cxnLst>
+        <dgm:cxn modelId="4" srcId="0" destId="1" srcOrd="0" destOrd="0"/>
+        <dgm:cxn modelId="5" srcId="0" destId="2" srcOrd="1" destOrd="0"/>
+        <dgm:cxn modelId="13" srcId="1" destId="11" srcOrd="0" destOrd="0"/>
+        <dgm:cxn modelId="23" srcId="2" destId="21" srcOrd="0" destOrd="0"/>
+      </dgm:cxnLst>
+      <dgm:bg/>
+      <dgm:whole/>
+    </dgm:dataModel>
+  </dgm:styleData>
+  <dgm:clrData>
+    <dgm:dataModel>
+      <dgm:ptLst>
+        <dgm:pt modelId="0" type="doc"/>
+        <dgm:pt modelId="1"/>
+        <dgm:pt modelId="11"/>
+        <dgm:pt modelId="2"/>
+        <dgm:pt modelId="21"/>
+        <dgm:pt modelId="3"/>
+        <dgm:pt modelId="31"/>
+        <dgm:pt modelId="4"/>
+        <dgm:pt modelId="41"/>
+      </dgm:ptLst>
+      <dgm:cxnLst>
+        <dgm:cxn modelId="5" srcId="0" destId="1" srcOrd="0" destOrd="0"/>
+        <dgm:cxn modelId="6" srcId="0" destId="2" srcOrd="1" destOrd="0"/>
+        <dgm:cxn modelId="7" srcId="0" destId="3" srcOrd="2" destOrd="0"/>
+        <dgm:cxn modelId="8" srcId="0" destId="4" srcOrd="3" destOrd="0"/>
+        <dgm:cxn modelId="13" srcId="1" destId="11" srcOrd="0" destOrd="0"/>
+        <dgm:cxn modelId="23" srcId="2" destId="21" srcOrd="0" destOrd="0"/>
+        <dgm:cxn modelId="33" srcId="3" destId="31" srcOrd="0" destOrd="0"/>
+        <dgm:cxn modelId="43" srcId="4" destId="41" srcOrd="0" destOrd="0"/>
+      </dgm:cxnLst>
+      <dgm:bg/>
+      <dgm:whole/>
+    </dgm:dataModel>
+  </dgm:clrData>
+  <dgm:layoutNode name="Name0">
+    <dgm:varLst>
+      <dgm:dir/>
+      <dgm:animLvl val="lvl"/>
+      <dgm:resizeHandles val="exact"/>
+    </dgm:varLst>
+    <dgm:choose name="Name1">
+      <dgm:if name="Name2" func="var" arg="dir" op="equ" val="norm">
+        <dgm:alg type="lin">
+          <dgm:param type="linDir" val="fromT"/>
+          <dgm:param type="nodeHorzAlign" val="l"/>
+        </dgm:alg>
+      </dgm:if>
+      <dgm:else name="Name3">
+        <dgm:alg type="lin">
+          <dgm:param type="linDir" val="fromT"/>
+          <dgm:param type="nodeHorzAlign" val="r"/>
+        </dgm:alg>
+      </dgm:else>
+    </dgm:choose>
+    <dgm:shape xmlns:r="http://schemas.openxmlformats.org/officeDocument/2006/relationships" r:blip="">
+      <dgm:adjLst/>
+    </dgm:shape>
+    <dgm:presOf/>
+    <dgm:constrLst>
+      <dgm:constr type="h" for="ch" forName="linNode" refType="h"/>
+      <dgm:constr type="w" for="ch" forName="linNode" refType="w"/>
+      <dgm:constr type="h" for="ch" forName="sp" refType="h" fact="0.05"/>
+      <dgm:constr type="primFontSz" for="des" forName="parentText" op="equ" val="65"/>
+      <dgm:constr type="secFontSz" for="des" forName="descendantText" op="equ"/>
+    </dgm:constrLst>
+    <dgm:ruleLst/>
+    <dgm:forEach name="Name4" axis="ch" ptType="node">
+      <dgm:layoutNode name="linNode">
+        <dgm:choose name="Name5">
+          <dgm:if name="Name6" func="var" arg="dir" op="equ" val="norm">
+            <dgm:alg type="lin">
+              <dgm:param type="linDir" val="fromL"/>
+            </dgm:alg>
+          </dgm:if>
+          <dgm:else name="Name7">
+            <dgm:alg type="lin">
+              <dgm:param type="linDir" val="fromR"/>
+            </dgm:alg>
+          </dgm:else>
+        </dgm:choose>
+        <dgm:shape xmlns:r="http://schemas.openxmlformats.org/officeDocument/2006/relationships" r:blip="">
+          <dgm:adjLst/>
+        </dgm:shape>
+        <dgm:presOf/>
+        <dgm:constrLst>
+          <dgm:constr type="w" for="ch" forName="parentText" refType="w" fact="0.36"/>
+          <dgm:constr type="w" for="ch" forName="descendantText" refType="w" fact="0.64"/>
+          <dgm:constr type="h" for="ch" forName="parentText" refType="h"/>
+          <dgm:constr type="h" for="ch" forName="descendantText" refType="h" refFor="ch" refForName="parentText" fact="0.8"/>
+        </dgm:constrLst>
+        <dgm:ruleLst/>
+        <dgm:layoutNode name="parentText">
+          <dgm:varLst>
+            <dgm:chMax val="1"/>
+            <dgm:bulletEnabled val="1"/>
+          </dgm:varLst>
+          <dgm:alg type="tx"/>
+          <dgm:shape xmlns:r="http://schemas.openxmlformats.org/officeDocument/2006/relationships" type="roundRect" r:blip="" zOrderOff="3">
+            <dgm:adjLst/>
+          </dgm:shape>
+          <dgm:presOf axis="self" ptType="node"/>
+          <dgm:constrLst>
+            <dgm:constr type="tMarg" refType="primFontSz" fact="0.15"/>
+            <dgm:constr type="bMarg" refType="primFontSz" fact="0.15"/>
+            <dgm:constr type="lMarg" refType="primFontSz" fact="0.3"/>
+            <dgm:constr type="rMarg" refType="primFontSz" fact="0.3"/>
+          </dgm:constrLst>
+          <dgm:ruleLst>
+            <dgm:rule type="primFontSz" val="5" fact="NaN" max="NaN"/>
+          </dgm:ruleLst>
+        </dgm:layoutNode>
+        <dgm:choose name="Name8">
+          <dgm:if name="Name9" axis="ch" ptType="node" func="cnt" op="gte" val="1">
+            <dgm:layoutNode name="descendantText" styleLbl="alignAccFollowNode1">
+              <dgm:varLst>
+                <dgm:bulletEnabled val="1"/>
+              </dgm:varLst>
+              <dgm:alg type="tx">
+                <dgm:param type="stBulletLvl" val="1"/>
+                <dgm:param type="txAnchorVertCh" val="mid"/>
+              </dgm:alg>
+              <dgm:choose name="Name10">
+                <dgm:if name="Name11" func="var" arg="dir" op="equ" val="norm">
+                  <dgm:shape xmlns:r="http://schemas.openxmlformats.org/officeDocument/2006/relationships" rot="90" type="round2SameRect" r:blip="">
+                    <dgm:adjLst/>
+                  </dgm:shape>
+                </dgm:if>
+                <dgm:else name="Name12">
+                  <dgm:shape xmlns:r="http://schemas.openxmlformats.org/officeDocument/2006/relationships" rot="-90" type="round2SameRect" r:blip="">
+                    <dgm:adjLst/>
+                  </dgm:shape>
+                </dgm:else>
+              </dgm:choose>
+              <dgm:presOf axis="des" ptType="node"/>
+              <dgm:constrLst>
+                <dgm:constr type="secFontSz" val="65"/>
+                <dgm:constr type="primFontSz" refType="secFontSz"/>
+                <dgm:constr type="lMarg" refType="secFontSz" fact="0.3"/>
+                <dgm:constr type="rMarg" refType="secFontSz" fact="0.3"/>
+                <dgm:constr type="tMarg" refType="secFontSz" fact="0.15"/>
+                <dgm:constr type="bMarg" refType="secFontSz" fact="0.15"/>
+              </dgm:constrLst>
+              <dgm:ruleLst>
+                <dgm:rule type="secFontSz" val="5" fact="NaN" max="NaN"/>
+              </dgm:ruleLst>
+            </dgm:layoutNode>
+          </dgm:if>
+          <dgm:else name="Name13"/>
+        </dgm:choose>
+      </dgm:layoutNode>
+      <dgm:forEach name="Name14" axis="followSib" ptType="sibTrans" cnt="1">
+        <dgm:layoutNode name="sp">
+          <dgm:alg type="sp"/>
+          <dgm:shape xmlns:r="http://schemas.openxmlformats.org/officeDocument/2006/relationships" r:blip="">
+            <dgm:adjLst/>
+          </dgm:shape>
+          <dgm:presOf/>
+          <dgm:constrLst/>
+          <dgm:ruleLst/>
+        </dgm:layoutNode>
+      </dgm:forEach>
+    </dgm:forEach>
+  </dgm:layoutNode>
+</dgm:layoutDef>
+</file>
+
 <file path=ppt/diagrams/quickStyle1.xml><?xml version="1.0" encoding="utf-8"?>
 <dgm:styleDef xmlns:dgm="http://schemas.openxmlformats.org/drawingml/2006/diagram" xmlns:a="http://schemas.openxmlformats.org/drawingml/2006/main" uniqueId="urn:microsoft.com/office/officeart/2005/8/quickstyle/simple1">
   <dgm:title val=""/>
@@ -9767,6 +10004,1040 @@
 </file>
 
 <file path=ppt/diagrams/quickStyle3.xml><?xml version="1.0" encoding="utf-8"?>
+<dgm:styleDef xmlns:dgm="http://schemas.openxmlformats.org/drawingml/2006/diagram" xmlns:a="http://schemas.openxmlformats.org/drawingml/2006/main" uniqueId="urn:microsoft.com/office/officeart/2005/8/quickstyle/simple1">
+  <dgm:title val=""/>
+  <dgm:desc val=""/>
+  <dgm:catLst>
+    <dgm:cat type="simple" pri="10100"/>
+  </dgm:catLst>
+  <dgm:scene3d>
+    <a:camera prst="orthographicFront"/>
+    <a:lightRig rig="threePt" dir="t"/>
+  </dgm:scene3d>
+  <dgm:styleLbl name="node0">
+    <dgm:scene3d>
+      <a:camera prst="orthographicFront"/>
+      <a:lightRig rig="threePt" dir="t"/>
+    </dgm:scene3d>
+    <dgm:sp3d/>
+    <dgm:txPr/>
+    <dgm:style>
+      <a:lnRef idx="2">
+        <a:scrgbClr r="0" g="0" b="0"/>
+      </a:lnRef>
+      <a:fillRef idx="1">
+        <a:scrgbClr r="0" g="0" b="0"/>
+      </a:fillRef>
+      <a:effectRef idx="0">
+        <a:scrgbClr r="0" g="0" b="0"/>
+      </a:effectRef>
+      <a:fontRef idx="minor">
+        <a:schemeClr val="lt1"/>
+      </a:fontRef>
+    </dgm:style>
+  </dgm:styleLbl>
+  <dgm:styleLbl name="lnNode1">
+    <dgm:scene3d>
+      <a:camera prst="orthographicFront"/>
+      <a:lightRig rig="threePt" dir="t"/>
+    </dgm:scene3d>
+    <dgm:sp3d/>
+    <dgm:txPr/>
+    <dgm:style>
+      <a:lnRef idx="2">
+        <a:scrgbClr r="0" g="0" b="0"/>
+      </a:lnRef>
+      <a:fillRef idx="1">
+        <a:scrgbClr r="0" g="0" b="0"/>
+      </a:fillRef>
+      <a:effectRef idx="0">
+        <a:scrgbClr r="0" g="0" b="0"/>
+      </a:effectRef>
+      <a:fontRef idx="minor">
+        <a:schemeClr val="lt1"/>
+      </a:fontRef>
+    </dgm:style>
+  </dgm:styleLbl>
+  <dgm:styleLbl name="vennNode1">
+    <dgm:scene3d>
+      <a:camera prst="orthographicFront"/>
+      <a:lightRig rig="threePt" dir="t"/>
+    </dgm:scene3d>
+    <dgm:sp3d/>
+    <dgm:txPr/>
+    <dgm:style>
+      <a:lnRef idx="2">
+        <a:scrgbClr r="0" g="0" b="0"/>
+      </a:lnRef>
+      <a:fillRef idx="1">
+        <a:scrgbClr r="0" g="0" b="0"/>
+      </a:fillRef>
+      <a:effectRef idx="0">
+        <a:scrgbClr r="0" g="0" b="0"/>
+      </a:effectRef>
+      <a:fontRef idx="minor">
+        <a:schemeClr val="tx1"/>
+      </a:fontRef>
+    </dgm:style>
+  </dgm:styleLbl>
+  <dgm:styleLbl name="alignNode1">
+    <dgm:scene3d>
+      <a:camera prst="orthographicFront"/>
+      <a:lightRig rig="threePt" dir="t"/>
+    </dgm:scene3d>
+    <dgm:sp3d/>
+    <dgm:txPr/>
+    <dgm:style>
+      <a:lnRef idx="2">
+        <a:scrgbClr r="0" g="0" b="0"/>
+      </a:lnRef>
+      <a:fillRef idx="1">
+        <a:scrgbClr r="0" g="0" b="0"/>
+      </a:fillRef>
+      <a:effectRef idx="0">
+        <a:scrgbClr r="0" g="0" b="0"/>
+      </a:effectRef>
+      <a:fontRef idx="minor">
+        <a:schemeClr val="lt1"/>
+      </a:fontRef>
+    </dgm:style>
+  </dgm:styleLbl>
+  <dgm:styleLbl name="node1">
+    <dgm:scene3d>
+      <a:camera prst="orthographicFront"/>
+      <a:lightRig rig="threePt" dir="t"/>
+    </dgm:scene3d>
+    <dgm:sp3d/>
+    <dgm:txPr/>
+    <dgm:style>
+      <a:lnRef idx="2">
+        <a:scrgbClr r="0" g="0" b="0"/>
+      </a:lnRef>
+      <a:fillRef idx="1">
+        <a:scrgbClr r="0" g="0" b="0"/>
+      </a:fillRef>
+      <a:effectRef idx="0">
+        <a:scrgbClr r="0" g="0" b="0"/>
+      </a:effectRef>
+      <a:fontRef idx="minor">
+        <a:schemeClr val="lt1"/>
+      </a:fontRef>
+    </dgm:style>
+  </dgm:styleLbl>
+  <dgm:styleLbl name="node2">
+    <dgm:scene3d>
+      <a:camera prst="orthographicFront"/>
+      <a:lightRig rig="threePt" dir="t"/>
+    </dgm:scene3d>
+    <dgm:sp3d/>
+    <dgm:txPr/>
+    <dgm:style>
+      <a:lnRef idx="2">
+        <a:scrgbClr r="0" g="0" b="0"/>
+      </a:lnRef>
+      <a:fillRef idx="1">
+        <a:scrgbClr r="0" g="0" b="0"/>
+      </a:fillRef>
+      <a:effectRef idx="0">
+        <a:scrgbClr r="0" g="0" b="0"/>
+      </a:effectRef>
+      <a:fontRef idx="minor">
+        <a:schemeClr val="lt1"/>
+      </a:fontRef>
+    </dgm:style>
+  </dgm:styleLbl>
+  <dgm:styleLbl name="node3">
+    <dgm:scene3d>
+      <a:camera prst="orthographicFront"/>
+      <a:lightRig rig="threePt" dir="t"/>
+    </dgm:scene3d>
+    <dgm:sp3d/>
+    <dgm:txPr/>
+    <dgm:style>
+      <a:lnRef idx="2">
+        <a:scrgbClr r="0" g="0" b="0"/>
+      </a:lnRef>
+      <a:fillRef idx="1">
+        <a:scrgbClr r="0" g="0" b="0"/>
+      </a:fillRef>
+      <a:effectRef idx="0">
+        <a:scrgbClr r="0" g="0" b="0"/>
+      </a:effectRef>
+      <a:fontRef idx="minor">
+        <a:schemeClr val="lt1"/>
+      </a:fontRef>
+    </dgm:style>
+  </dgm:styleLbl>
+  <dgm:styleLbl name="node4">
+    <dgm:scene3d>
+      <a:camera prst="orthographicFront"/>
+      <a:lightRig rig="threePt" dir="t"/>
+    </dgm:scene3d>
+    <dgm:sp3d/>
+    <dgm:txPr/>
+    <dgm:style>
+      <a:lnRef idx="2">
+        <a:scrgbClr r="0" g="0" b="0"/>
+      </a:lnRef>
+      <a:fillRef idx="1">
+        <a:scrgbClr r="0" g="0" b="0"/>
+      </a:fillRef>
+      <a:effectRef idx="0">
+        <a:scrgbClr r="0" g="0" b="0"/>
+      </a:effectRef>
+      <a:fontRef idx="minor">
+        <a:schemeClr val="lt1"/>
+      </a:fontRef>
+    </dgm:style>
+  </dgm:styleLbl>
+  <dgm:styleLbl name="fgImgPlace1">
+    <dgm:scene3d>
+      <a:camera prst="orthographicFront"/>
+      <a:lightRig rig="threePt" dir="t"/>
+    </dgm:scene3d>
+    <dgm:sp3d/>
+    <dgm:txPr/>
+    <dgm:style>
+      <a:lnRef idx="2">
+        <a:scrgbClr r="0" g="0" b="0"/>
+      </a:lnRef>
+      <a:fillRef idx="1">
+        <a:scrgbClr r="0" g="0" b="0"/>
+      </a:fillRef>
+      <a:effectRef idx="0">
+        <a:scrgbClr r="0" g="0" b="0"/>
+      </a:effectRef>
+      <a:fontRef idx="minor"/>
+    </dgm:style>
+  </dgm:styleLbl>
+  <dgm:styleLbl name="alignImgPlace1">
+    <dgm:scene3d>
+      <a:camera prst="orthographicFront"/>
+      <a:lightRig rig="threePt" dir="t"/>
+    </dgm:scene3d>
+    <dgm:sp3d/>
+    <dgm:txPr/>
+    <dgm:style>
+      <a:lnRef idx="2">
+        <a:scrgbClr r="0" g="0" b="0"/>
+      </a:lnRef>
+      <a:fillRef idx="1">
+        <a:scrgbClr r="0" g="0" b="0"/>
+      </a:fillRef>
+      <a:effectRef idx="0">
+        <a:scrgbClr r="0" g="0" b="0"/>
+      </a:effectRef>
+      <a:fontRef idx="minor"/>
+    </dgm:style>
+  </dgm:styleLbl>
+  <dgm:styleLbl name="bgImgPlace1">
+    <dgm:scene3d>
+      <a:camera prst="orthographicFront"/>
+      <a:lightRig rig="threePt" dir="t"/>
+    </dgm:scene3d>
+    <dgm:sp3d/>
+    <dgm:txPr/>
+    <dgm:style>
+      <a:lnRef idx="2">
+        <a:scrgbClr r="0" g="0" b="0"/>
+      </a:lnRef>
+      <a:fillRef idx="1">
+        <a:scrgbClr r="0" g="0" b="0"/>
+      </a:fillRef>
+      <a:effectRef idx="0">
+        <a:scrgbClr r="0" g="0" b="0"/>
+      </a:effectRef>
+      <a:fontRef idx="minor"/>
+    </dgm:style>
+  </dgm:styleLbl>
+  <dgm:styleLbl name="sibTrans2D1">
+    <dgm:scene3d>
+      <a:camera prst="orthographicFront"/>
+      <a:lightRig rig="threePt" dir="t"/>
+    </dgm:scene3d>
+    <dgm:sp3d/>
+    <dgm:txPr/>
+    <dgm:style>
+      <a:lnRef idx="0">
+        <a:scrgbClr r="0" g="0" b="0"/>
+      </a:lnRef>
+      <a:fillRef idx="1">
+        <a:scrgbClr r="0" g="0" b="0"/>
+      </a:fillRef>
+      <a:effectRef idx="0">
+        <a:scrgbClr r="0" g="0" b="0"/>
+      </a:effectRef>
+      <a:fontRef idx="minor">
+        <a:schemeClr val="lt1"/>
+      </a:fontRef>
+    </dgm:style>
+  </dgm:styleLbl>
+  <dgm:styleLbl name="fgSibTrans2D1">
+    <dgm:scene3d>
+      <a:camera prst="orthographicFront"/>
+      <a:lightRig rig="threePt" dir="t"/>
+    </dgm:scene3d>
+    <dgm:sp3d/>
+    <dgm:txPr/>
+    <dgm:style>
+      <a:lnRef idx="0">
+        <a:scrgbClr r="0" g="0" b="0"/>
+      </a:lnRef>
+      <a:fillRef idx="1">
+        <a:scrgbClr r="0" g="0" b="0"/>
+      </a:fillRef>
+      <a:effectRef idx="0">
+        <a:scrgbClr r="0" g="0" b="0"/>
+      </a:effectRef>
+      <a:fontRef idx="minor">
+        <a:schemeClr val="lt1"/>
+      </a:fontRef>
+    </dgm:style>
+  </dgm:styleLbl>
+  <dgm:styleLbl name="bgSibTrans2D1">
+    <dgm:scene3d>
+      <a:camera prst="orthographicFront"/>
+      <a:lightRig rig="threePt" dir="t"/>
+    </dgm:scene3d>
+    <dgm:sp3d/>
+    <dgm:txPr/>
+    <dgm:style>
+      <a:lnRef idx="0">
+        <a:scrgbClr r="0" g="0" b="0"/>
+      </a:lnRef>
+      <a:fillRef idx="1">
+        <a:scrgbClr r="0" g="0" b="0"/>
+      </a:fillRef>
+      <a:effectRef idx="0">
+        <a:scrgbClr r="0" g="0" b="0"/>
+      </a:effectRef>
+      <a:fontRef idx="minor">
+        <a:schemeClr val="lt1"/>
+      </a:fontRef>
+    </dgm:style>
+  </dgm:styleLbl>
+  <dgm:styleLbl name="sibTrans1D1">
+    <dgm:scene3d>
+      <a:camera prst="orthographicFront"/>
+      <a:lightRig rig="threePt" dir="t"/>
+    </dgm:scene3d>
+    <dgm:sp3d/>
+    <dgm:txPr/>
+    <dgm:style>
+      <a:lnRef idx="1">
+        <a:scrgbClr r="0" g="0" b="0"/>
+      </a:lnRef>
+      <a:fillRef idx="0">
+        <a:scrgbClr r="0" g="0" b="0"/>
+      </a:fillRef>
+      <a:effectRef idx="0">
+        <a:scrgbClr r="0" g="0" b="0"/>
+      </a:effectRef>
+      <a:fontRef idx="minor"/>
+    </dgm:style>
+  </dgm:styleLbl>
+  <dgm:styleLbl name="callout">
+    <dgm:scene3d>
+      <a:camera prst="orthographicFront"/>
+      <a:lightRig rig="threePt" dir="t"/>
+    </dgm:scene3d>
+    <dgm:sp3d/>
+    <dgm:txPr/>
+    <dgm:style>
+      <a:lnRef idx="2">
+        <a:scrgbClr r="0" g="0" b="0"/>
+      </a:lnRef>
+      <a:fillRef idx="1">
+        <a:scrgbClr r="0" g="0" b="0"/>
+      </a:fillRef>
+      <a:effectRef idx="0">
+        <a:scrgbClr r="0" g="0" b="0"/>
+      </a:effectRef>
+      <a:fontRef idx="minor"/>
+    </dgm:style>
+  </dgm:styleLbl>
+  <dgm:styleLbl name="asst0">
+    <dgm:scene3d>
+      <a:camera prst="orthographicFront"/>
+      <a:lightRig rig="threePt" dir="t"/>
+    </dgm:scene3d>
+    <dgm:sp3d/>
+    <dgm:txPr/>
+    <dgm:style>
+      <a:lnRef idx="2">
+        <a:scrgbClr r="0" g="0" b="0"/>
+      </a:lnRef>
+      <a:fillRef idx="1">
+        <a:scrgbClr r="0" g="0" b="0"/>
+      </a:fillRef>
+      <a:effectRef idx="0">
+        <a:scrgbClr r="0" g="0" b="0"/>
+      </a:effectRef>
+      <a:fontRef idx="minor">
+        <a:schemeClr val="lt1"/>
+      </a:fontRef>
+    </dgm:style>
+  </dgm:styleLbl>
+  <dgm:styleLbl name="asst1">
+    <dgm:scene3d>
+      <a:camera prst="orthographicFront"/>
+      <a:lightRig rig="threePt" dir="t"/>
+    </dgm:scene3d>
+    <dgm:sp3d/>
+    <dgm:txPr/>
+    <dgm:style>
+      <a:lnRef idx="2">
+        <a:scrgbClr r="0" g="0" b="0"/>
+      </a:lnRef>
+      <a:fillRef idx="1">
+        <a:scrgbClr r="0" g="0" b="0"/>
+      </a:fillRef>
+      <a:effectRef idx="0">
+        <a:scrgbClr r="0" g="0" b="0"/>
+      </a:effectRef>
+      <a:fontRef idx="minor">
+        <a:schemeClr val="lt1"/>
+      </a:fontRef>
+    </dgm:style>
+  </dgm:styleLbl>
+  <dgm:styleLbl name="asst2">
+    <dgm:scene3d>
+      <a:camera prst="orthographicFront"/>
+      <a:lightRig rig="threePt" dir="t"/>
+    </dgm:scene3d>
+    <dgm:sp3d/>
+    <dgm:txPr/>
+    <dgm:style>
+      <a:lnRef idx="2">
+        <a:scrgbClr r="0" g="0" b="0"/>
+      </a:lnRef>
+      <a:fillRef idx="1">
+        <a:scrgbClr r="0" g="0" b="0"/>
+      </a:fillRef>
+      <a:effectRef idx="0">
+        <a:scrgbClr r="0" g="0" b="0"/>
+      </a:effectRef>
+      <a:fontRef idx="minor">
+        <a:schemeClr val="lt1"/>
+      </a:fontRef>
+    </dgm:style>
+  </dgm:styleLbl>
+  <dgm:styleLbl name="asst3">
+    <dgm:scene3d>
+      <a:camera prst="orthographicFront"/>
+      <a:lightRig rig="threePt" dir="t"/>
+    </dgm:scene3d>
+    <dgm:sp3d/>
+    <dgm:txPr/>
+    <dgm:style>
+      <a:lnRef idx="2">
+        <a:scrgbClr r="0" g="0" b="0"/>
+      </a:lnRef>
+      <a:fillRef idx="1">
+        <a:scrgbClr r="0" g="0" b="0"/>
+      </a:fillRef>
+      <a:effectRef idx="0">
+        <a:scrgbClr r="0" g="0" b="0"/>
+      </a:effectRef>
+      <a:fontRef idx="minor">
+        <a:schemeClr val="lt1"/>
+      </a:fontRef>
+    </dgm:style>
+  </dgm:styleLbl>
+  <dgm:styleLbl name="asst4">
+    <dgm:scene3d>
+      <a:camera prst="orthographicFront"/>
+      <a:lightRig rig="threePt" dir="t"/>
+    </dgm:scene3d>
+    <dgm:sp3d/>
+    <dgm:txPr/>
+    <dgm:style>
+      <a:lnRef idx="2">
+        <a:scrgbClr r="0" g="0" b="0"/>
+      </a:lnRef>
+      <a:fillRef idx="1">
+        <a:scrgbClr r="0" g="0" b="0"/>
+      </a:fillRef>
+      <a:effectRef idx="0">
+        <a:scrgbClr r="0" g="0" b="0"/>
+      </a:effectRef>
+      <a:fontRef idx="minor">
+        <a:schemeClr val="lt1"/>
+      </a:fontRef>
+    </dgm:style>
+  </dgm:styleLbl>
+  <dgm:styleLbl name="parChTrans2D1">
+    <dgm:scene3d>
+      <a:camera prst="orthographicFront"/>
+      <a:lightRig rig="threePt" dir="t"/>
+    </dgm:scene3d>
+    <dgm:sp3d/>
+    <dgm:txPr/>
+    <dgm:style>
+      <a:lnRef idx="2">
+        <a:scrgbClr r="0" g="0" b="0"/>
+      </a:lnRef>
+      <a:fillRef idx="1">
+        <a:scrgbClr r="0" g="0" b="0"/>
+      </a:fillRef>
+      <a:effectRef idx="0">
+        <a:scrgbClr r="0" g="0" b="0"/>
+      </a:effectRef>
+      <a:fontRef idx="minor">
+        <a:schemeClr val="lt1"/>
+      </a:fontRef>
+    </dgm:style>
+  </dgm:styleLbl>
+  <dgm:styleLbl name="parChTrans2D2">
+    <dgm:scene3d>
+      <a:camera prst="orthographicFront"/>
+      <a:lightRig rig="threePt" dir="t"/>
+    </dgm:scene3d>
+    <dgm:sp3d/>
+    <dgm:txPr/>
+    <dgm:style>
+      <a:lnRef idx="2">
+        <a:scrgbClr r="0" g="0" b="0"/>
+      </a:lnRef>
+      <a:fillRef idx="1">
+        <a:scrgbClr r="0" g="0" b="0"/>
+      </a:fillRef>
+      <a:effectRef idx="0">
+        <a:scrgbClr r="0" g="0" b="0"/>
+      </a:effectRef>
+      <a:fontRef idx="minor">
+        <a:schemeClr val="lt1"/>
+      </a:fontRef>
+    </dgm:style>
+  </dgm:styleLbl>
+  <dgm:styleLbl name="parChTrans2D3">
+    <dgm:scene3d>
+      <a:camera prst="orthographicFront"/>
+      <a:lightRig rig="threePt" dir="t"/>
+    </dgm:scene3d>
+    <dgm:sp3d/>
+    <dgm:txPr/>
+    <dgm:style>
+      <a:lnRef idx="2">
+        <a:scrgbClr r="0" g="0" b="0"/>
+      </a:lnRef>
+      <a:fillRef idx="1">
+        <a:scrgbClr r="0" g="0" b="0"/>
+      </a:fillRef>
+      <a:effectRef idx="0">
+        <a:scrgbClr r="0" g="0" b="0"/>
+      </a:effectRef>
+      <a:fontRef idx="minor">
+        <a:schemeClr val="lt1"/>
+      </a:fontRef>
+    </dgm:style>
+  </dgm:styleLbl>
+  <dgm:styleLbl name="parChTrans2D4">
+    <dgm:scene3d>
+      <a:camera prst="orthographicFront"/>
+      <a:lightRig rig="threePt" dir="t"/>
+    </dgm:scene3d>
+    <dgm:sp3d/>
+    <dgm:txPr/>
+    <dgm:style>
+      <a:lnRef idx="2">
+        <a:scrgbClr r="0" g="0" b="0"/>
+      </a:lnRef>
+      <a:fillRef idx="1">
+        <a:scrgbClr r="0" g="0" b="0"/>
+      </a:fillRef>
+      <a:effectRef idx="0">
+        <a:scrgbClr r="0" g="0" b="0"/>
+      </a:effectRef>
+      <a:fontRef idx="minor">
+        <a:schemeClr val="lt1"/>
+      </a:fontRef>
+    </dgm:style>
+  </dgm:styleLbl>
+  <dgm:styleLbl name="parChTrans1D1">
+    <dgm:scene3d>
+      <a:camera prst="orthographicFront"/>
+      <a:lightRig rig="threePt" dir="t"/>
+    </dgm:scene3d>
+    <dgm:sp3d/>
+    <dgm:txPr/>
+    <dgm:style>
+      <a:lnRef idx="2">
+        <a:scrgbClr r="0" g="0" b="0"/>
+      </a:lnRef>
+      <a:fillRef idx="0">
+        <a:scrgbClr r="0" g="0" b="0"/>
+      </a:fillRef>
+      <a:effectRef idx="0">
+        <a:scrgbClr r="0" g="0" b="0"/>
+      </a:effectRef>
+      <a:fontRef idx="minor"/>
+    </dgm:style>
+  </dgm:styleLbl>
+  <dgm:styleLbl name="parChTrans1D2">
+    <dgm:scene3d>
+      <a:camera prst="orthographicFront"/>
+      <a:lightRig rig="threePt" dir="t"/>
+    </dgm:scene3d>
+    <dgm:sp3d/>
+    <dgm:txPr/>
+    <dgm:style>
+      <a:lnRef idx="2">
+        <a:scrgbClr r="0" g="0" b="0"/>
+      </a:lnRef>
+      <a:fillRef idx="0">
+        <a:scrgbClr r="0" g="0" b="0"/>
+      </a:fillRef>
+      <a:effectRef idx="0">
+        <a:scrgbClr r="0" g="0" b="0"/>
+      </a:effectRef>
+      <a:fontRef idx="minor"/>
+    </dgm:style>
+  </dgm:styleLbl>
+  <dgm:styleLbl name="parChTrans1D3">
+    <dgm:scene3d>
+      <a:camera prst="orthographicFront"/>
+      <a:lightRig rig="threePt" dir="t"/>
+    </dgm:scene3d>
+    <dgm:sp3d/>
+    <dgm:txPr/>
+    <dgm:style>
+      <a:lnRef idx="2">
+        <a:scrgbClr r="0" g="0" b="0"/>
+      </a:lnRef>
+      <a:fillRef idx="0">
+        <a:scrgbClr r="0" g="0" b="0"/>
+      </a:fillRef>
+      <a:effectRef idx="0">
+        <a:scrgbClr r="0" g="0" b="0"/>
+      </a:effectRef>
+      <a:fontRef idx="minor"/>
+    </dgm:style>
+  </dgm:styleLbl>
+  <dgm:styleLbl name="parChTrans1D4">
+    <dgm:scene3d>
+      <a:camera prst="orthographicFront"/>
+      <a:lightRig rig="threePt" dir="t"/>
+    </dgm:scene3d>
+    <dgm:sp3d/>
+    <dgm:txPr/>
+    <dgm:style>
+      <a:lnRef idx="2">
+        <a:scrgbClr r="0" g="0" b="0"/>
+      </a:lnRef>
+      <a:fillRef idx="0">
+        <a:scrgbClr r="0" g="0" b="0"/>
+      </a:fillRef>
+      <a:effectRef idx="0">
+        <a:scrgbClr r="0" g="0" b="0"/>
+      </a:effectRef>
+      <a:fontRef idx="minor"/>
+    </dgm:style>
+  </dgm:styleLbl>
+  <dgm:styleLbl name="fgAcc1">
+    <dgm:scene3d>
+      <a:camera prst="orthographicFront"/>
+      <a:lightRig rig="threePt" dir="t"/>
+    </dgm:scene3d>
+    <dgm:sp3d/>
+    <dgm:txPr/>
+    <dgm:style>
+      <a:lnRef idx="2">
+        <a:scrgbClr r="0" g="0" b="0"/>
+      </a:lnRef>
+      <a:fillRef idx="1">
+        <a:scrgbClr r="0" g="0" b="0"/>
+      </a:fillRef>
+      <a:effectRef idx="0">
+        <a:scrgbClr r="0" g="0" b="0"/>
+      </a:effectRef>
+      <a:fontRef idx="minor"/>
+    </dgm:style>
+  </dgm:styleLbl>
+  <dgm:styleLbl name="conFgAcc1">
+    <dgm:scene3d>
+      <a:camera prst="orthographicFront"/>
+      <a:lightRig rig="threePt" dir="t"/>
+    </dgm:scene3d>
+    <dgm:sp3d/>
+    <dgm:txPr/>
+    <dgm:style>
+      <a:lnRef idx="2">
+        <a:scrgbClr r="0" g="0" b="0"/>
+      </a:lnRef>
+      <a:fillRef idx="1">
+        <a:scrgbClr r="0" g="0" b="0"/>
+      </a:fillRef>
+      <a:effectRef idx="0">
+        <a:scrgbClr r="0" g="0" b="0"/>
+      </a:effectRef>
+      <a:fontRef idx="minor"/>
+    </dgm:style>
+  </dgm:styleLbl>
+  <dgm:styleLbl name="alignAcc1">
+    <dgm:scene3d>
+      <a:camera prst="orthographicFront"/>
+      <a:lightRig rig="threePt" dir="t"/>
+    </dgm:scene3d>
+    <dgm:sp3d/>
+    <dgm:txPr/>
+    <dgm:style>
+      <a:lnRef idx="2">
+        <a:scrgbClr r="0" g="0" b="0"/>
+      </a:lnRef>
+      <a:fillRef idx="1">
+        <a:scrgbClr r="0" g="0" b="0"/>
+      </a:fillRef>
+      <a:effectRef idx="0">
+        <a:scrgbClr r="0" g="0" b="0"/>
+      </a:effectRef>
+      <a:fontRef idx="minor"/>
+    </dgm:style>
+  </dgm:styleLbl>
+  <dgm:styleLbl name="trAlignAcc1">
+    <dgm:scene3d>
+      <a:camera prst="orthographicFront"/>
+      <a:lightRig rig="threePt" dir="t"/>
+    </dgm:scene3d>
+    <dgm:sp3d/>
+    <dgm:txPr/>
+    <dgm:style>
+      <a:lnRef idx="1">
+        <a:scrgbClr r="0" g="0" b="0"/>
+      </a:lnRef>
+      <a:fillRef idx="1">
+        <a:scrgbClr r="0" g="0" b="0"/>
+      </a:fillRef>
+      <a:effectRef idx="0">
+        <a:scrgbClr r="0" g="0" b="0"/>
+      </a:effectRef>
+      <a:fontRef idx="minor"/>
+    </dgm:style>
+  </dgm:styleLbl>
+  <dgm:styleLbl name="bgAcc1">
+    <dgm:scene3d>
+      <a:camera prst="orthographicFront"/>
+      <a:lightRig rig="threePt" dir="t"/>
+    </dgm:scene3d>
+    <dgm:sp3d/>
+    <dgm:txPr/>
+    <dgm:style>
+      <a:lnRef idx="2">
+        <a:scrgbClr r="0" g="0" b="0"/>
+      </a:lnRef>
+      <a:fillRef idx="1">
+        <a:scrgbClr r="0" g="0" b="0"/>
+      </a:fillRef>
+      <a:effectRef idx="0">
+        <a:scrgbClr r="0" g="0" b="0"/>
+      </a:effectRef>
+      <a:fontRef idx="minor"/>
+    </dgm:style>
+  </dgm:styleLbl>
+  <dgm:styleLbl name="solidFgAcc1">
+    <dgm:scene3d>
+      <a:camera prst="orthographicFront"/>
+      <a:lightRig rig="threePt" dir="t"/>
+    </dgm:scene3d>
+    <dgm:sp3d/>
+    <dgm:txPr/>
+    <dgm:style>
+      <a:lnRef idx="2">
+        <a:scrgbClr r="0" g="0" b="0"/>
+      </a:lnRef>
+      <a:fillRef idx="1">
+        <a:scrgbClr r="0" g="0" b="0"/>
+      </a:fillRef>
+      <a:effectRef idx="0">
+        <a:scrgbClr r="0" g="0" b="0"/>
+      </a:effectRef>
+      <a:fontRef idx="minor"/>
+    </dgm:style>
+  </dgm:styleLbl>
+  <dgm:styleLbl name="solidAlignAcc1">
+    <dgm:scene3d>
+      <a:camera prst="orthographicFront"/>
+      <a:lightRig rig="threePt" dir="t"/>
+    </dgm:scene3d>
+    <dgm:sp3d/>
+    <dgm:txPr/>
+    <dgm:style>
+      <a:lnRef idx="2">
+        <a:scrgbClr r="0" g="0" b="0"/>
+      </a:lnRef>
+      <a:fillRef idx="1">
+        <a:scrgbClr r="0" g="0" b="0"/>
+      </a:fillRef>
+      <a:effectRef idx="0">
+        <a:scrgbClr r="0" g="0" b="0"/>
+      </a:effectRef>
+      <a:fontRef idx="minor"/>
+    </dgm:style>
+  </dgm:styleLbl>
+  <dgm:styleLbl name="solidBgAcc1">
+    <dgm:scene3d>
+      <a:camera prst="orthographicFront"/>
+      <a:lightRig rig="threePt" dir="t"/>
+    </dgm:scene3d>
+    <dgm:sp3d/>
+    <dgm:txPr/>
+    <dgm:style>
+      <a:lnRef idx="2">
+        <a:scrgbClr r="0" g="0" b="0"/>
+      </a:lnRef>
+      <a:fillRef idx="1">
+        <a:scrgbClr r="0" g="0" b="0"/>
+      </a:fillRef>
+      <a:effectRef idx="0">
+        <a:scrgbClr r="0" g="0" b="0"/>
+      </a:effectRef>
+      <a:fontRef idx="minor"/>
+    </dgm:style>
+  </dgm:styleLbl>
+  <dgm:styleLbl name="fgAccFollowNode1">
+    <dgm:scene3d>
+      <a:camera prst="orthographicFront"/>
+      <a:lightRig rig="threePt" dir="t"/>
+    </dgm:scene3d>
+    <dgm:sp3d/>
+    <dgm:txPr/>
+    <dgm:style>
+      <a:lnRef idx="2">
+        <a:scrgbClr r="0" g="0" b="0"/>
+      </a:lnRef>
+      <a:fillRef idx="1">
+        <a:scrgbClr r="0" g="0" b="0"/>
+      </a:fillRef>
+      <a:effectRef idx="0">
+        <a:scrgbClr r="0" g="0" b="0"/>
+      </a:effectRef>
+      <a:fontRef idx="minor"/>
+    </dgm:style>
+  </dgm:styleLbl>
+  <dgm:styleLbl name="alignAccFollowNode1">
+    <dgm:scene3d>
+      <a:camera prst="orthographicFront"/>
+      <a:lightRig rig="threePt" dir="t"/>
+    </dgm:scene3d>
+    <dgm:sp3d/>
+    <dgm:txPr/>
+    <dgm:style>
+      <a:lnRef idx="2">
+        <a:scrgbClr r="0" g="0" b="0"/>
+      </a:lnRef>
+      <a:fillRef idx="1">
+        <a:scrgbClr r="0" g="0" b="0"/>
+      </a:fillRef>
+      <a:effectRef idx="0">
+        <a:scrgbClr r="0" g="0" b="0"/>
+      </a:effectRef>
+      <a:fontRef idx="minor"/>
+    </dgm:style>
+  </dgm:styleLbl>
+  <dgm:styleLbl name="bgAccFollowNode1">
+    <dgm:scene3d>
+      <a:camera prst="orthographicFront"/>
+      <a:lightRig rig="threePt" dir="t"/>
+    </dgm:scene3d>
+    <dgm:sp3d/>
+    <dgm:txPr/>
+    <dgm:style>
+      <a:lnRef idx="2">
+        <a:scrgbClr r="0" g="0" b="0"/>
+      </a:lnRef>
+      <a:fillRef idx="1">
+        <a:scrgbClr r="0" g="0" b="0"/>
+      </a:fillRef>
+      <a:effectRef idx="0">
+        <a:scrgbClr r="0" g="0" b="0"/>
+      </a:effectRef>
+      <a:fontRef idx="minor"/>
+    </dgm:style>
+  </dgm:styleLbl>
+  <dgm:styleLbl name="fgAcc0">
+    <dgm:scene3d>
+      <a:camera prst="orthographicFront"/>
+      <a:lightRig rig="threePt" dir="t"/>
+    </dgm:scene3d>
+    <dgm:sp3d/>
+    <dgm:txPr/>
+    <dgm:style>
+      <a:lnRef idx="2">
+        <a:scrgbClr r="0" g="0" b="0"/>
+      </a:lnRef>
+      <a:fillRef idx="1">
+        <a:scrgbClr r="0" g="0" b="0"/>
+      </a:fillRef>
+      <a:effectRef idx="0">
+        <a:scrgbClr r="0" g="0" b="0"/>
+      </a:effectRef>
+      <a:fontRef idx="minor"/>
+    </dgm:style>
+  </dgm:styleLbl>
+  <dgm:styleLbl name="fgAcc2">
+    <dgm:scene3d>
+      <a:camera prst="orthographicFront"/>
+      <a:lightRig rig="threePt" dir="t"/>
+    </dgm:scene3d>
+    <dgm:sp3d/>
+    <dgm:txPr/>
+    <dgm:style>
+      <a:lnRef idx="2">
+        <a:scrgbClr r="0" g="0" b="0"/>
+      </a:lnRef>
+      <a:fillRef idx="1">
+        <a:scrgbClr r="0" g="0" b="0"/>
+      </a:fillRef>
+      <a:effectRef idx="0">
+        <a:scrgbClr r="0" g="0" b="0"/>
+      </a:effectRef>
+      <a:fontRef idx="minor"/>
+    </dgm:style>
+  </dgm:styleLbl>
+  <dgm:styleLbl name="fgAcc3">
+    <dgm:scene3d>
+      <a:camera prst="orthographicFront"/>
+      <a:lightRig rig="threePt" dir="t"/>
+    </dgm:scene3d>
+    <dgm:sp3d/>
+    <dgm:txPr/>
+    <dgm:style>
+      <a:lnRef idx="2">
+        <a:scrgbClr r="0" g="0" b="0"/>
+      </a:lnRef>
+      <a:fillRef idx="1">
+        <a:scrgbClr r="0" g="0" b="0"/>
+      </a:fillRef>
+      <a:effectRef idx="0">
+        <a:scrgbClr r="0" g="0" b="0"/>
+      </a:effectRef>
+      <a:fontRef idx="minor"/>
+    </dgm:style>
+  </dgm:styleLbl>
+  <dgm:styleLbl name="fgAcc4">
+    <dgm:scene3d>
+      <a:camera prst="orthographicFront"/>
+      <a:lightRig rig="threePt" dir="t"/>
+    </dgm:scene3d>
+    <dgm:sp3d/>
+    <dgm:txPr/>
+    <dgm:style>
+      <a:lnRef idx="2">
+        <a:scrgbClr r="0" g="0" b="0"/>
+      </a:lnRef>
+      <a:fillRef idx="1">
+        <a:scrgbClr r="0" g="0" b="0"/>
+      </a:fillRef>
+      <a:effectRef idx="0">
+        <a:scrgbClr r="0" g="0" b="0"/>
+      </a:effectRef>
+      <a:fontRef idx="minor"/>
+    </dgm:style>
+  </dgm:styleLbl>
+  <dgm:styleLbl name="bgShp">
+    <dgm:scene3d>
+      <a:camera prst="orthographicFront"/>
+      <a:lightRig rig="threePt" dir="t"/>
+    </dgm:scene3d>
+    <dgm:sp3d/>
+    <dgm:txPr/>
+    <dgm:style>
+      <a:lnRef idx="0">
+        <a:scrgbClr r="0" g="0" b="0"/>
+      </a:lnRef>
+      <a:fillRef idx="1">
+        <a:scrgbClr r="0" g="0" b="0"/>
+      </a:fillRef>
+      <a:effectRef idx="0">
+        <a:scrgbClr r="0" g="0" b="0"/>
+      </a:effectRef>
+      <a:fontRef idx="minor"/>
+    </dgm:style>
+  </dgm:styleLbl>
+  <dgm:styleLbl name="dkBgShp">
+    <dgm:scene3d>
+      <a:camera prst="orthographicFront"/>
+      <a:lightRig rig="threePt" dir="t"/>
+    </dgm:scene3d>
+    <dgm:sp3d/>
+    <dgm:txPr/>
+    <dgm:style>
+      <a:lnRef idx="0">
+        <a:scrgbClr r="0" g="0" b="0"/>
+      </a:lnRef>
+      <a:fillRef idx="1">
+        <a:scrgbClr r="0" g="0" b="0"/>
+      </a:fillRef>
+      <a:effectRef idx="0">
+        <a:scrgbClr r="0" g="0" b="0"/>
+      </a:effectRef>
+      <a:fontRef idx="minor"/>
+    </dgm:style>
+  </dgm:styleLbl>
+  <dgm:styleLbl name="trBgShp">
+    <dgm:scene3d>
+      <a:camera prst="orthographicFront"/>
+      <a:lightRig rig="threePt" dir="t"/>
+    </dgm:scene3d>
+    <dgm:sp3d/>
+    <dgm:txPr/>
+    <dgm:style>
+      <a:lnRef idx="0">
+        <a:scrgbClr r="0" g="0" b="0"/>
+      </a:lnRef>
+      <a:fillRef idx="1">
+        <a:scrgbClr r="0" g="0" b="0"/>
+      </a:fillRef>
+      <a:effectRef idx="0">
+        <a:scrgbClr r="0" g="0" b="0"/>
+      </a:effectRef>
+      <a:fontRef idx="minor"/>
+    </dgm:style>
+  </dgm:styleLbl>
+  <dgm:styleLbl name="fgShp">
+    <dgm:scene3d>
+      <a:camera prst="orthographicFront"/>
+      <a:lightRig rig="threePt" dir="t"/>
+    </dgm:scene3d>
+    <dgm:sp3d/>
+    <dgm:txPr/>
+    <dgm:style>
+      <a:lnRef idx="2">
+        <a:scrgbClr r="0" g="0" b="0"/>
+      </a:lnRef>
+      <a:fillRef idx="1">
+        <a:scrgbClr r="0" g="0" b="0"/>
+      </a:fillRef>
+      <a:effectRef idx="0">
+        <a:scrgbClr r="0" g="0" b="0"/>
+      </a:effectRef>
+      <a:fontRef idx="minor"/>
+    </dgm:style>
+  </dgm:styleLbl>
+  <dgm:styleLbl name="revTx">
+    <dgm:scene3d>
+      <a:camera prst="orthographicFront"/>
+      <a:lightRig rig="threePt" dir="t"/>
+    </dgm:scene3d>
+    <dgm:sp3d/>
+    <dgm:txPr/>
+    <dgm:style>
+      <a:lnRef idx="0">
+        <a:scrgbClr r="0" g="0" b="0"/>
+      </a:lnRef>
+      <a:fillRef idx="0">
+        <a:scrgbClr r="0" g="0" b="0"/>
+      </a:fillRef>
+      <a:effectRef idx="0">
+        <a:scrgbClr r="0" g="0" b="0"/>
+      </a:effectRef>
+      <a:fontRef idx="minor"/>
+    </dgm:style>
+  </dgm:styleLbl>
+</dgm:styleDef>
+</file>
+
+<file path=ppt/diagrams/quickStyle4.xml><?xml version="1.0" encoding="utf-8"?>
 <dgm:styleDef xmlns:dgm="http://schemas.openxmlformats.org/drawingml/2006/diagram" xmlns:a="http://schemas.openxmlformats.org/drawingml/2006/main" uniqueId="urn:microsoft.com/office/officeart/2005/8/quickstyle/simple1">
   <dgm:title val=""/>
   <dgm:desc val=""/>
@@ -10859,7 +12130,7 @@
           <a:p>
             <a:fld id="{208EE90E-2504-4826-81E4-66C7B83B9CAF}" type="datetimeFigureOut">
               <a:rPr lang="en-US" smtClean="0"/>
-              <a:t>1/23/2018</a:t>
+              <a:t>1/24/2018</a:t>
             </a:fld>
             <a:endParaRPr lang="en-US" dirty="0"/>
           </a:p>
@@ -11175,7 +12446,7 @@
           <a:p>
             <a:fld id="{208EE90E-2504-4826-81E4-66C7B83B9CAF}" type="datetimeFigureOut">
               <a:rPr lang="en-US" smtClean="0"/>
-              <a:t>1/23/2018</a:t>
+              <a:t>1/24/2018</a:t>
             </a:fld>
             <a:endParaRPr lang="en-US" dirty="0"/>
           </a:p>
@@ -11350,7 +12621,7 @@
           <a:p>
             <a:fld id="{208EE90E-2504-4826-81E4-66C7B83B9CAF}" type="datetimeFigureOut">
               <a:rPr lang="en-US" smtClean="0"/>
-              <a:t>1/23/2018</a:t>
+              <a:t>1/24/2018</a:t>
             </a:fld>
             <a:endParaRPr lang="en-US" dirty="0"/>
           </a:p>
@@ -11587,7 +12858,7 @@
           <a:p>
             <a:fld id="{208EE90E-2504-4826-81E4-66C7B83B9CAF}" type="datetimeFigureOut">
               <a:rPr lang="en-US" smtClean="0"/>
-              <a:t>1/23/2018</a:t>
+              <a:t>1/24/2018</a:t>
             </a:fld>
             <a:endParaRPr lang="en-US" dirty="0"/>
           </a:p>
@@ -11757,7 +13028,7 @@
           <a:p>
             <a:fld id="{208EE90E-2504-4826-81E4-66C7B83B9CAF}" type="datetimeFigureOut">
               <a:rPr lang="en-US" smtClean="0"/>
-              <a:t>1/23/2018</a:t>
+              <a:t>1/24/2018</a:t>
             </a:fld>
             <a:endParaRPr lang="en-US" dirty="0"/>
           </a:p>
@@ -12003,7 +13274,7 @@
           <a:p>
             <a:fld id="{208EE90E-2504-4826-81E4-66C7B83B9CAF}" type="datetimeFigureOut">
               <a:rPr lang="en-US" smtClean="0"/>
-              <a:t>1/23/2018</a:t>
+              <a:t>1/24/2018</a:t>
             </a:fld>
             <a:endParaRPr lang="en-US" dirty="0"/>
           </a:p>
@@ -12291,7 +13562,7 @@
           <a:p>
             <a:fld id="{208EE90E-2504-4826-81E4-66C7B83B9CAF}" type="datetimeFigureOut">
               <a:rPr lang="en-US" smtClean="0"/>
-              <a:t>1/23/2018</a:t>
+              <a:t>1/24/2018</a:t>
             </a:fld>
             <a:endParaRPr lang="en-US" dirty="0"/>
           </a:p>
@@ -12713,7 +13984,7 @@
           <a:p>
             <a:fld id="{208EE90E-2504-4826-81E4-66C7B83B9CAF}" type="datetimeFigureOut">
               <a:rPr lang="en-US" smtClean="0"/>
-              <a:t>1/23/2018</a:t>
+              <a:t>1/24/2018</a:t>
             </a:fld>
             <a:endParaRPr lang="en-US" dirty="0"/>
           </a:p>
@@ -12831,7 +14102,7 @@
           <a:p>
             <a:fld id="{208EE90E-2504-4826-81E4-66C7B83B9CAF}" type="datetimeFigureOut">
               <a:rPr lang="en-US" smtClean="0"/>
-              <a:t>1/23/2018</a:t>
+              <a:t>1/24/2018</a:t>
             </a:fld>
             <a:endParaRPr lang="en-US" dirty="0"/>
           </a:p>
@@ -12926,7 +14197,7 @@
           <a:p>
             <a:fld id="{208EE90E-2504-4826-81E4-66C7B83B9CAF}" type="datetimeFigureOut">
               <a:rPr lang="en-US" smtClean="0"/>
-              <a:t>1/23/2018</a:t>
+              <a:t>1/24/2018</a:t>
             </a:fld>
             <a:endParaRPr lang="en-US" dirty="0"/>
           </a:p>
@@ -13203,7 +14474,7 @@
           <a:p>
             <a:fld id="{208EE90E-2504-4826-81E4-66C7B83B9CAF}" type="datetimeFigureOut">
               <a:rPr lang="en-US" smtClean="0"/>
-              <a:t>1/23/2018</a:t>
+              <a:t>1/24/2018</a:t>
             </a:fld>
             <a:endParaRPr lang="en-US" dirty="0"/>
           </a:p>
@@ -13326,7 +14597,7 @@
           <a:p>
             <a:fld id="{208EE90E-2504-4826-81E4-66C7B83B9CAF}" type="datetimeFigureOut">
               <a:rPr lang="en-US" smtClean="0"/>
-              <a:t>1/23/2018</a:t>
+              <a:t>1/24/2018</a:t>
             </a:fld>
             <a:endParaRPr lang="en-US" dirty="0"/>
           </a:p>
@@ -13631,7 +14902,7 @@
           <a:p>
             <a:fld id="{208EE90E-2504-4826-81E4-66C7B83B9CAF}" type="datetimeFigureOut">
               <a:rPr lang="en-US" smtClean="0"/>
-              <a:t>1/23/2018</a:t>
+              <a:t>1/24/2018</a:t>
             </a:fld>
             <a:endParaRPr lang="en-US" dirty="0"/>
           </a:p>
@@ -13801,7 +15072,7 @@
           <a:p>
             <a:fld id="{208EE90E-2504-4826-81E4-66C7B83B9CAF}" type="datetimeFigureOut">
               <a:rPr lang="en-US" smtClean="0"/>
-              <a:t>1/23/2018</a:t>
+              <a:t>1/24/2018</a:t>
             </a:fld>
             <a:endParaRPr lang="en-US" dirty="0"/>
           </a:p>
@@ -13981,7 +15252,7 @@
           <a:p>
             <a:fld id="{208EE90E-2504-4826-81E4-66C7B83B9CAF}" type="datetimeFigureOut">
               <a:rPr lang="en-US" smtClean="0"/>
-              <a:t>1/23/2018</a:t>
+              <a:t>1/24/2018</a:t>
             </a:fld>
             <a:endParaRPr lang="en-US" dirty="0"/>
           </a:p>
@@ -14227,7 +15498,7 @@
           <a:p>
             <a:fld id="{208EE90E-2504-4826-81E4-66C7B83B9CAF}" type="datetimeFigureOut">
               <a:rPr lang="en-US" smtClean="0"/>
-              <a:t>1/23/2018</a:t>
+              <a:t>1/24/2018</a:t>
             </a:fld>
             <a:endParaRPr lang="en-US" dirty="0"/>
           </a:p>
@@ -14520,7 +15791,7 @@
           <a:p>
             <a:fld id="{208EE90E-2504-4826-81E4-66C7B83B9CAF}" type="datetimeFigureOut">
               <a:rPr lang="en-US" smtClean="0"/>
-              <a:t>1/23/2018</a:t>
+              <a:t>1/24/2018</a:t>
             </a:fld>
             <a:endParaRPr lang="en-US" dirty="0"/>
           </a:p>
@@ -14948,7 +16219,7 @@
           <a:p>
             <a:fld id="{208EE90E-2504-4826-81E4-66C7B83B9CAF}" type="datetimeFigureOut">
               <a:rPr lang="en-US" smtClean="0"/>
-              <a:t>1/23/2018</a:t>
+              <a:t>1/24/2018</a:t>
             </a:fld>
             <a:endParaRPr lang="en-US" dirty="0"/>
           </a:p>
@@ -15066,7 +16337,7 @@
           <a:p>
             <a:fld id="{208EE90E-2504-4826-81E4-66C7B83B9CAF}" type="datetimeFigureOut">
               <a:rPr lang="en-US" smtClean="0"/>
-              <a:t>1/23/2018</a:t>
+              <a:t>1/24/2018</a:t>
             </a:fld>
             <a:endParaRPr lang="en-US" dirty="0"/>
           </a:p>
@@ -15156,7 +16427,7 @@
           <a:p>
             <a:fld id="{208EE90E-2504-4826-81E4-66C7B83B9CAF}" type="datetimeFigureOut">
               <a:rPr lang="en-US" smtClean="0"/>
-              <a:t>1/23/2018</a:t>
+              <a:t>1/24/2018</a:t>
             </a:fld>
             <a:endParaRPr lang="en-US" dirty="0"/>
           </a:p>
@@ -15406,7 +16677,7 @@
           <a:p>
             <a:fld id="{208EE90E-2504-4826-81E4-66C7B83B9CAF}" type="datetimeFigureOut">
               <a:rPr lang="en-US" smtClean="0"/>
-              <a:t>1/23/2018</a:t>
+              <a:t>1/24/2018</a:t>
             </a:fld>
             <a:endParaRPr lang="en-US" dirty="0"/>
           </a:p>
@@ -15922,7 +17193,7 @@
           <a:p>
             <a:fld id="{208EE90E-2504-4826-81E4-66C7B83B9CAF}" type="datetimeFigureOut">
               <a:rPr lang="en-US" smtClean="0"/>
-              <a:t>1/23/2018</a:t>
+              <a:t>1/24/2018</a:t>
             </a:fld>
             <a:endParaRPr lang="en-US" dirty="0"/>
           </a:p>
@@ -16152,7 +17423,7 @@
           <a:p>
             <a:fld id="{208EE90E-2504-4826-81E4-66C7B83B9CAF}" type="datetimeFigureOut">
               <a:rPr lang="en-US" smtClean="0"/>
-              <a:t>1/23/2018</a:t>
+              <a:t>1/24/2018</a:t>
             </a:fld>
             <a:endParaRPr lang="en-US" dirty="0"/>
           </a:p>
@@ -16790,7 +18061,7 @@
           <a:p>
             <a:fld id="{208EE90E-2504-4826-81E4-66C7B83B9CAF}" type="datetimeFigureOut">
               <a:rPr lang="en-US" smtClean="0"/>
-              <a:t>1/23/2018</a:t>
+              <a:t>1/24/2018</a:t>
             </a:fld>
             <a:endParaRPr lang="en-US" dirty="0"/>
           </a:p>
@@ -17487,7 +18758,7 @@
           <p:nvPr>
             <p:extLst>
               <p:ext uri="{D42A27DB-BD31-4B8C-83A1-F6EECF244321}">
-                <p14:modId xmlns:p14="http://schemas.microsoft.com/office/powerpoint/2010/main" val="212166363"/>
+                <p14:modId xmlns:p14="http://schemas.microsoft.com/office/powerpoint/2010/main" val="3992266432"/>
               </p:ext>
             </p:extLst>
           </p:nvPr>
@@ -17664,14 +18935,7 @@
                 <a:latin typeface="Arial" pitchFamily="34" charset="0"/>
                 <a:cs typeface="Arial" pitchFamily="34" charset="0"/>
               </a:rPr>
-              <a:t>IV. </a:t>
-            </a:r>
-            <a:r>
-              <a:rPr lang="en-US" sz="3600" b="1" dirty="0" smtClean="0">
-                <a:latin typeface="Arial" pitchFamily="34" charset="0"/>
-                <a:cs typeface="Arial" pitchFamily="34" charset="0"/>
-              </a:rPr>
-              <a:t>Export Component</a:t>
+              <a:t>V. Export Component</a:t>
             </a:r>
             <a:endParaRPr lang="en-US" dirty="0"/>
           </a:p>
@@ -17703,6 +18967,414 @@
     <p:extLst>
       <p:ext uri="{BB962C8B-B14F-4D97-AF65-F5344CB8AC3E}">
         <p14:creationId xmlns:p14="http://schemas.microsoft.com/office/powerpoint/2010/main" val="784333501"/>
+      </p:ext>
+    </p:extLst>
+  </p:cSld>
+  <p:clrMapOvr>
+    <a:masterClrMapping/>
+  </p:clrMapOvr>
+  <p:timing>
+    <p:tnLst>
+      <p:par>
+        <p:cTn id="1" dur="indefinite" restart="never" nodeType="tmRoot"/>
+      </p:par>
+    </p:tnLst>
+  </p:timing>
+</p:sld>
+</file>
+
+<file path=ppt/slides/slide14.xml><?xml version="1.0" encoding="utf-8"?>
+<p:sld xmlns:a="http://schemas.openxmlformats.org/drawingml/2006/main" xmlns:r="http://schemas.openxmlformats.org/officeDocument/2006/relationships" xmlns:p="http://schemas.openxmlformats.org/presentationml/2006/main">
+  <p:cSld>
+    <p:spTree>
+      <p:nvGrpSpPr>
+        <p:cNvPr id="1" name=""/>
+        <p:cNvGrpSpPr/>
+        <p:nvPr/>
+      </p:nvGrpSpPr>
+      <p:grpSpPr>
+        <a:xfrm>
+          <a:off x="0" y="0"/>
+          <a:ext cx="0" cy="0"/>
+          <a:chOff x="0" y="0"/>
+          <a:chExt cx="0" cy="0"/>
+        </a:xfrm>
+      </p:grpSpPr>
+      <p:sp>
+        <p:nvSpPr>
+          <p:cNvPr id="2" name="Title 1"/>
+          <p:cNvSpPr>
+            <a:spLocks noGrp="1"/>
+          </p:cNvSpPr>
+          <p:nvPr>
+            <p:ph type="title"/>
+          </p:nvPr>
+        </p:nvSpPr>
+        <p:spPr>
+          <a:xfrm>
+            <a:off x="457200" y="152400"/>
+            <a:ext cx="8229600" cy="1143000"/>
+          </a:xfrm>
+        </p:spPr>
+        <p:txBody>
+          <a:bodyPr>
+            <a:normAutofit/>
+          </a:bodyPr>
+          <a:lstStyle/>
+          <a:p>
+            <a:pPr lvl="0"/>
+            <a:r>
+              <a:rPr lang="en-US" sz="3600" b="1" dirty="0" smtClean="0">
+                <a:latin typeface="Arial" panose="020B0604020202020204" pitchFamily="34" charset="0"/>
+                <a:cs typeface="Arial" pitchFamily="34" charset="0"/>
+              </a:rPr>
+              <a:t>VI. </a:t>
+            </a:r>
+            <a:r>
+              <a:rPr lang="en-US" sz="3600" b="1" dirty="0">
+                <a:latin typeface="Arial" pitchFamily="34" charset="0"/>
+                <a:cs typeface="Arial" pitchFamily="34" charset="0"/>
+              </a:rPr>
+              <a:t>React Navigation</a:t>
+            </a:r>
+            <a:endParaRPr lang="en-US" dirty="0">
+              <a:latin typeface="Arial" panose="020B0604020202020204" pitchFamily="34" charset="0"/>
+              <a:cs typeface="Arial" panose="020B0604020202020204" pitchFamily="34" charset="0"/>
+            </a:endParaRPr>
+          </a:p>
+        </p:txBody>
+      </p:sp>
+      <p:sp>
+        <p:nvSpPr>
+          <p:cNvPr id="6" name="Oval 5"/>
+          <p:cNvSpPr/>
+          <p:nvPr/>
+        </p:nvSpPr>
+        <p:spPr>
+          <a:xfrm>
+            <a:off x="304800" y="2971800"/>
+            <a:ext cx="1828800" cy="1828800"/>
+          </a:xfrm>
+          <a:prstGeom prst="ellipse">
+            <a:avLst/>
+          </a:prstGeom>
+          <a:solidFill>
+            <a:schemeClr val="accent2">
+              <a:lumMod val="20000"/>
+              <a:lumOff val="80000"/>
+            </a:schemeClr>
+          </a:solidFill>
+          <a:ln>
+            <a:solidFill>
+              <a:srgbClr val="C00000"/>
+            </a:solidFill>
+          </a:ln>
+        </p:spPr>
+        <p:style>
+          <a:lnRef idx="2">
+            <a:schemeClr val="accent1">
+              <a:shade val="50000"/>
+            </a:schemeClr>
+          </a:lnRef>
+          <a:fillRef idx="1">
+            <a:schemeClr val="accent1"/>
+          </a:fillRef>
+          <a:effectRef idx="0">
+            <a:schemeClr val="accent1"/>
+          </a:effectRef>
+          <a:fontRef idx="minor">
+            <a:schemeClr val="lt1"/>
+          </a:fontRef>
+        </p:style>
+        <p:txBody>
+          <a:bodyPr rtlCol="0" anchor="ctr"/>
+          <a:lstStyle/>
+          <a:p>
+            <a:pPr algn="ctr"/>
+            <a:r>
+              <a:rPr lang="en-US" sz="1600" b="1" dirty="0" smtClean="0">
+                <a:solidFill>
+                  <a:schemeClr val="tx1"/>
+                </a:solidFill>
+                <a:latin typeface="Arial" panose="020B0604020202020204" pitchFamily="34" charset="0"/>
+                <a:cs typeface="Arial" panose="020B0604020202020204" pitchFamily="34" charset="0"/>
+              </a:rPr>
+              <a:t>Default Navigators</a:t>
+            </a:r>
+            <a:endParaRPr lang="en-US" sz="1600" b="1" dirty="0">
+              <a:solidFill>
+                <a:schemeClr val="tx1"/>
+              </a:solidFill>
+              <a:latin typeface="Arial" panose="020B0604020202020204" pitchFamily="34" charset="0"/>
+              <a:cs typeface="Arial" panose="020B0604020202020204" pitchFamily="34" charset="0"/>
+            </a:endParaRPr>
+          </a:p>
+        </p:txBody>
+      </p:sp>
+      <p:graphicFrame>
+        <p:nvGraphicFramePr>
+          <p:cNvPr id="7" name="Diagram 6"/>
+          <p:cNvGraphicFramePr/>
+          <p:nvPr>
+            <p:extLst>
+              <p:ext uri="{D42A27DB-BD31-4B8C-83A1-F6EECF244321}">
+                <p14:modId xmlns:p14="http://schemas.microsoft.com/office/powerpoint/2010/main" val="305230030"/>
+              </p:ext>
+            </p:extLst>
+          </p:nvPr>
+        </p:nvGraphicFramePr>
+        <p:xfrm>
+          <a:off x="2286000" y="1905000"/>
+          <a:ext cx="6477000" cy="4064000"/>
+        </p:xfrm>
+        <a:graphic>
+          <a:graphicData uri="http://schemas.openxmlformats.org/drawingml/2006/diagram">
+            <dgm:relIds xmlns:dgm="http://schemas.openxmlformats.org/drawingml/2006/diagram" xmlns:r="http://schemas.openxmlformats.org/officeDocument/2006/relationships" r:dm="rId2" r:lo="rId3" r:qs="rId4" r:cs="rId5"/>
+          </a:graphicData>
+        </a:graphic>
+      </p:graphicFrame>
+    </p:spTree>
+    <p:extLst>
+      <p:ext uri="{BB962C8B-B14F-4D97-AF65-F5344CB8AC3E}">
+        <p14:creationId xmlns:p14="http://schemas.microsoft.com/office/powerpoint/2010/main" val="644578182"/>
+      </p:ext>
+    </p:extLst>
+  </p:cSld>
+  <p:clrMapOvr>
+    <a:masterClrMapping/>
+  </p:clrMapOvr>
+  <p:timing>
+    <p:tnLst>
+      <p:par>
+        <p:cTn id="1" dur="indefinite" restart="never" nodeType="tmRoot"/>
+      </p:par>
+    </p:tnLst>
+  </p:timing>
+</p:sld>
+</file>
+
+<file path=ppt/slides/slide15.xml><?xml version="1.0" encoding="utf-8"?>
+<p:sld xmlns:a="http://schemas.openxmlformats.org/drawingml/2006/main" xmlns:r="http://schemas.openxmlformats.org/officeDocument/2006/relationships" xmlns:p="http://schemas.openxmlformats.org/presentationml/2006/main">
+  <p:cSld>
+    <p:spTree>
+      <p:nvGrpSpPr>
+        <p:cNvPr id="1" name=""/>
+        <p:cNvGrpSpPr/>
+        <p:nvPr/>
+      </p:nvGrpSpPr>
+      <p:grpSpPr>
+        <a:xfrm>
+          <a:off x="0" y="0"/>
+          <a:ext cx="0" cy="0"/>
+          <a:chOff x="0" y="0"/>
+          <a:chExt cx="0" cy="0"/>
+        </a:xfrm>
+      </p:grpSpPr>
+      <p:pic>
+        <p:nvPicPr>
+          <p:cNvPr id="4" name="Picture 3"/>
+          <p:cNvPicPr>
+            <a:picLocks noChangeAspect="1"/>
+          </p:cNvPicPr>
+          <p:nvPr/>
+        </p:nvPicPr>
+        <p:blipFill>
+          <a:blip r:embed="rId2">
+            <a:extLst>
+              <a:ext uri="{28A0092B-C50C-407E-A947-70E740481C1C}">
+                <a14:useLocalDpi xmlns:a14="http://schemas.microsoft.com/office/drawing/2010/main" val="0"/>
+              </a:ext>
+            </a:extLst>
+          </a:blip>
+          <a:stretch>
+            <a:fillRect/>
+          </a:stretch>
+        </p:blipFill>
+        <p:spPr>
+          <a:xfrm>
+            <a:off x="3397634" y="1066800"/>
+            <a:ext cx="2356977" cy="4191000"/>
+          </a:xfrm>
+          <a:prstGeom prst="rect">
+            <a:avLst/>
+          </a:prstGeom>
+        </p:spPr>
+      </p:pic>
+      <p:pic>
+        <p:nvPicPr>
+          <p:cNvPr id="5" name="Picture 4"/>
+          <p:cNvPicPr>
+            <a:picLocks noChangeAspect="1"/>
+          </p:cNvPicPr>
+          <p:nvPr/>
+        </p:nvPicPr>
+        <p:blipFill>
+          <a:blip r:embed="rId3">
+            <a:extLst>
+              <a:ext uri="{28A0092B-C50C-407E-A947-70E740481C1C}">
+                <a14:useLocalDpi xmlns:a14="http://schemas.microsoft.com/office/drawing/2010/main" val="0"/>
+              </a:ext>
+            </a:extLst>
+          </a:blip>
+          <a:stretch>
+            <a:fillRect/>
+          </a:stretch>
+        </p:blipFill>
+        <p:spPr>
+          <a:xfrm>
+            <a:off x="633721" y="1066800"/>
+            <a:ext cx="2270125" cy="4191000"/>
+          </a:xfrm>
+          <a:prstGeom prst="rect">
+            <a:avLst/>
+          </a:prstGeom>
+        </p:spPr>
+      </p:pic>
+      <p:pic>
+        <p:nvPicPr>
+          <p:cNvPr id="8" name="Picture 7"/>
+          <p:cNvPicPr>
+            <a:picLocks noChangeAspect="1"/>
+          </p:cNvPicPr>
+          <p:nvPr/>
+        </p:nvPicPr>
+        <p:blipFill>
+          <a:blip r:embed="rId4">
+            <a:extLst>
+              <a:ext uri="{28A0092B-C50C-407E-A947-70E740481C1C}">
+                <a14:useLocalDpi xmlns:a14="http://schemas.microsoft.com/office/drawing/2010/main" val="0"/>
+              </a:ext>
+            </a:extLst>
+          </a:blip>
+          <a:stretch>
+            <a:fillRect/>
+          </a:stretch>
+        </p:blipFill>
+        <p:spPr>
+          <a:xfrm>
+            <a:off x="6248400" y="1046018"/>
+            <a:ext cx="2357438" cy="4191000"/>
+          </a:xfrm>
+          <a:prstGeom prst="rect">
+            <a:avLst/>
+          </a:prstGeom>
+        </p:spPr>
+      </p:pic>
+      <p:sp>
+        <p:nvSpPr>
+          <p:cNvPr id="10" name="TextBox 9"/>
+          <p:cNvSpPr txBox="1"/>
+          <p:nvPr/>
+        </p:nvSpPr>
+        <p:spPr>
+          <a:xfrm>
+            <a:off x="3701523" y="5754193"/>
+            <a:ext cx="1749197" cy="369332"/>
+          </a:xfrm>
+          <a:prstGeom prst="rect">
+            <a:avLst/>
+          </a:prstGeom>
+          <a:noFill/>
+        </p:spPr>
+        <p:txBody>
+          <a:bodyPr wrap="none" rtlCol="0">
+            <a:spAutoFit/>
+          </a:bodyPr>
+          <a:lstStyle/>
+          <a:p>
+            <a:pPr lvl="0"/>
+            <a:r>
+              <a:rPr lang="en-US" dirty="0" err="1" smtClean="0">
+                <a:latin typeface="Arial" panose="020B0604020202020204" pitchFamily="34" charset="0"/>
+                <a:cs typeface="Arial" panose="020B0604020202020204" pitchFamily="34" charset="0"/>
+              </a:rPr>
+              <a:t>StackNavigator</a:t>
+            </a:r>
+            <a:endParaRPr lang="en-US" dirty="0">
+              <a:latin typeface="Arial" panose="020B0604020202020204" pitchFamily="34" charset="0"/>
+              <a:cs typeface="Arial" panose="020B0604020202020204" pitchFamily="34" charset="0"/>
+            </a:endParaRPr>
+          </a:p>
+        </p:txBody>
+      </p:sp>
+      <p:sp>
+        <p:nvSpPr>
+          <p:cNvPr id="11" name="TextBox 10"/>
+          <p:cNvSpPr txBox="1"/>
+          <p:nvPr/>
+        </p:nvSpPr>
+        <p:spPr>
+          <a:xfrm>
+            <a:off x="810828" y="5754193"/>
+            <a:ext cx="1915909" cy="369332"/>
+          </a:xfrm>
+          <a:prstGeom prst="rect">
+            <a:avLst/>
+          </a:prstGeom>
+          <a:noFill/>
+        </p:spPr>
+        <p:txBody>
+          <a:bodyPr wrap="none" rtlCol="0">
+            <a:spAutoFit/>
+          </a:bodyPr>
+          <a:lstStyle/>
+          <a:p>
+            <a:pPr lvl="0"/>
+            <a:r>
+              <a:rPr lang="en-US" dirty="0" err="1">
+                <a:latin typeface="Arial" panose="020B0604020202020204" pitchFamily="34" charset="0"/>
+                <a:cs typeface="Arial" panose="020B0604020202020204" pitchFamily="34" charset="0"/>
+              </a:rPr>
+              <a:t>DrawerNavigator</a:t>
+            </a:r>
+            <a:endParaRPr lang="en-US" dirty="0">
+              <a:latin typeface="Arial" panose="020B0604020202020204" pitchFamily="34" charset="0"/>
+              <a:cs typeface="Arial" panose="020B0604020202020204" pitchFamily="34" charset="0"/>
+            </a:endParaRPr>
+          </a:p>
+        </p:txBody>
+      </p:sp>
+      <p:sp>
+        <p:nvSpPr>
+          <p:cNvPr id="12" name="TextBox 11"/>
+          <p:cNvSpPr txBox="1"/>
+          <p:nvPr/>
+        </p:nvSpPr>
+        <p:spPr>
+          <a:xfrm>
+            <a:off x="6720066" y="5754193"/>
+            <a:ext cx="1544077" cy="369332"/>
+          </a:xfrm>
+          <a:prstGeom prst="rect">
+            <a:avLst/>
+          </a:prstGeom>
+          <a:noFill/>
+        </p:spPr>
+        <p:txBody>
+          <a:bodyPr wrap="none" rtlCol="0">
+            <a:spAutoFit/>
+          </a:bodyPr>
+          <a:lstStyle/>
+          <a:p>
+            <a:pPr lvl="0"/>
+            <a:r>
+              <a:rPr lang="en-US" dirty="0" err="1" smtClean="0">
+                <a:latin typeface="Arial" panose="020B0604020202020204" pitchFamily="34" charset="0"/>
+                <a:cs typeface="Arial" panose="020B0604020202020204" pitchFamily="34" charset="0"/>
+              </a:rPr>
+              <a:t>TabNavigator</a:t>
+            </a:r>
+            <a:endParaRPr lang="en-US" dirty="0">
+              <a:latin typeface="Arial" panose="020B0604020202020204" pitchFamily="34" charset="0"/>
+              <a:cs typeface="Arial" panose="020B0604020202020204" pitchFamily="34" charset="0"/>
+            </a:endParaRPr>
+          </a:p>
+        </p:txBody>
+      </p:sp>
+    </p:spTree>
+    <p:extLst>
+      <p:ext uri="{BB962C8B-B14F-4D97-AF65-F5344CB8AC3E}">
+        <p14:creationId xmlns:p14="http://schemas.microsoft.com/office/powerpoint/2010/main" val="2397643168"/>
       </p:ext>
     </p:extLst>
   </p:cSld>
@@ -19865,7 +21537,7 @@
         <p:spPr>
           <a:xfrm>
             <a:off x="457199" y="4038600"/>
-            <a:ext cx="5234382" cy="1754326"/>
+            <a:ext cx="5692584" cy="1703030"/>
           </a:xfrm>
           <a:prstGeom prst="rect">
             <a:avLst/>
@@ -19956,23 +21628,38 @@
               <a:buChar char="•"/>
             </a:pPr>
             <a:r>
-              <a:rPr lang="en-US" dirty="0" err="1" smtClean="0"/>
+              <a:rPr lang="en-US" dirty="0" err="1" smtClean="0">
+                <a:latin typeface="Arial" panose="020B0604020202020204" pitchFamily="34" charset="0"/>
+                <a:cs typeface="Arial" panose="020B0604020202020204" pitchFamily="34" charset="0"/>
+              </a:rPr>
               <a:t>onStartShouldSetResponderCapture</a:t>
             </a:r>
             <a:r>
-              <a:rPr lang="en-US" dirty="0"/>
+              <a:rPr lang="en-US" dirty="0">
+                <a:latin typeface="Arial" panose="020B0604020202020204" pitchFamily="34" charset="0"/>
+                <a:cs typeface="Arial" panose="020B0604020202020204" pitchFamily="34" charset="0"/>
+              </a:rPr>
               <a:t>: (</a:t>
             </a:r>
             <a:r>
-              <a:rPr lang="en-US" dirty="0" err="1"/>
+              <a:rPr lang="en-US" dirty="0" err="1">
+                <a:latin typeface="Arial" panose="020B0604020202020204" pitchFamily="34" charset="0"/>
+                <a:cs typeface="Arial" panose="020B0604020202020204" pitchFamily="34" charset="0"/>
+              </a:rPr>
               <a:t>evt</a:t>
             </a:r>
             <a:r>
-              <a:rPr lang="en-US" dirty="0"/>
+              <a:rPr lang="en-US" dirty="0">
+                <a:latin typeface="Arial" panose="020B0604020202020204" pitchFamily="34" charset="0"/>
+                <a:cs typeface="Arial" panose="020B0604020202020204" pitchFamily="34" charset="0"/>
+              </a:rPr>
               <a:t>) =&gt; </a:t>
             </a:r>
             <a:r>
-              <a:rPr lang="en-US" dirty="0" smtClean="0"/>
+              <a:rPr lang="en-US" dirty="0" smtClean="0">
+                <a:latin typeface="Arial" panose="020B0604020202020204" pitchFamily="34" charset="0"/>
+                <a:cs typeface="Arial" panose="020B0604020202020204" pitchFamily="34" charset="0"/>
+              </a:rPr>
               <a:t>true</a:t>
             </a:r>
           </a:p>
@@ -19985,25 +21672,33 @@
               <a:buChar char="•"/>
             </a:pPr>
             <a:r>
-              <a:rPr lang="en-US" dirty="0" err="1"/>
+              <a:rPr lang="en-US" dirty="0" err="1">
+                <a:latin typeface="Arial" panose="020B0604020202020204" pitchFamily="34" charset="0"/>
+                <a:cs typeface="Arial" panose="020B0604020202020204" pitchFamily="34" charset="0"/>
+              </a:rPr>
               <a:t>onMoveShouldSetResponderCapture</a:t>
             </a:r>
             <a:r>
-              <a:rPr lang="en-US" dirty="0"/>
+              <a:rPr lang="en-US" dirty="0">
+                <a:latin typeface="Arial" panose="020B0604020202020204" pitchFamily="34" charset="0"/>
+                <a:cs typeface="Arial" panose="020B0604020202020204" pitchFamily="34" charset="0"/>
+              </a:rPr>
               <a:t>: (</a:t>
             </a:r>
             <a:r>
-              <a:rPr lang="en-US" dirty="0" err="1"/>
+              <a:rPr lang="en-US" dirty="0" err="1">
+                <a:latin typeface="Arial" panose="020B0604020202020204" pitchFamily="34" charset="0"/>
+                <a:cs typeface="Arial" panose="020B0604020202020204" pitchFamily="34" charset="0"/>
+              </a:rPr>
               <a:t>evt</a:t>
             </a:r>
             <a:r>
-              <a:rPr lang="en-US" dirty="0"/>
+              <a:rPr lang="en-US" dirty="0">
+                <a:latin typeface="Arial" panose="020B0604020202020204" pitchFamily="34" charset="0"/>
+                <a:cs typeface="Arial" panose="020B0604020202020204" pitchFamily="34" charset="0"/>
+              </a:rPr>
               <a:t>) =&gt; true</a:t>
             </a:r>
-            <a:endParaRPr lang="en-US" dirty="0">
-              <a:latin typeface="Arial" panose="020B0604020202020204" pitchFamily="34" charset="0"/>
-              <a:cs typeface="Arial" panose="020B0604020202020204" pitchFamily="34" charset="0"/>
-            </a:endParaRPr>
           </a:p>
         </p:txBody>
       </p:sp>

</xml_diff>